<commit_message>
thêm tên trưởng nhóm và thành viên
</commit_message>
<xml_diff>
--- a/slide/Sắp xếp ngoại (External Sort).pptx
+++ b/slide/Sắp xếp ngoại (External Sort).pptx
@@ -113,6 +113,22 @@
       </a:defRPr>
     </a:lvl9pPr>
   </p:defaultTextStyle>
+  <p:extLst>
+    <p:ext uri="{EFAFB233-063F-42B5-8137-9DF3F51BA10A}">
+      <p15:sldGuideLst xmlns:p15="http://schemas.microsoft.com/office/powerpoint/2012/main">
+        <p15:guide id="1" orient="horz" pos="2160">
+          <p15:clr>
+            <a:srgbClr val="A4A3A4"/>
+          </p15:clr>
+        </p15:guide>
+        <p15:guide id="2" pos="3840">
+          <p15:clr>
+            <a:srgbClr val="A4A3A4"/>
+          </p15:clr>
+        </p15:guide>
+      </p15:sldGuideLst>
+    </p:ext>
+  </p:extLst>
 </p:presentation>
 </file>
 
@@ -138,7 +154,7 @@
           <p:cNvPr id="2" name="Title 1">
             <a:extLst>
               <a:ext uri="{FF2B5EF4-FFF2-40B4-BE49-F238E27FC236}">
-                <a16:creationId xmlns="" xmlns:a16="http://schemas.microsoft.com/office/drawing/2014/main" id="{CCE85386-4226-D6B5-7BBD-913456415211}"/>
+                <a16:creationId xmlns:a16="http://schemas.microsoft.com/office/drawing/2014/main" id="{CCE85386-4226-D6B5-7BBD-913456415211}"/>
               </a:ext>
             </a:extLst>
           </p:cNvPr>
@@ -175,7 +191,7 @@
           <p:cNvPr id="3" name="Subtitle 2">
             <a:extLst>
               <a:ext uri="{FF2B5EF4-FFF2-40B4-BE49-F238E27FC236}">
-                <a16:creationId xmlns="" xmlns:a16="http://schemas.microsoft.com/office/drawing/2014/main" id="{CE1A882D-2C4D-18D9-5D6C-E6CB685D2747}"/>
+                <a16:creationId xmlns:a16="http://schemas.microsoft.com/office/drawing/2014/main" id="{CE1A882D-2C4D-18D9-5D6C-E6CB685D2747}"/>
               </a:ext>
             </a:extLst>
           </p:cNvPr>
@@ -245,7 +261,7 @@
           <p:cNvPr id="4" name="Date Placeholder 3">
             <a:extLst>
               <a:ext uri="{FF2B5EF4-FFF2-40B4-BE49-F238E27FC236}">
-                <a16:creationId xmlns="" xmlns:a16="http://schemas.microsoft.com/office/drawing/2014/main" id="{2493DE9C-5E01-CE09-CE20-7161659DD78E}"/>
+                <a16:creationId xmlns:a16="http://schemas.microsoft.com/office/drawing/2014/main" id="{2493DE9C-5E01-CE09-CE20-7161659DD78E}"/>
               </a:ext>
             </a:extLst>
           </p:cNvPr>
@@ -263,7 +279,7 @@
           <a:p>
             <a:fld id="{BBE77177-A8DA-4DA3-83F8-534808138282}" type="datetimeFigureOut">
               <a:rPr lang="en-US" smtClean="0"/>
-              <a:t>9/20/2023</a:t>
+              <a:t>9/21/2023</a:t>
             </a:fld>
             <a:endParaRPr lang="en-US"/>
           </a:p>
@@ -274,7 +290,7 @@
           <p:cNvPr id="5" name="Footer Placeholder 4">
             <a:extLst>
               <a:ext uri="{FF2B5EF4-FFF2-40B4-BE49-F238E27FC236}">
-                <a16:creationId xmlns="" xmlns:a16="http://schemas.microsoft.com/office/drawing/2014/main" id="{E7B0F1C1-8930-59FB-9258-1DDAB5BB3ADC}"/>
+                <a16:creationId xmlns:a16="http://schemas.microsoft.com/office/drawing/2014/main" id="{E7B0F1C1-8930-59FB-9258-1DDAB5BB3ADC}"/>
               </a:ext>
             </a:extLst>
           </p:cNvPr>
@@ -299,7 +315,7 @@
           <p:cNvPr id="6" name="Slide Number Placeholder 5">
             <a:extLst>
               <a:ext uri="{FF2B5EF4-FFF2-40B4-BE49-F238E27FC236}">
-                <a16:creationId xmlns="" xmlns:a16="http://schemas.microsoft.com/office/drawing/2014/main" id="{925625C3-9515-9A3D-9C8F-7A8F8DFFBBCA}"/>
+                <a16:creationId xmlns:a16="http://schemas.microsoft.com/office/drawing/2014/main" id="{925625C3-9515-9A3D-9C8F-7A8F8DFFBBCA}"/>
               </a:ext>
             </a:extLst>
           </p:cNvPr>
@@ -358,7 +374,7 @@
           <p:cNvPr id="2" name="Title 1">
             <a:extLst>
               <a:ext uri="{FF2B5EF4-FFF2-40B4-BE49-F238E27FC236}">
-                <a16:creationId xmlns="" xmlns:a16="http://schemas.microsoft.com/office/drawing/2014/main" id="{36BE8A6E-9283-5C22-D0CF-2784BAD9464F}"/>
+                <a16:creationId xmlns:a16="http://schemas.microsoft.com/office/drawing/2014/main" id="{36BE8A6E-9283-5C22-D0CF-2784BAD9464F}"/>
               </a:ext>
             </a:extLst>
           </p:cNvPr>
@@ -386,7 +402,7 @@
           <p:cNvPr id="3" name="Vertical Text Placeholder 2">
             <a:extLst>
               <a:ext uri="{FF2B5EF4-FFF2-40B4-BE49-F238E27FC236}">
-                <a16:creationId xmlns="" xmlns:a16="http://schemas.microsoft.com/office/drawing/2014/main" id="{D1EC56C1-450C-D422-8186-38962D84591E}"/>
+                <a16:creationId xmlns:a16="http://schemas.microsoft.com/office/drawing/2014/main" id="{D1EC56C1-450C-D422-8186-38962D84591E}"/>
               </a:ext>
             </a:extLst>
           </p:cNvPr>
@@ -443,7 +459,7 @@
           <p:cNvPr id="4" name="Date Placeholder 3">
             <a:extLst>
               <a:ext uri="{FF2B5EF4-FFF2-40B4-BE49-F238E27FC236}">
-                <a16:creationId xmlns="" xmlns:a16="http://schemas.microsoft.com/office/drawing/2014/main" id="{75F4BACC-A988-764F-0BE3-41A0A2C155C3}"/>
+                <a16:creationId xmlns:a16="http://schemas.microsoft.com/office/drawing/2014/main" id="{75F4BACC-A988-764F-0BE3-41A0A2C155C3}"/>
               </a:ext>
             </a:extLst>
           </p:cNvPr>
@@ -461,7 +477,7 @@
           <a:p>
             <a:fld id="{BBE77177-A8DA-4DA3-83F8-534808138282}" type="datetimeFigureOut">
               <a:rPr lang="en-US" smtClean="0"/>
-              <a:t>9/20/2023</a:t>
+              <a:t>9/21/2023</a:t>
             </a:fld>
             <a:endParaRPr lang="en-US"/>
           </a:p>
@@ -472,7 +488,7 @@
           <p:cNvPr id="5" name="Footer Placeholder 4">
             <a:extLst>
               <a:ext uri="{FF2B5EF4-FFF2-40B4-BE49-F238E27FC236}">
-                <a16:creationId xmlns="" xmlns:a16="http://schemas.microsoft.com/office/drawing/2014/main" id="{22920A9B-784B-61F3-2EEE-3F24557C34A5}"/>
+                <a16:creationId xmlns:a16="http://schemas.microsoft.com/office/drawing/2014/main" id="{22920A9B-784B-61F3-2EEE-3F24557C34A5}"/>
               </a:ext>
             </a:extLst>
           </p:cNvPr>
@@ -497,7 +513,7 @@
           <p:cNvPr id="6" name="Slide Number Placeholder 5">
             <a:extLst>
               <a:ext uri="{FF2B5EF4-FFF2-40B4-BE49-F238E27FC236}">
-                <a16:creationId xmlns="" xmlns:a16="http://schemas.microsoft.com/office/drawing/2014/main" id="{159B28F8-791D-26C3-C042-1106F522FF4A}"/>
+                <a16:creationId xmlns:a16="http://schemas.microsoft.com/office/drawing/2014/main" id="{159B28F8-791D-26C3-C042-1106F522FF4A}"/>
               </a:ext>
             </a:extLst>
           </p:cNvPr>
@@ -556,7 +572,7 @@
           <p:cNvPr id="2" name="Vertical Title 1">
             <a:extLst>
               <a:ext uri="{FF2B5EF4-FFF2-40B4-BE49-F238E27FC236}">
-                <a16:creationId xmlns="" xmlns:a16="http://schemas.microsoft.com/office/drawing/2014/main" id="{40375EF4-D36B-EB1B-25C2-E869BF62C9DA}"/>
+                <a16:creationId xmlns:a16="http://schemas.microsoft.com/office/drawing/2014/main" id="{40375EF4-D36B-EB1B-25C2-E869BF62C9DA}"/>
               </a:ext>
             </a:extLst>
           </p:cNvPr>
@@ -589,7 +605,7 @@
           <p:cNvPr id="3" name="Vertical Text Placeholder 2">
             <a:extLst>
               <a:ext uri="{FF2B5EF4-FFF2-40B4-BE49-F238E27FC236}">
-                <a16:creationId xmlns="" xmlns:a16="http://schemas.microsoft.com/office/drawing/2014/main" id="{BC08DC8D-C0B6-C227-7C68-06BFAC292927}"/>
+                <a16:creationId xmlns:a16="http://schemas.microsoft.com/office/drawing/2014/main" id="{BC08DC8D-C0B6-C227-7C68-06BFAC292927}"/>
               </a:ext>
             </a:extLst>
           </p:cNvPr>
@@ -651,7 +667,7 @@
           <p:cNvPr id="4" name="Date Placeholder 3">
             <a:extLst>
               <a:ext uri="{FF2B5EF4-FFF2-40B4-BE49-F238E27FC236}">
-                <a16:creationId xmlns="" xmlns:a16="http://schemas.microsoft.com/office/drawing/2014/main" id="{1BA87CE2-4A89-4C31-440F-2B252AFB90FD}"/>
+                <a16:creationId xmlns:a16="http://schemas.microsoft.com/office/drawing/2014/main" id="{1BA87CE2-4A89-4C31-440F-2B252AFB90FD}"/>
               </a:ext>
             </a:extLst>
           </p:cNvPr>
@@ -669,7 +685,7 @@
           <a:p>
             <a:fld id="{BBE77177-A8DA-4DA3-83F8-534808138282}" type="datetimeFigureOut">
               <a:rPr lang="en-US" smtClean="0"/>
-              <a:t>9/20/2023</a:t>
+              <a:t>9/21/2023</a:t>
             </a:fld>
             <a:endParaRPr lang="en-US"/>
           </a:p>
@@ -680,7 +696,7 @@
           <p:cNvPr id="5" name="Footer Placeholder 4">
             <a:extLst>
               <a:ext uri="{FF2B5EF4-FFF2-40B4-BE49-F238E27FC236}">
-                <a16:creationId xmlns="" xmlns:a16="http://schemas.microsoft.com/office/drawing/2014/main" id="{2F1587A4-C73D-682D-2390-F7E033020AB5}"/>
+                <a16:creationId xmlns:a16="http://schemas.microsoft.com/office/drawing/2014/main" id="{2F1587A4-C73D-682D-2390-F7E033020AB5}"/>
               </a:ext>
             </a:extLst>
           </p:cNvPr>
@@ -705,7 +721,7 @@
           <p:cNvPr id="6" name="Slide Number Placeholder 5">
             <a:extLst>
               <a:ext uri="{FF2B5EF4-FFF2-40B4-BE49-F238E27FC236}">
-                <a16:creationId xmlns="" xmlns:a16="http://schemas.microsoft.com/office/drawing/2014/main" id="{42C8FB19-5E3B-0BA1-EB8E-DAAD17850E61}"/>
+                <a16:creationId xmlns:a16="http://schemas.microsoft.com/office/drawing/2014/main" id="{42C8FB19-5E3B-0BA1-EB8E-DAAD17850E61}"/>
               </a:ext>
             </a:extLst>
           </p:cNvPr>
@@ -764,7 +780,7 @@
           <p:cNvPr id="2" name="Title 1">
             <a:extLst>
               <a:ext uri="{FF2B5EF4-FFF2-40B4-BE49-F238E27FC236}">
-                <a16:creationId xmlns="" xmlns:a16="http://schemas.microsoft.com/office/drawing/2014/main" id="{1E3B583E-AA0B-F0BC-6694-D65F3189A1AB}"/>
+                <a16:creationId xmlns:a16="http://schemas.microsoft.com/office/drawing/2014/main" id="{1E3B583E-AA0B-F0BC-6694-D65F3189A1AB}"/>
               </a:ext>
             </a:extLst>
           </p:cNvPr>
@@ -792,7 +808,7 @@
           <p:cNvPr id="3" name="Content Placeholder 2">
             <a:extLst>
               <a:ext uri="{FF2B5EF4-FFF2-40B4-BE49-F238E27FC236}">
-                <a16:creationId xmlns="" xmlns:a16="http://schemas.microsoft.com/office/drawing/2014/main" id="{2B854E62-6300-2302-85D8-901A5CE7FD78}"/>
+                <a16:creationId xmlns:a16="http://schemas.microsoft.com/office/drawing/2014/main" id="{2B854E62-6300-2302-85D8-901A5CE7FD78}"/>
               </a:ext>
             </a:extLst>
           </p:cNvPr>
@@ -849,7 +865,7 @@
           <p:cNvPr id="4" name="Date Placeholder 3">
             <a:extLst>
               <a:ext uri="{FF2B5EF4-FFF2-40B4-BE49-F238E27FC236}">
-                <a16:creationId xmlns="" xmlns:a16="http://schemas.microsoft.com/office/drawing/2014/main" id="{72C63BF5-79C7-816E-8D1A-331EF85767F3}"/>
+                <a16:creationId xmlns:a16="http://schemas.microsoft.com/office/drawing/2014/main" id="{72C63BF5-79C7-816E-8D1A-331EF85767F3}"/>
               </a:ext>
             </a:extLst>
           </p:cNvPr>
@@ -867,7 +883,7 @@
           <a:p>
             <a:fld id="{BBE77177-A8DA-4DA3-83F8-534808138282}" type="datetimeFigureOut">
               <a:rPr lang="en-US" smtClean="0"/>
-              <a:t>9/20/2023</a:t>
+              <a:t>9/21/2023</a:t>
             </a:fld>
             <a:endParaRPr lang="en-US"/>
           </a:p>
@@ -878,7 +894,7 @@
           <p:cNvPr id="5" name="Footer Placeholder 4">
             <a:extLst>
               <a:ext uri="{FF2B5EF4-FFF2-40B4-BE49-F238E27FC236}">
-                <a16:creationId xmlns="" xmlns:a16="http://schemas.microsoft.com/office/drawing/2014/main" id="{94E84871-3C77-43E2-F8C9-4582BD49722A}"/>
+                <a16:creationId xmlns:a16="http://schemas.microsoft.com/office/drawing/2014/main" id="{94E84871-3C77-43E2-F8C9-4582BD49722A}"/>
               </a:ext>
             </a:extLst>
           </p:cNvPr>
@@ -903,7 +919,7 @@
           <p:cNvPr id="6" name="Slide Number Placeholder 5">
             <a:extLst>
               <a:ext uri="{FF2B5EF4-FFF2-40B4-BE49-F238E27FC236}">
-                <a16:creationId xmlns="" xmlns:a16="http://schemas.microsoft.com/office/drawing/2014/main" id="{B36A9A67-12AF-6232-0730-B2550B340B13}"/>
+                <a16:creationId xmlns:a16="http://schemas.microsoft.com/office/drawing/2014/main" id="{B36A9A67-12AF-6232-0730-B2550B340B13}"/>
               </a:ext>
             </a:extLst>
           </p:cNvPr>
@@ -962,7 +978,7 @@
           <p:cNvPr id="2" name="Title 1">
             <a:extLst>
               <a:ext uri="{FF2B5EF4-FFF2-40B4-BE49-F238E27FC236}">
-                <a16:creationId xmlns="" xmlns:a16="http://schemas.microsoft.com/office/drawing/2014/main" id="{5DB47B2A-3128-1294-54F9-6A751C7DEDBB}"/>
+                <a16:creationId xmlns:a16="http://schemas.microsoft.com/office/drawing/2014/main" id="{5DB47B2A-3128-1294-54F9-6A751C7DEDBB}"/>
               </a:ext>
             </a:extLst>
           </p:cNvPr>
@@ -999,7 +1015,7 @@
           <p:cNvPr id="3" name="Text Placeholder 2">
             <a:extLst>
               <a:ext uri="{FF2B5EF4-FFF2-40B4-BE49-F238E27FC236}">
-                <a16:creationId xmlns="" xmlns:a16="http://schemas.microsoft.com/office/drawing/2014/main" id="{0F9AE8F0-83DD-9A58-C688-EE4E7C3D7FBD}"/>
+                <a16:creationId xmlns:a16="http://schemas.microsoft.com/office/drawing/2014/main" id="{0F9AE8F0-83DD-9A58-C688-EE4E7C3D7FBD}"/>
               </a:ext>
             </a:extLst>
           </p:cNvPr>
@@ -1124,7 +1140,7 @@
           <p:cNvPr id="4" name="Date Placeholder 3">
             <a:extLst>
               <a:ext uri="{FF2B5EF4-FFF2-40B4-BE49-F238E27FC236}">
-                <a16:creationId xmlns="" xmlns:a16="http://schemas.microsoft.com/office/drawing/2014/main" id="{E16520D7-C1D3-1C84-5BDB-7A347650A892}"/>
+                <a16:creationId xmlns:a16="http://schemas.microsoft.com/office/drawing/2014/main" id="{E16520D7-C1D3-1C84-5BDB-7A347650A892}"/>
               </a:ext>
             </a:extLst>
           </p:cNvPr>
@@ -1142,7 +1158,7 @@
           <a:p>
             <a:fld id="{BBE77177-A8DA-4DA3-83F8-534808138282}" type="datetimeFigureOut">
               <a:rPr lang="en-US" smtClean="0"/>
-              <a:t>9/20/2023</a:t>
+              <a:t>9/21/2023</a:t>
             </a:fld>
             <a:endParaRPr lang="en-US"/>
           </a:p>
@@ -1153,7 +1169,7 @@
           <p:cNvPr id="5" name="Footer Placeholder 4">
             <a:extLst>
               <a:ext uri="{FF2B5EF4-FFF2-40B4-BE49-F238E27FC236}">
-                <a16:creationId xmlns="" xmlns:a16="http://schemas.microsoft.com/office/drawing/2014/main" id="{D09A81A7-A79E-F2D0-59CB-5DE4891C932E}"/>
+                <a16:creationId xmlns:a16="http://schemas.microsoft.com/office/drawing/2014/main" id="{D09A81A7-A79E-F2D0-59CB-5DE4891C932E}"/>
               </a:ext>
             </a:extLst>
           </p:cNvPr>
@@ -1178,7 +1194,7 @@
           <p:cNvPr id="6" name="Slide Number Placeholder 5">
             <a:extLst>
               <a:ext uri="{FF2B5EF4-FFF2-40B4-BE49-F238E27FC236}">
-                <a16:creationId xmlns="" xmlns:a16="http://schemas.microsoft.com/office/drawing/2014/main" id="{C8BD8A61-21C9-9403-1C71-15D3FD479C84}"/>
+                <a16:creationId xmlns:a16="http://schemas.microsoft.com/office/drawing/2014/main" id="{C8BD8A61-21C9-9403-1C71-15D3FD479C84}"/>
               </a:ext>
             </a:extLst>
           </p:cNvPr>
@@ -1237,7 +1253,7 @@
           <p:cNvPr id="2" name="Title 1">
             <a:extLst>
               <a:ext uri="{FF2B5EF4-FFF2-40B4-BE49-F238E27FC236}">
-                <a16:creationId xmlns="" xmlns:a16="http://schemas.microsoft.com/office/drawing/2014/main" id="{E3189A81-26A3-42A9-11C5-DF28F5F73CAD}"/>
+                <a16:creationId xmlns:a16="http://schemas.microsoft.com/office/drawing/2014/main" id="{E3189A81-26A3-42A9-11C5-DF28F5F73CAD}"/>
               </a:ext>
             </a:extLst>
           </p:cNvPr>
@@ -1265,7 +1281,7 @@
           <p:cNvPr id="3" name="Content Placeholder 2">
             <a:extLst>
               <a:ext uri="{FF2B5EF4-FFF2-40B4-BE49-F238E27FC236}">
-                <a16:creationId xmlns="" xmlns:a16="http://schemas.microsoft.com/office/drawing/2014/main" id="{5A615D29-0603-DFD2-783D-3FE60F483C45}"/>
+                <a16:creationId xmlns:a16="http://schemas.microsoft.com/office/drawing/2014/main" id="{5A615D29-0603-DFD2-783D-3FE60F483C45}"/>
               </a:ext>
             </a:extLst>
           </p:cNvPr>
@@ -1327,7 +1343,7 @@
           <p:cNvPr id="4" name="Content Placeholder 3">
             <a:extLst>
               <a:ext uri="{FF2B5EF4-FFF2-40B4-BE49-F238E27FC236}">
-                <a16:creationId xmlns="" xmlns:a16="http://schemas.microsoft.com/office/drawing/2014/main" id="{7EC5617A-78CB-27D5-6330-25BF7B92B939}"/>
+                <a16:creationId xmlns:a16="http://schemas.microsoft.com/office/drawing/2014/main" id="{7EC5617A-78CB-27D5-6330-25BF7B92B939}"/>
               </a:ext>
             </a:extLst>
           </p:cNvPr>
@@ -1389,7 +1405,7 @@
           <p:cNvPr id="5" name="Date Placeholder 4">
             <a:extLst>
               <a:ext uri="{FF2B5EF4-FFF2-40B4-BE49-F238E27FC236}">
-                <a16:creationId xmlns="" xmlns:a16="http://schemas.microsoft.com/office/drawing/2014/main" id="{70446417-8ED1-0F89-AE8A-786E71339409}"/>
+                <a16:creationId xmlns:a16="http://schemas.microsoft.com/office/drawing/2014/main" id="{70446417-8ED1-0F89-AE8A-786E71339409}"/>
               </a:ext>
             </a:extLst>
           </p:cNvPr>
@@ -1407,7 +1423,7 @@
           <a:p>
             <a:fld id="{BBE77177-A8DA-4DA3-83F8-534808138282}" type="datetimeFigureOut">
               <a:rPr lang="en-US" smtClean="0"/>
-              <a:t>9/20/2023</a:t>
+              <a:t>9/21/2023</a:t>
             </a:fld>
             <a:endParaRPr lang="en-US"/>
           </a:p>
@@ -1418,7 +1434,7 @@
           <p:cNvPr id="6" name="Footer Placeholder 5">
             <a:extLst>
               <a:ext uri="{FF2B5EF4-FFF2-40B4-BE49-F238E27FC236}">
-                <a16:creationId xmlns="" xmlns:a16="http://schemas.microsoft.com/office/drawing/2014/main" id="{696CC751-E717-444C-87FE-63F8DA3943DD}"/>
+                <a16:creationId xmlns:a16="http://schemas.microsoft.com/office/drawing/2014/main" id="{696CC751-E717-444C-87FE-63F8DA3943DD}"/>
               </a:ext>
             </a:extLst>
           </p:cNvPr>
@@ -1443,7 +1459,7 @@
           <p:cNvPr id="7" name="Slide Number Placeholder 6">
             <a:extLst>
               <a:ext uri="{FF2B5EF4-FFF2-40B4-BE49-F238E27FC236}">
-                <a16:creationId xmlns="" xmlns:a16="http://schemas.microsoft.com/office/drawing/2014/main" id="{5ABFDDDC-F75B-86F3-B193-790C58D1D41A}"/>
+                <a16:creationId xmlns:a16="http://schemas.microsoft.com/office/drawing/2014/main" id="{5ABFDDDC-F75B-86F3-B193-790C58D1D41A}"/>
               </a:ext>
             </a:extLst>
           </p:cNvPr>
@@ -1502,7 +1518,7 @@
           <p:cNvPr id="2" name="Title 1">
             <a:extLst>
               <a:ext uri="{FF2B5EF4-FFF2-40B4-BE49-F238E27FC236}">
-                <a16:creationId xmlns="" xmlns:a16="http://schemas.microsoft.com/office/drawing/2014/main" id="{BA982DC3-0FA2-3C76-D90B-4828DC5F839B}"/>
+                <a16:creationId xmlns:a16="http://schemas.microsoft.com/office/drawing/2014/main" id="{BA982DC3-0FA2-3C76-D90B-4828DC5F839B}"/>
               </a:ext>
             </a:extLst>
           </p:cNvPr>
@@ -1535,7 +1551,7 @@
           <p:cNvPr id="3" name="Text Placeholder 2">
             <a:extLst>
               <a:ext uri="{FF2B5EF4-FFF2-40B4-BE49-F238E27FC236}">
-                <a16:creationId xmlns="" xmlns:a16="http://schemas.microsoft.com/office/drawing/2014/main" id="{CCC260F7-F18F-068D-C7F9-DF941E364C7E}"/>
+                <a16:creationId xmlns:a16="http://schemas.microsoft.com/office/drawing/2014/main" id="{CCC260F7-F18F-068D-C7F9-DF941E364C7E}"/>
               </a:ext>
             </a:extLst>
           </p:cNvPr>
@@ -1606,7 +1622,7 @@
           <p:cNvPr id="4" name="Content Placeholder 3">
             <a:extLst>
               <a:ext uri="{FF2B5EF4-FFF2-40B4-BE49-F238E27FC236}">
-                <a16:creationId xmlns="" xmlns:a16="http://schemas.microsoft.com/office/drawing/2014/main" id="{D3A3F859-74B7-8E9C-5246-02635A6D2767}"/>
+                <a16:creationId xmlns:a16="http://schemas.microsoft.com/office/drawing/2014/main" id="{D3A3F859-74B7-8E9C-5246-02635A6D2767}"/>
               </a:ext>
             </a:extLst>
           </p:cNvPr>
@@ -1668,7 +1684,7 @@
           <p:cNvPr id="5" name="Text Placeholder 4">
             <a:extLst>
               <a:ext uri="{FF2B5EF4-FFF2-40B4-BE49-F238E27FC236}">
-                <a16:creationId xmlns="" xmlns:a16="http://schemas.microsoft.com/office/drawing/2014/main" id="{66A2CF09-D8C4-B475-94B2-0F9963474760}"/>
+                <a16:creationId xmlns:a16="http://schemas.microsoft.com/office/drawing/2014/main" id="{66A2CF09-D8C4-B475-94B2-0F9963474760}"/>
               </a:ext>
             </a:extLst>
           </p:cNvPr>
@@ -1739,7 +1755,7 @@
           <p:cNvPr id="6" name="Content Placeholder 5">
             <a:extLst>
               <a:ext uri="{FF2B5EF4-FFF2-40B4-BE49-F238E27FC236}">
-                <a16:creationId xmlns="" xmlns:a16="http://schemas.microsoft.com/office/drawing/2014/main" id="{26593D43-C62A-1507-564A-EA81A24CC0F1}"/>
+                <a16:creationId xmlns:a16="http://schemas.microsoft.com/office/drawing/2014/main" id="{26593D43-C62A-1507-564A-EA81A24CC0F1}"/>
               </a:ext>
             </a:extLst>
           </p:cNvPr>
@@ -1801,7 +1817,7 @@
           <p:cNvPr id="7" name="Date Placeholder 6">
             <a:extLst>
               <a:ext uri="{FF2B5EF4-FFF2-40B4-BE49-F238E27FC236}">
-                <a16:creationId xmlns="" xmlns:a16="http://schemas.microsoft.com/office/drawing/2014/main" id="{B9897F66-E350-0FFB-8806-938D79E9A842}"/>
+                <a16:creationId xmlns:a16="http://schemas.microsoft.com/office/drawing/2014/main" id="{B9897F66-E350-0FFB-8806-938D79E9A842}"/>
               </a:ext>
             </a:extLst>
           </p:cNvPr>
@@ -1819,7 +1835,7 @@
           <a:p>
             <a:fld id="{BBE77177-A8DA-4DA3-83F8-534808138282}" type="datetimeFigureOut">
               <a:rPr lang="en-US" smtClean="0"/>
-              <a:t>9/20/2023</a:t>
+              <a:t>9/21/2023</a:t>
             </a:fld>
             <a:endParaRPr lang="en-US"/>
           </a:p>
@@ -1830,7 +1846,7 @@
           <p:cNvPr id="8" name="Footer Placeholder 7">
             <a:extLst>
               <a:ext uri="{FF2B5EF4-FFF2-40B4-BE49-F238E27FC236}">
-                <a16:creationId xmlns="" xmlns:a16="http://schemas.microsoft.com/office/drawing/2014/main" id="{457B6B5B-B588-E1F9-7D08-F3F1690B17EF}"/>
+                <a16:creationId xmlns:a16="http://schemas.microsoft.com/office/drawing/2014/main" id="{457B6B5B-B588-E1F9-7D08-F3F1690B17EF}"/>
               </a:ext>
             </a:extLst>
           </p:cNvPr>
@@ -1855,7 +1871,7 @@
           <p:cNvPr id="9" name="Slide Number Placeholder 8">
             <a:extLst>
               <a:ext uri="{FF2B5EF4-FFF2-40B4-BE49-F238E27FC236}">
-                <a16:creationId xmlns="" xmlns:a16="http://schemas.microsoft.com/office/drawing/2014/main" id="{D7882495-31F9-24B9-5F60-D5C81CA78EB2}"/>
+                <a16:creationId xmlns:a16="http://schemas.microsoft.com/office/drawing/2014/main" id="{D7882495-31F9-24B9-5F60-D5C81CA78EB2}"/>
               </a:ext>
             </a:extLst>
           </p:cNvPr>
@@ -1914,7 +1930,7 @@
           <p:cNvPr id="2" name="Title 1">
             <a:extLst>
               <a:ext uri="{FF2B5EF4-FFF2-40B4-BE49-F238E27FC236}">
-                <a16:creationId xmlns="" xmlns:a16="http://schemas.microsoft.com/office/drawing/2014/main" id="{DEF48D3D-12FC-C69D-1F95-16ECB92C76C4}"/>
+                <a16:creationId xmlns:a16="http://schemas.microsoft.com/office/drawing/2014/main" id="{DEF48D3D-12FC-C69D-1F95-16ECB92C76C4}"/>
               </a:ext>
             </a:extLst>
           </p:cNvPr>
@@ -1942,7 +1958,7 @@
           <p:cNvPr id="3" name="Date Placeholder 2">
             <a:extLst>
               <a:ext uri="{FF2B5EF4-FFF2-40B4-BE49-F238E27FC236}">
-                <a16:creationId xmlns="" xmlns:a16="http://schemas.microsoft.com/office/drawing/2014/main" id="{1648574F-C5B1-06DF-BDF7-6829B868A6F4}"/>
+                <a16:creationId xmlns:a16="http://schemas.microsoft.com/office/drawing/2014/main" id="{1648574F-C5B1-06DF-BDF7-6829B868A6F4}"/>
               </a:ext>
             </a:extLst>
           </p:cNvPr>
@@ -1960,7 +1976,7 @@
           <a:p>
             <a:fld id="{BBE77177-A8DA-4DA3-83F8-534808138282}" type="datetimeFigureOut">
               <a:rPr lang="en-US" smtClean="0"/>
-              <a:t>9/20/2023</a:t>
+              <a:t>9/21/2023</a:t>
             </a:fld>
             <a:endParaRPr lang="en-US"/>
           </a:p>
@@ -1971,7 +1987,7 @@
           <p:cNvPr id="4" name="Footer Placeholder 3">
             <a:extLst>
               <a:ext uri="{FF2B5EF4-FFF2-40B4-BE49-F238E27FC236}">
-                <a16:creationId xmlns="" xmlns:a16="http://schemas.microsoft.com/office/drawing/2014/main" id="{B72EDE53-2E23-6689-6528-9C68E03684D7}"/>
+                <a16:creationId xmlns:a16="http://schemas.microsoft.com/office/drawing/2014/main" id="{B72EDE53-2E23-6689-6528-9C68E03684D7}"/>
               </a:ext>
             </a:extLst>
           </p:cNvPr>
@@ -1996,7 +2012,7 @@
           <p:cNvPr id="5" name="Slide Number Placeholder 4">
             <a:extLst>
               <a:ext uri="{FF2B5EF4-FFF2-40B4-BE49-F238E27FC236}">
-                <a16:creationId xmlns="" xmlns:a16="http://schemas.microsoft.com/office/drawing/2014/main" id="{F3E7601C-2982-C473-54B0-A95A7208BBF4}"/>
+                <a16:creationId xmlns:a16="http://schemas.microsoft.com/office/drawing/2014/main" id="{F3E7601C-2982-C473-54B0-A95A7208BBF4}"/>
               </a:ext>
             </a:extLst>
           </p:cNvPr>
@@ -2055,7 +2071,7 @@
           <p:cNvPr id="2" name="Date Placeholder 1">
             <a:extLst>
               <a:ext uri="{FF2B5EF4-FFF2-40B4-BE49-F238E27FC236}">
-                <a16:creationId xmlns="" xmlns:a16="http://schemas.microsoft.com/office/drawing/2014/main" id="{FD724F17-0A98-B11B-F130-6CBF0B2827C5}"/>
+                <a16:creationId xmlns:a16="http://schemas.microsoft.com/office/drawing/2014/main" id="{FD724F17-0A98-B11B-F130-6CBF0B2827C5}"/>
               </a:ext>
             </a:extLst>
           </p:cNvPr>
@@ -2073,7 +2089,7 @@
           <a:p>
             <a:fld id="{BBE77177-A8DA-4DA3-83F8-534808138282}" type="datetimeFigureOut">
               <a:rPr lang="en-US" smtClean="0"/>
-              <a:t>9/20/2023</a:t>
+              <a:t>9/21/2023</a:t>
             </a:fld>
             <a:endParaRPr lang="en-US"/>
           </a:p>
@@ -2084,7 +2100,7 @@
           <p:cNvPr id="3" name="Footer Placeholder 2">
             <a:extLst>
               <a:ext uri="{FF2B5EF4-FFF2-40B4-BE49-F238E27FC236}">
-                <a16:creationId xmlns="" xmlns:a16="http://schemas.microsoft.com/office/drawing/2014/main" id="{5D85FE02-CFBA-C11A-6BE0-C02C0CD5F68B}"/>
+                <a16:creationId xmlns:a16="http://schemas.microsoft.com/office/drawing/2014/main" id="{5D85FE02-CFBA-C11A-6BE0-C02C0CD5F68B}"/>
               </a:ext>
             </a:extLst>
           </p:cNvPr>
@@ -2109,7 +2125,7 @@
           <p:cNvPr id="4" name="Slide Number Placeholder 3">
             <a:extLst>
               <a:ext uri="{FF2B5EF4-FFF2-40B4-BE49-F238E27FC236}">
-                <a16:creationId xmlns="" xmlns:a16="http://schemas.microsoft.com/office/drawing/2014/main" id="{188CE660-62B4-9108-F2B7-794C031180D5}"/>
+                <a16:creationId xmlns:a16="http://schemas.microsoft.com/office/drawing/2014/main" id="{188CE660-62B4-9108-F2B7-794C031180D5}"/>
               </a:ext>
             </a:extLst>
           </p:cNvPr>
@@ -2168,7 +2184,7 @@
           <p:cNvPr id="2" name="Title 1">
             <a:extLst>
               <a:ext uri="{FF2B5EF4-FFF2-40B4-BE49-F238E27FC236}">
-                <a16:creationId xmlns="" xmlns:a16="http://schemas.microsoft.com/office/drawing/2014/main" id="{ECC0586F-37D5-1B64-083C-4DCB5A25C4F2}"/>
+                <a16:creationId xmlns:a16="http://schemas.microsoft.com/office/drawing/2014/main" id="{ECC0586F-37D5-1B64-083C-4DCB5A25C4F2}"/>
               </a:ext>
             </a:extLst>
           </p:cNvPr>
@@ -2205,7 +2221,7 @@
           <p:cNvPr id="3" name="Content Placeholder 2">
             <a:extLst>
               <a:ext uri="{FF2B5EF4-FFF2-40B4-BE49-F238E27FC236}">
-                <a16:creationId xmlns="" xmlns:a16="http://schemas.microsoft.com/office/drawing/2014/main" id="{65808A91-EB73-0B2B-3C60-862771D38725}"/>
+                <a16:creationId xmlns:a16="http://schemas.microsoft.com/office/drawing/2014/main" id="{65808A91-EB73-0B2B-3C60-862771D38725}"/>
               </a:ext>
             </a:extLst>
           </p:cNvPr>
@@ -2295,7 +2311,7 @@
           <p:cNvPr id="4" name="Text Placeholder 3">
             <a:extLst>
               <a:ext uri="{FF2B5EF4-FFF2-40B4-BE49-F238E27FC236}">
-                <a16:creationId xmlns="" xmlns:a16="http://schemas.microsoft.com/office/drawing/2014/main" id="{75786283-EADB-2E2D-F6DB-61CCFD793477}"/>
+                <a16:creationId xmlns:a16="http://schemas.microsoft.com/office/drawing/2014/main" id="{75786283-EADB-2E2D-F6DB-61CCFD793477}"/>
               </a:ext>
             </a:extLst>
           </p:cNvPr>
@@ -2366,7 +2382,7 @@
           <p:cNvPr id="5" name="Date Placeholder 4">
             <a:extLst>
               <a:ext uri="{FF2B5EF4-FFF2-40B4-BE49-F238E27FC236}">
-                <a16:creationId xmlns="" xmlns:a16="http://schemas.microsoft.com/office/drawing/2014/main" id="{C1EF075D-F004-D46F-3D1B-EBBB34C6FA79}"/>
+                <a16:creationId xmlns:a16="http://schemas.microsoft.com/office/drawing/2014/main" id="{C1EF075D-F004-D46F-3D1B-EBBB34C6FA79}"/>
               </a:ext>
             </a:extLst>
           </p:cNvPr>
@@ -2384,7 +2400,7 @@
           <a:p>
             <a:fld id="{BBE77177-A8DA-4DA3-83F8-534808138282}" type="datetimeFigureOut">
               <a:rPr lang="en-US" smtClean="0"/>
-              <a:t>9/20/2023</a:t>
+              <a:t>9/21/2023</a:t>
             </a:fld>
             <a:endParaRPr lang="en-US"/>
           </a:p>
@@ -2395,7 +2411,7 @@
           <p:cNvPr id="6" name="Footer Placeholder 5">
             <a:extLst>
               <a:ext uri="{FF2B5EF4-FFF2-40B4-BE49-F238E27FC236}">
-                <a16:creationId xmlns="" xmlns:a16="http://schemas.microsoft.com/office/drawing/2014/main" id="{8064280C-C384-A146-E1F2-096EBBD756C4}"/>
+                <a16:creationId xmlns:a16="http://schemas.microsoft.com/office/drawing/2014/main" id="{8064280C-C384-A146-E1F2-096EBBD756C4}"/>
               </a:ext>
             </a:extLst>
           </p:cNvPr>
@@ -2420,7 +2436,7 @@
           <p:cNvPr id="7" name="Slide Number Placeholder 6">
             <a:extLst>
               <a:ext uri="{FF2B5EF4-FFF2-40B4-BE49-F238E27FC236}">
-                <a16:creationId xmlns="" xmlns:a16="http://schemas.microsoft.com/office/drawing/2014/main" id="{FE2CB362-CBCF-1BF1-4767-24A7DB4EDD36}"/>
+                <a16:creationId xmlns:a16="http://schemas.microsoft.com/office/drawing/2014/main" id="{FE2CB362-CBCF-1BF1-4767-24A7DB4EDD36}"/>
               </a:ext>
             </a:extLst>
           </p:cNvPr>
@@ -2479,7 +2495,7 @@
           <p:cNvPr id="2" name="Title 1">
             <a:extLst>
               <a:ext uri="{FF2B5EF4-FFF2-40B4-BE49-F238E27FC236}">
-                <a16:creationId xmlns="" xmlns:a16="http://schemas.microsoft.com/office/drawing/2014/main" id="{793C437A-7B52-FA40-BC3F-C9B1FA14EB6F}"/>
+                <a16:creationId xmlns:a16="http://schemas.microsoft.com/office/drawing/2014/main" id="{793C437A-7B52-FA40-BC3F-C9B1FA14EB6F}"/>
               </a:ext>
             </a:extLst>
           </p:cNvPr>
@@ -2516,7 +2532,7 @@
           <p:cNvPr id="3" name="Picture Placeholder 2">
             <a:extLst>
               <a:ext uri="{FF2B5EF4-FFF2-40B4-BE49-F238E27FC236}">
-                <a16:creationId xmlns="" xmlns:a16="http://schemas.microsoft.com/office/drawing/2014/main" id="{2C61F149-773B-0425-66BC-CCAEB70BDFAF}"/>
+                <a16:creationId xmlns:a16="http://schemas.microsoft.com/office/drawing/2014/main" id="{2C61F149-773B-0425-66BC-CCAEB70BDFAF}"/>
               </a:ext>
             </a:extLst>
           </p:cNvPr>
@@ -2583,7 +2599,7 @@
           <p:cNvPr id="4" name="Text Placeholder 3">
             <a:extLst>
               <a:ext uri="{FF2B5EF4-FFF2-40B4-BE49-F238E27FC236}">
-                <a16:creationId xmlns="" xmlns:a16="http://schemas.microsoft.com/office/drawing/2014/main" id="{0B2C9800-AA6E-8DE6-D204-B28AEEC11359}"/>
+                <a16:creationId xmlns:a16="http://schemas.microsoft.com/office/drawing/2014/main" id="{0B2C9800-AA6E-8DE6-D204-B28AEEC11359}"/>
               </a:ext>
             </a:extLst>
           </p:cNvPr>
@@ -2654,7 +2670,7 @@
           <p:cNvPr id="5" name="Date Placeholder 4">
             <a:extLst>
               <a:ext uri="{FF2B5EF4-FFF2-40B4-BE49-F238E27FC236}">
-                <a16:creationId xmlns="" xmlns:a16="http://schemas.microsoft.com/office/drawing/2014/main" id="{7CBFB5D8-020B-ADEE-1DB6-8E8D61ABA0F6}"/>
+                <a16:creationId xmlns:a16="http://schemas.microsoft.com/office/drawing/2014/main" id="{7CBFB5D8-020B-ADEE-1DB6-8E8D61ABA0F6}"/>
               </a:ext>
             </a:extLst>
           </p:cNvPr>
@@ -2672,7 +2688,7 @@
           <a:p>
             <a:fld id="{BBE77177-A8DA-4DA3-83F8-534808138282}" type="datetimeFigureOut">
               <a:rPr lang="en-US" smtClean="0"/>
-              <a:t>9/20/2023</a:t>
+              <a:t>9/21/2023</a:t>
             </a:fld>
             <a:endParaRPr lang="en-US"/>
           </a:p>
@@ -2683,7 +2699,7 @@
           <p:cNvPr id="6" name="Footer Placeholder 5">
             <a:extLst>
               <a:ext uri="{FF2B5EF4-FFF2-40B4-BE49-F238E27FC236}">
-                <a16:creationId xmlns="" xmlns:a16="http://schemas.microsoft.com/office/drawing/2014/main" id="{FB11DA92-2E10-E423-15D0-D76220371CE7}"/>
+                <a16:creationId xmlns:a16="http://schemas.microsoft.com/office/drawing/2014/main" id="{FB11DA92-2E10-E423-15D0-D76220371CE7}"/>
               </a:ext>
             </a:extLst>
           </p:cNvPr>
@@ -2708,7 +2724,7 @@
           <p:cNvPr id="7" name="Slide Number Placeholder 6">
             <a:extLst>
               <a:ext uri="{FF2B5EF4-FFF2-40B4-BE49-F238E27FC236}">
-                <a16:creationId xmlns="" xmlns:a16="http://schemas.microsoft.com/office/drawing/2014/main" id="{9238FD9D-AD55-D02E-ECB0-878B4D9409FA}"/>
+                <a16:creationId xmlns:a16="http://schemas.microsoft.com/office/drawing/2014/main" id="{9238FD9D-AD55-D02E-ECB0-878B4D9409FA}"/>
               </a:ext>
             </a:extLst>
           </p:cNvPr>
@@ -2772,7 +2788,7 @@
           <p:cNvPr id="2" name="Title Placeholder 1">
             <a:extLst>
               <a:ext uri="{FF2B5EF4-FFF2-40B4-BE49-F238E27FC236}">
-                <a16:creationId xmlns="" xmlns:a16="http://schemas.microsoft.com/office/drawing/2014/main" id="{D8D2F866-0F58-F8C9-31CF-63189F332B6F}"/>
+                <a16:creationId xmlns:a16="http://schemas.microsoft.com/office/drawing/2014/main" id="{D8D2F866-0F58-F8C9-31CF-63189F332B6F}"/>
               </a:ext>
             </a:extLst>
           </p:cNvPr>
@@ -2810,7 +2826,7 @@
           <p:cNvPr id="3" name="Text Placeholder 2">
             <a:extLst>
               <a:ext uri="{FF2B5EF4-FFF2-40B4-BE49-F238E27FC236}">
-                <a16:creationId xmlns="" xmlns:a16="http://schemas.microsoft.com/office/drawing/2014/main" id="{F2B23331-39F9-0E00-8C0B-E5B889B0D6A1}"/>
+                <a16:creationId xmlns:a16="http://schemas.microsoft.com/office/drawing/2014/main" id="{F2B23331-39F9-0E00-8C0B-E5B889B0D6A1}"/>
               </a:ext>
             </a:extLst>
           </p:cNvPr>
@@ -2877,7 +2893,7 @@
           <p:cNvPr id="4" name="Date Placeholder 3">
             <a:extLst>
               <a:ext uri="{FF2B5EF4-FFF2-40B4-BE49-F238E27FC236}">
-                <a16:creationId xmlns="" xmlns:a16="http://schemas.microsoft.com/office/drawing/2014/main" id="{BA4F383C-BAB2-C7C6-BDD9-17EFCBA1EAAF}"/>
+                <a16:creationId xmlns:a16="http://schemas.microsoft.com/office/drawing/2014/main" id="{BA4F383C-BAB2-C7C6-BDD9-17EFCBA1EAAF}"/>
               </a:ext>
             </a:extLst>
           </p:cNvPr>
@@ -2913,7 +2929,7 @@
           <a:p>
             <a:fld id="{BBE77177-A8DA-4DA3-83F8-534808138282}" type="datetimeFigureOut">
               <a:rPr lang="en-US" smtClean="0"/>
-              <a:t>9/20/2023</a:t>
+              <a:t>9/21/2023</a:t>
             </a:fld>
             <a:endParaRPr lang="en-US"/>
           </a:p>
@@ -2924,7 +2940,7 @@
           <p:cNvPr id="5" name="Footer Placeholder 4">
             <a:extLst>
               <a:ext uri="{FF2B5EF4-FFF2-40B4-BE49-F238E27FC236}">
-                <a16:creationId xmlns="" xmlns:a16="http://schemas.microsoft.com/office/drawing/2014/main" id="{76432D65-D2AB-2D62-13C9-47C60C7C6AA5}"/>
+                <a16:creationId xmlns:a16="http://schemas.microsoft.com/office/drawing/2014/main" id="{76432D65-D2AB-2D62-13C9-47C60C7C6AA5}"/>
               </a:ext>
             </a:extLst>
           </p:cNvPr>
@@ -2967,7 +2983,7 @@
           <p:cNvPr id="6" name="Slide Number Placeholder 5">
             <a:extLst>
               <a:ext uri="{FF2B5EF4-FFF2-40B4-BE49-F238E27FC236}">
-                <a16:creationId xmlns="" xmlns:a16="http://schemas.microsoft.com/office/drawing/2014/main" id="{DBA945F6-2420-A546-F971-283D77376FF0}"/>
+                <a16:creationId xmlns:a16="http://schemas.microsoft.com/office/drawing/2014/main" id="{DBA945F6-2420-A546-F971-283D77376FF0}"/>
               </a:ext>
             </a:extLst>
           </p:cNvPr>
@@ -3335,7 +3351,7 @@
           <p:cNvPr id="2" name="Title 1">
             <a:extLst>
               <a:ext uri="{FF2B5EF4-FFF2-40B4-BE49-F238E27FC236}">
-                <a16:creationId xmlns="" xmlns:a16="http://schemas.microsoft.com/office/drawing/2014/main" id="{7A4EC6DE-F726-0594-C314-3FA91A55D596}"/>
+                <a16:creationId xmlns:a16="http://schemas.microsoft.com/office/drawing/2014/main" id="{7A4EC6DE-F726-0594-C314-3FA91A55D596}"/>
               </a:ext>
             </a:extLst>
           </p:cNvPr>
@@ -3383,7 +3399,7 @@
           <p:cNvPr id="3" name="Subtitle 2">
             <a:extLst>
               <a:ext uri="{FF2B5EF4-FFF2-40B4-BE49-F238E27FC236}">
-                <a16:creationId xmlns="" xmlns:a16="http://schemas.microsoft.com/office/drawing/2014/main" id="{E0F30AE3-5C8F-E210-0E79-953507BAB88D}"/>
+                <a16:creationId xmlns:a16="http://schemas.microsoft.com/office/drawing/2014/main" id="{E0F30AE3-5C8F-E210-0E79-953507BAB88D}"/>
               </a:ext>
             </a:extLst>
           </p:cNvPr>
@@ -3413,17 +3429,66 @@
             </a:r>
             <a:r>
               <a:rPr lang="en-US" dirty="0"/>
-              <a:t>:</a:t>
-            </a:r>
-          </a:p>
-          <a:p>
-            <a:r>
-              <a:rPr lang="en-US" dirty="0"/>
-              <a:t>Thành </a:t>
+              <a:t>: </a:t>
+            </a:r>
+            <a:r>
+              <a:rPr lang="en-US" dirty="0" err="1"/>
+              <a:t>Nguyễn</a:t>
+            </a:r>
+            <a:r>
+              <a:rPr lang="en-US" dirty="0"/>
+              <a:t> </a:t>
+            </a:r>
+            <a:r>
+              <a:rPr lang="en-US" dirty="0" err="1"/>
+              <a:t>Hoàng</a:t>
+            </a:r>
+            <a:r>
+              <a:rPr lang="en-US" dirty="0"/>
+              <a:t> </a:t>
+            </a:r>
+            <a:r>
+              <a:rPr lang="en-US" dirty="0" err="1"/>
+              <a:t>Duy</a:t>
+            </a:r>
+            <a:endParaRPr lang="en-US" dirty="0"/>
+          </a:p>
+          <a:p>
+            <a:r>
+              <a:rPr lang="en-US" dirty="0" err="1"/>
+              <a:t>Thành</a:t>
+            </a:r>
+            <a:r>
+              <a:rPr lang="en-US" dirty="0"/>
+              <a:t> </a:t>
             </a:r>
             <a:r>
               <a:rPr lang="en-US" dirty="0" err="1"/>
               <a:t>viên</a:t>
+            </a:r>
+            <a:r>
+              <a:rPr lang="en-US" dirty="0"/>
+              <a:t>: </a:t>
+            </a:r>
+            <a:r>
+              <a:rPr lang="en-US" dirty="0" err="1"/>
+              <a:t>Nguyễn</a:t>
+            </a:r>
+            <a:r>
+              <a:rPr lang="en-US" dirty="0"/>
+              <a:t> Anh </a:t>
+            </a:r>
+            <a:r>
+              <a:rPr lang="en-US" dirty="0" err="1"/>
+              <a:t>Hải</a:t>
+            </a:r>
+            <a:r>
+              <a:rPr lang="en-US" dirty="0"/>
+              <a:t> </a:t>
+            </a:r>
+            <a:r>
+              <a:rPr lang="en-US"/>
+              <a:t>Ngọc</a:t>
             </a:r>
             <a:endParaRPr lang="en-US" dirty="0"/>
           </a:p>
@@ -3434,7 +3499,7 @@
           <p:cNvPr id="4" name="Picture 3">
             <a:extLst>
               <a:ext uri="{FF2B5EF4-FFF2-40B4-BE49-F238E27FC236}">
-                <a16:creationId xmlns="" xmlns:a16="http://schemas.microsoft.com/office/drawing/2014/main" id="{BE4B2071-02E5-66B8-23A9-2E6EA8A0F7E3}"/>
+                <a16:creationId xmlns:a16="http://schemas.microsoft.com/office/drawing/2014/main" id="{BE4B2071-02E5-66B8-23A9-2E6EA8A0F7E3}"/>
               </a:ext>
             </a:extLst>
           </p:cNvPr>
@@ -3482,152 +3547,152 @@
           <a:lstStyle/>
           <a:p>
             <a:r>
-              <a:rPr lang="en-US" sz="2400" dirty="0" err="1" smtClean="0"/>
+              <a:rPr lang="en-US" sz="2400" dirty="0" err="1"/>
               <a:t>Tên</a:t>
             </a:r>
             <a:r>
-              <a:rPr lang="en-US" sz="2400" dirty="0" smtClean="0"/>
-              <a:t> </a:t>
-            </a:r>
-            <a:r>
-              <a:rPr lang="en-US" sz="2400" dirty="0" err="1" smtClean="0"/>
+              <a:rPr lang="en-US" sz="2400" dirty="0"/>
+              <a:t> </a:t>
+            </a:r>
+            <a:r>
+              <a:rPr lang="en-US" sz="2400" dirty="0" err="1"/>
               <a:t>môn</a:t>
             </a:r>
             <a:r>
-              <a:rPr lang="en-US" sz="2400" dirty="0" smtClean="0"/>
-              <a:t> </a:t>
-            </a:r>
-            <a:r>
-              <a:rPr lang="en-US" sz="2400" dirty="0" err="1" smtClean="0"/>
+              <a:rPr lang="en-US" sz="2400" dirty="0"/>
+              <a:t> </a:t>
+            </a:r>
+            <a:r>
+              <a:rPr lang="en-US" sz="2400" dirty="0" err="1"/>
               <a:t>học</a:t>
             </a:r>
             <a:r>
-              <a:rPr lang="en-US" sz="2400" dirty="0" smtClean="0"/>
+              <a:rPr lang="en-US" sz="2400" dirty="0"/>
               <a:t>: </a:t>
             </a:r>
             <a:r>
-              <a:rPr lang="en-US" sz="2400" dirty="0" err="1" smtClean="0"/>
+              <a:rPr lang="en-US" sz="2400" dirty="0" err="1"/>
               <a:t>Cấu</a:t>
             </a:r>
             <a:r>
-              <a:rPr lang="en-US" sz="2400" dirty="0" smtClean="0"/>
-              <a:t> </a:t>
-            </a:r>
-            <a:r>
-              <a:rPr lang="en-US" sz="2400" dirty="0" err="1" smtClean="0"/>
+              <a:rPr lang="en-US" sz="2400" dirty="0"/>
+              <a:t> </a:t>
+            </a:r>
+            <a:r>
+              <a:rPr lang="en-US" sz="2400" dirty="0" err="1"/>
               <a:t>trúc</a:t>
             </a:r>
             <a:r>
-              <a:rPr lang="en-US" sz="2400" dirty="0" smtClean="0"/>
-              <a:t> </a:t>
-            </a:r>
-            <a:r>
-              <a:rPr lang="en-US" sz="2400" dirty="0" err="1" smtClean="0"/>
+              <a:rPr lang="en-US" sz="2400" dirty="0"/>
+              <a:t> </a:t>
+            </a:r>
+            <a:r>
+              <a:rPr lang="en-US" sz="2400" dirty="0" err="1"/>
               <a:t>dữ</a:t>
             </a:r>
             <a:r>
-              <a:rPr lang="en-US" sz="2400" dirty="0" smtClean="0"/>
-              <a:t> </a:t>
-            </a:r>
-            <a:r>
-              <a:rPr lang="en-US" sz="2400" dirty="0" err="1" smtClean="0"/>
+              <a:rPr lang="en-US" sz="2400" dirty="0"/>
+              <a:t> </a:t>
+            </a:r>
+            <a:r>
+              <a:rPr lang="en-US" sz="2400" dirty="0" err="1"/>
               <a:t>liệu</a:t>
             </a:r>
             <a:r>
-              <a:rPr lang="en-US" sz="2400" dirty="0" smtClean="0"/>
-              <a:t> </a:t>
-            </a:r>
-            <a:r>
-              <a:rPr lang="en-US" sz="2400" dirty="0" err="1" smtClean="0"/>
+              <a:rPr lang="en-US" sz="2400" dirty="0"/>
+              <a:t> </a:t>
+            </a:r>
+            <a:r>
+              <a:rPr lang="en-US" sz="2400" dirty="0" err="1"/>
               <a:t>và</a:t>
             </a:r>
             <a:r>
-              <a:rPr lang="en-US" sz="2400" dirty="0" smtClean="0"/>
-              <a:t> </a:t>
-            </a:r>
-            <a:r>
-              <a:rPr lang="en-US" sz="2400" dirty="0" err="1" smtClean="0"/>
+              <a:rPr lang="en-US" sz="2400" dirty="0"/>
+              <a:t> </a:t>
+            </a:r>
+            <a:r>
+              <a:rPr lang="en-US" sz="2400" dirty="0" err="1"/>
               <a:t>giải</a:t>
             </a:r>
             <a:r>
-              <a:rPr lang="en-US" sz="2400" dirty="0" smtClean="0"/>
-              <a:t> </a:t>
-            </a:r>
-            <a:r>
-              <a:rPr lang="en-US" sz="2400" dirty="0" err="1" smtClean="0"/>
+              <a:rPr lang="en-US" sz="2400" dirty="0"/>
+              <a:t> </a:t>
+            </a:r>
+            <a:r>
+              <a:rPr lang="en-US" sz="2400" dirty="0" err="1"/>
               <a:t>thuật</a:t>
             </a:r>
             <a:r>
-              <a:rPr lang="en-US" sz="2400" dirty="0" smtClean="0"/>
-              <a:t> </a:t>
-            </a:r>
-            <a:r>
-              <a:rPr lang="en-US" sz="2400" dirty="0" err="1" smtClean="0"/>
+              <a:rPr lang="en-US" sz="2400" dirty="0"/>
+              <a:t> </a:t>
+            </a:r>
+            <a:r>
+              <a:rPr lang="en-US" sz="2400" dirty="0" err="1"/>
               <a:t>nâng</a:t>
             </a:r>
             <a:r>
-              <a:rPr lang="en-US" sz="2400" dirty="0" smtClean="0"/>
-              <a:t> </a:t>
-            </a:r>
-            <a:r>
-              <a:rPr lang="en-US" sz="2400" dirty="0" err="1" smtClean="0"/>
+              <a:rPr lang="en-US" sz="2400" dirty="0"/>
+              <a:t> </a:t>
+            </a:r>
+            <a:r>
+              <a:rPr lang="en-US" sz="2400" dirty="0" err="1"/>
               <a:t>cao</a:t>
             </a:r>
-            <a:endParaRPr lang="en-US" sz="2400" dirty="0" smtClean="0"/>
-          </a:p>
-          <a:p>
-            <a:r>
-              <a:rPr lang="en-US" sz="2400" dirty="0" err="1" smtClean="0"/>
+            <a:endParaRPr lang="en-US" sz="2400" dirty="0"/>
+          </a:p>
+          <a:p>
+            <a:r>
+              <a:rPr lang="en-US" sz="2400" dirty="0" err="1"/>
               <a:t>Mã</a:t>
             </a:r>
             <a:r>
-              <a:rPr lang="en-US" sz="2400" dirty="0" smtClean="0"/>
-              <a:t> </a:t>
-            </a:r>
-            <a:r>
-              <a:rPr lang="en-US" sz="2400" dirty="0" err="1" smtClean="0"/>
+              <a:rPr lang="en-US" sz="2400" dirty="0"/>
+              <a:t> </a:t>
+            </a:r>
+            <a:r>
+              <a:rPr lang="en-US" sz="2400" dirty="0" err="1"/>
               <a:t>môn</a:t>
             </a:r>
             <a:r>
-              <a:rPr lang="en-US" sz="2400" dirty="0" smtClean="0"/>
+              <a:rPr lang="en-US" sz="2400" dirty="0"/>
               <a:t>: CS523</a:t>
             </a:r>
           </a:p>
           <a:p>
             <a:r>
-              <a:rPr lang="en-US" sz="2400" dirty="0" err="1" smtClean="0"/>
+              <a:rPr lang="en-US" sz="2400" dirty="0" err="1"/>
               <a:t>Giảng</a:t>
             </a:r>
             <a:r>
-              <a:rPr lang="en-US" sz="2400" dirty="0" smtClean="0"/>
-              <a:t> </a:t>
-            </a:r>
-            <a:r>
-              <a:rPr lang="en-US" sz="2400" dirty="0" err="1" smtClean="0"/>
+              <a:rPr lang="en-US" sz="2400" dirty="0"/>
+              <a:t> </a:t>
+            </a:r>
+            <a:r>
+              <a:rPr lang="en-US" sz="2400" dirty="0" err="1"/>
               <a:t>viên</a:t>
             </a:r>
             <a:r>
-              <a:rPr lang="en-US" sz="2400" dirty="0" smtClean="0"/>
+              <a:rPr lang="en-US" sz="2400" dirty="0"/>
               <a:t>: </a:t>
             </a:r>
             <a:r>
-              <a:rPr lang="en-US" sz="2400" dirty="0" err="1" smtClean="0"/>
+              <a:rPr lang="en-US" sz="2400" dirty="0" err="1"/>
               <a:t>Nguyễn</a:t>
             </a:r>
             <a:r>
-              <a:rPr lang="en-US" sz="2400" dirty="0" smtClean="0"/>
-              <a:t> </a:t>
-            </a:r>
-            <a:r>
-              <a:rPr lang="en-US" sz="2400" dirty="0" err="1" smtClean="0"/>
+              <a:rPr lang="en-US" sz="2400" dirty="0"/>
+              <a:t> </a:t>
+            </a:r>
+            <a:r>
+              <a:rPr lang="en-US" sz="2400" dirty="0" err="1"/>
               <a:t>Thanh</a:t>
             </a:r>
             <a:r>
-              <a:rPr lang="en-US" sz="2400" dirty="0" smtClean="0"/>
-              <a:t> </a:t>
-            </a:r>
-            <a:r>
-              <a:rPr lang="en-US" sz="2400" dirty="0" err="1" smtClean="0"/>
+              <a:rPr lang="en-US" sz="2400" dirty="0"/>
+              <a:t> </a:t>
+            </a:r>
+            <a:r>
+              <a:rPr lang="en-US" sz="2400" dirty="0" err="1"/>
               <a:t>Sơn</a:t>
             </a:r>
             <a:endParaRPr lang="en-US" sz="2400" dirty="0"/>
@@ -3680,15 +3745,15 @@
           <a:lstStyle/>
           <a:p>
             <a:r>
-              <a:rPr lang="en-US" dirty="0" err="1" smtClean="0"/>
+              <a:rPr lang="en-US" dirty="0" err="1"/>
               <a:t>Ứng</a:t>
             </a:r>
             <a:r>
-              <a:rPr lang="en-US" dirty="0" smtClean="0"/>
-              <a:t> </a:t>
-            </a:r>
-            <a:r>
-              <a:rPr lang="en-US" dirty="0" err="1" smtClean="0"/>
+              <a:rPr lang="en-US" dirty="0"/>
+              <a:t> </a:t>
+            </a:r>
+            <a:r>
+              <a:rPr lang="en-US" dirty="0" err="1"/>
               <a:t>dụng</a:t>
             </a:r>
             <a:endParaRPr lang="en-US" dirty="0"/>
@@ -3711,145 +3776,145 @@
           <a:lstStyle/>
           <a:p>
             <a:r>
-              <a:rPr lang="en-US" dirty="0" err="1" smtClean="0"/>
+              <a:rPr lang="en-US" dirty="0" err="1"/>
               <a:t>Sắp</a:t>
             </a:r>
             <a:r>
-              <a:rPr lang="en-US" dirty="0" smtClean="0"/>
-              <a:t> </a:t>
-            </a:r>
-            <a:r>
-              <a:rPr lang="en-US" dirty="0" err="1" smtClean="0"/>
+              <a:rPr lang="en-US" dirty="0"/>
+              <a:t> </a:t>
+            </a:r>
+            <a:r>
+              <a:rPr lang="en-US" dirty="0" err="1"/>
               <a:t>xếp</a:t>
             </a:r>
             <a:r>
-              <a:rPr lang="en-US" dirty="0" smtClean="0"/>
+              <a:rPr lang="en-US" dirty="0"/>
               <a:t>, </a:t>
             </a:r>
             <a:r>
-              <a:rPr lang="en-US" dirty="0" err="1" smtClean="0"/>
+              <a:rPr lang="en-US" dirty="0" err="1"/>
               <a:t>tìm</a:t>
             </a:r>
             <a:r>
-              <a:rPr lang="en-US" dirty="0" smtClean="0"/>
-              <a:t> </a:t>
-            </a:r>
-            <a:r>
-              <a:rPr lang="en-US" dirty="0" err="1" smtClean="0"/>
+              <a:rPr lang="en-US" dirty="0"/>
+              <a:t> </a:t>
+            </a:r>
+            <a:r>
+              <a:rPr lang="en-US" dirty="0" err="1"/>
               <a:t>kiếm</a:t>
             </a:r>
             <a:r>
-              <a:rPr lang="en-US" dirty="0" smtClean="0"/>
-              <a:t> </a:t>
-            </a:r>
-            <a:r>
-              <a:rPr lang="en-US" dirty="0" err="1" smtClean="0"/>
+              <a:rPr lang="en-US" dirty="0"/>
+              <a:t> </a:t>
+            </a:r>
+            <a:r>
+              <a:rPr lang="en-US" dirty="0" err="1"/>
               <a:t>trên</a:t>
             </a:r>
             <a:r>
-              <a:rPr lang="en-US" dirty="0" smtClean="0"/>
-              <a:t> </a:t>
-            </a:r>
-            <a:r>
-              <a:rPr lang="en-US" dirty="0" err="1" smtClean="0"/>
+              <a:rPr lang="en-US" dirty="0"/>
+              <a:t> </a:t>
+            </a:r>
+            <a:r>
+              <a:rPr lang="en-US" dirty="0" err="1"/>
               <a:t>những</a:t>
             </a:r>
             <a:r>
-              <a:rPr lang="en-US" dirty="0" smtClean="0"/>
+              <a:rPr lang="en-US" dirty="0"/>
               <a:t> dataset </a:t>
             </a:r>
             <a:r>
-              <a:rPr lang="en-US" dirty="0" err="1" smtClean="0"/>
+              <a:rPr lang="en-US" dirty="0" err="1"/>
               <a:t>lớn</a:t>
             </a:r>
-            <a:endParaRPr lang="en-US" dirty="0" smtClean="0"/>
-          </a:p>
-          <a:p>
-            <a:r>
-              <a:rPr lang="en-US" dirty="0" err="1" smtClean="0"/>
+            <a:endParaRPr lang="en-US" dirty="0"/>
+          </a:p>
+          <a:p>
+            <a:r>
+              <a:rPr lang="en-US" dirty="0" err="1"/>
               <a:t>Các</a:t>
             </a:r>
             <a:r>
-              <a:rPr lang="en-US" dirty="0" smtClean="0"/>
-              <a:t> </a:t>
-            </a:r>
-            <a:r>
-              <a:rPr lang="en-US" dirty="0" err="1" smtClean="0"/>
+              <a:rPr lang="en-US" dirty="0"/>
+              <a:t> </a:t>
+            </a:r>
+            <a:r>
+              <a:rPr lang="en-US" dirty="0" err="1"/>
               <a:t>công</a:t>
             </a:r>
             <a:r>
-              <a:rPr lang="en-US" dirty="0" smtClean="0"/>
-              <a:t> </a:t>
-            </a:r>
-            <a:r>
-              <a:rPr lang="en-US" dirty="0" err="1" smtClean="0"/>
+              <a:rPr lang="en-US" dirty="0"/>
+              <a:t> </a:t>
+            </a:r>
+            <a:r>
+              <a:rPr lang="en-US" dirty="0" err="1"/>
               <a:t>ty</a:t>
             </a:r>
             <a:r>
-              <a:rPr lang="en-US" dirty="0" smtClean="0"/>
-              <a:t> </a:t>
-            </a:r>
-            <a:r>
-              <a:rPr lang="en-US" dirty="0" err="1" smtClean="0"/>
+              <a:rPr lang="en-US" dirty="0"/>
+              <a:t> </a:t>
+            </a:r>
+            <a:r>
+              <a:rPr lang="en-US" dirty="0" err="1"/>
               <a:t>có</a:t>
             </a:r>
             <a:r>
-              <a:rPr lang="en-US" dirty="0" smtClean="0"/>
-              <a:t> </a:t>
-            </a:r>
-            <a:r>
-              <a:rPr lang="en-US" dirty="0" err="1" smtClean="0"/>
+              <a:rPr lang="en-US" dirty="0"/>
+              <a:t> </a:t>
+            </a:r>
+            <a:r>
+              <a:rPr lang="en-US" dirty="0" err="1"/>
               <a:t>nguồn</a:t>
             </a:r>
             <a:r>
-              <a:rPr lang="en-US" dirty="0" smtClean="0"/>
-              <a:t> </a:t>
-            </a:r>
-            <a:r>
-              <a:rPr lang="en-US" dirty="0" err="1" smtClean="0"/>
+              <a:rPr lang="en-US" dirty="0"/>
+              <a:t> </a:t>
+            </a:r>
+            <a:r>
+              <a:rPr lang="en-US" dirty="0" err="1"/>
               <a:t>dữ</a:t>
             </a:r>
             <a:r>
-              <a:rPr lang="en-US" dirty="0" smtClean="0"/>
-              <a:t> </a:t>
-            </a:r>
-            <a:r>
-              <a:rPr lang="en-US" dirty="0" err="1" smtClean="0"/>
+              <a:rPr lang="en-US" dirty="0"/>
+              <a:t> </a:t>
+            </a:r>
+            <a:r>
+              <a:rPr lang="en-US" dirty="0" err="1"/>
               <a:t>liệu</a:t>
             </a:r>
             <a:r>
-              <a:rPr lang="en-US" dirty="0" smtClean="0"/>
-              <a:t> </a:t>
-            </a:r>
-            <a:r>
-              <a:rPr lang="en-US" dirty="0" err="1" smtClean="0"/>
+              <a:rPr lang="en-US" dirty="0"/>
+              <a:t> </a:t>
+            </a:r>
+            <a:r>
+              <a:rPr lang="en-US" dirty="0" err="1"/>
               <a:t>lớn</a:t>
             </a:r>
             <a:r>
-              <a:rPr lang="en-US" dirty="0" smtClean="0"/>
-              <a:t> </a:t>
-            </a:r>
-            <a:r>
-              <a:rPr lang="en-US" dirty="0" err="1" smtClean="0"/>
+              <a:rPr lang="en-US" dirty="0"/>
+              <a:t> </a:t>
+            </a:r>
+            <a:r>
+              <a:rPr lang="en-US" dirty="0" err="1"/>
               <a:t>cần</a:t>
             </a:r>
             <a:r>
-              <a:rPr lang="en-US" dirty="0" smtClean="0"/>
-              <a:t> </a:t>
-            </a:r>
-            <a:r>
-              <a:rPr lang="en-US" dirty="0" err="1" smtClean="0"/>
+              <a:rPr lang="en-US" dirty="0"/>
+              <a:t> </a:t>
+            </a:r>
+            <a:r>
+              <a:rPr lang="en-US" dirty="0" err="1"/>
               <a:t>quản</a:t>
             </a:r>
             <a:r>
-              <a:rPr lang="en-US" dirty="0" smtClean="0"/>
-              <a:t> </a:t>
-            </a:r>
-            <a:r>
-              <a:rPr lang="en-US" dirty="0" err="1" smtClean="0"/>
+              <a:rPr lang="en-US" dirty="0"/>
+              <a:t> </a:t>
+            </a:r>
+            <a:r>
+              <a:rPr lang="en-US" dirty="0" err="1"/>
               <a:t>lý</a:t>
             </a:r>
-            <a:endParaRPr lang="en-US" dirty="0" smtClean="0"/>
+            <a:endParaRPr lang="en-US" dirty="0"/>
           </a:p>
           <a:p>
             <a:endParaRPr lang="en-US" dirty="0"/>
@@ -3891,7 +3956,7 @@
           <p:cNvPr id="2" name="Title 1">
             <a:extLst>
               <a:ext uri="{FF2B5EF4-FFF2-40B4-BE49-F238E27FC236}">
-                <a16:creationId xmlns="" xmlns:a16="http://schemas.microsoft.com/office/drawing/2014/main" id="{02193C0F-2756-325D-3945-DEFFE87CE7D1}"/>
+                <a16:creationId xmlns:a16="http://schemas.microsoft.com/office/drawing/2014/main" id="{02193C0F-2756-325D-3945-DEFFE87CE7D1}"/>
               </a:ext>
             </a:extLst>
           </p:cNvPr>
@@ -3936,7 +4001,7 @@
           <p:cNvPr id="3" name="Content Placeholder 2">
             <a:extLst>
               <a:ext uri="{FF2B5EF4-FFF2-40B4-BE49-F238E27FC236}">
-                <a16:creationId xmlns="" xmlns:a16="http://schemas.microsoft.com/office/drawing/2014/main" id="{351A4040-9D9C-C882-7C0A-A2B6A91225D9}"/>
+                <a16:creationId xmlns:a16="http://schemas.microsoft.com/office/drawing/2014/main" id="{351A4040-9D9C-C882-7C0A-A2B6A91225D9}"/>
               </a:ext>
             </a:extLst>
           </p:cNvPr>
@@ -4051,11 +4116,11 @@
               <a:t> </a:t>
             </a:r>
             <a:r>
-              <a:rPr lang="en-US" dirty="0" err="1" smtClean="0"/>
+              <a:rPr lang="en-US" dirty="0" err="1"/>
               <a:t>cần</a:t>
             </a:r>
             <a:r>
-              <a:rPr lang="en-US" dirty="0" smtClean="0"/>
+              <a:rPr lang="en-US" dirty="0"/>
               <a:t> </a:t>
             </a:r>
             <a:r>
@@ -4095,158 +4160,157 @@
               <a:t>ngoại</a:t>
             </a:r>
             <a:r>
-              <a:rPr lang="en-US" dirty="0" smtClean="0"/>
+              <a:rPr lang="en-US" dirty="0"/>
               <a:t>?</a:t>
             </a:r>
           </a:p>
           <a:p>
             <a:r>
-              <a:rPr lang="en-US" dirty="0" err="1" smtClean="0"/>
+              <a:rPr lang="en-US" dirty="0" err="1"/>
               <a:t>Sự</a:t>
             </a:r>
             <a:r>
-              <a:rPr lang="en-US" dirty="0" smtClean="0"/>
-              <a:t> </a:t>
-            </a:r>
-            <a:r>
-              <a:rPr lang="en-US" dirty="0" err="1" smtClean="0"/>
+              <a:rPr lang="en-US" dirty="0"/>
+              <a:t> </a:t>
+            </a:r>
+            <a:r>
+              <a:rPr lang="en-US" dirty="0" err="1"/>
               <a:t>khác</a:t>
             </a:r>
             <a:r>
-              <a:rPr lang="en-US" dirty="0" smtClean="0"/>
-              <a:t> </a:t>
-            </a:r>
-            <a:r>
-              <a:rPr lang="en-US" dirty="0" err="1" smtClean="0"/>
+              <a:rPr lang="en-US" dirty="0"/>
+              <a:t> </a:t>
+            </a:r>
+            <a:r>
+              <a:rPr lang="en-US" dirty="0" err="1"/>
               <a:t>biệt</a:t>
             </a:r>
             <a:r>
-              <a:rPr lang="en-US" dirty="0" smtClean="0"/>
-              <a:t> </a:t>
-            </a:r>
-            <a:r>
-              <a:rPr lang="en-US" dirty="0" err="1" smtClean="0"/>
+              <a:rPr lang="en-US" dirty="0"/>
+              <a:t> </a:t>
+            </a:r>
+            <a:r>
+              <a:rPr lang="en-US" dirty="0" err="1"/>
               <a:t>giữa</a:t>
             </a:r>
             <a:r>
-              <a:rPr lang="en-US" dirty="0" smtClean="0"/>
-              <a:t> </a:t>
-            </a:r>
-            <a:r>
-              <a:rPr lang="en-US" dirty="0" err="1" smtClean="0"/>
+              <a:rPr lang="en-US" dirty="0"/>
+              <a:t> </a:t>
+            </a:r>
+            <a:r>
+              <a:rPr lang="en-US" dirty="0" err="1"/>
               <a:t>sắp</a:t>
             </a:r>
             <a:r>
-              <a:rPr lang="en-US" dirty="0" smtClean="0"/>
-              <a:t> </a:t>
-            </a:r>
-            <a:r>
-              <a:rPr lang="en-US" dirty="0" err="1" smtClean="0"/>
+              <a:rPr lang="en-US" dirty="0"/>
+              <a:t> </a:t>
+            </a:r>
+            <a:r>
+              <a:rPr lang="en-US" dirty="0" err="1"/>
               <a:t>xếp</a:t>
             </a:r>
             <a:r>
-              <a:rPr lang="en-US" dirty="0" smtClean="0"/>
-              <a:t> </a:t>
-            </a:r>
-            <a:r>
-              <a:rPr lang="en-US" dirty="0" err="1" smtClean="0"/>
+              <a:rPr lang="en-US" dirty="0"/>
+              <a:t> </a:t>
+            </a:r>
+            <a:r>
+              <a:rPr lang="en-US" dirty="0" err="1"/>
               <a:t>ngoại</a:t>
             </a:r>
             <a:r>
-              <a:rPr lang="en-US" dirty="0" smtClean="0"/>
-              <a:t> </a:t>
-            </a:r>
-            <a:r>
-              <a:rPr lang="en-US" dirty="0" err="1" smtClean="0"/>
+              <a:rPr lang="en-US" dirty="0"/>
+              <a:t> </a:t>
+            </a:r>
+            <a:r>
+              <a:rPr lang="en-US" dirty="0" err="1"/>
               <a:t>và</a:t>
             </a:r>
             <a:r>
-              <a:rPr lang="en-US" dirty="0" smtClean="0"/>
-              <a:t> </a:t>
-            </a:r>
-            <a:r>
-              <a:rPr lang="en-US" dirty="0" err="1" smtClean="0"/>
+              <a:rPr lang="en-US" dirty="0"/>
+              <a:t> </a:t>
+            </a:r>
+            <a:r>
+              <a:rPr lang="en-US" dirty="0" err="1"/>
               <a:t>sắp</a:t>
             </a:r>
             <a:r>
-              <a:rPr lang="en-US" dirty="0" smtClean="0"/>
-              <a:t> </a:t>
-            </a:r>
-            <a:r>
-              <a:rPr lang="en-US" dirty="0" err="1" smtClean="0"/>
+              <a:rPr lang="en-US" dirty="0"/>
+              <a:t> </a:t>
+            </a:r>
+            <a:r>
+              <a:rPr lang="en-US" dirty="0" err="1"/>
               <a:t>xếp</a:t>
             </a:r>
             <a:r>
-              <a:rPr lang="en-US" dirty="0" smtClean="0"/>
-              <a:t> </a:t>
-            </a:r>
-            <a:r>
-              <a:rPr lang="en-US" dirty="0" err="1" smtClean="0"/>
+              <a:rPr lang="en-US" dirty="0"/>
+              <a:t> </a:t>
+            </a:r>
+            <a:r>
+              <a:rPr lang="en-US" dirty="0" err="1"/>
               <a:t>nội</a:t>
             </a:r>
             <a:r>
-              <a:rPr lang="en-US" dirty="0" smtClean="0"/>
+              <a:rPr lang="en-US" dirty="0"/>
               <a:t>.</a:t>
             </a:r>
           </a:p>
           <a:p>
             <a:r>
-              <a:rPr lang="en-US" dirty="0" err="1" smtClean="0"/>
+              <a:rPr lang="en-US" dirty="0" err="1"/>
               <a:t>Các</a:t>
             </a:r>
             <a:r>
-              <a:rPr lang="en-US" dirty="0" smtClean="0"/>
-              <a:t> </a:t>
-            </a:r>
-            <a:r>
-              <a:rPr lang="en-US" dirty="0" err="1" smtClean="0"/>
+              <a:rPr lang="en-US" dirty="0"/>
+              <a:t> </a:t>
+            </a:r>
+            <a:r>
+              <a:rPr lang="en-US" dirty="0" err="1"/>
               <a:t>nguyên</a:t>
             </a:r>
             <a:r>
-              <a:rPr lang="en-US" dirty="0" smtClean="0"/>
-              <a:t> </a:t>
-            </a:r>
-            <a:r>
-              <a:rPr lang="en-US" dirty="0" err="1" smtClean="0"/>
+              <a:rPr lang="en-US" dirty="0"/>
+              <a:t> </a:t>
+            </a:r>
+            <a:r>
+              <a:rPr lang="en-US" dirty="0" err="1"/>
               <a:t>tắc</a:t>
             </a:r>
             <a:r>
-              <a:rPr lang="en-US" dirty="0" smtClean="0"/>
-              <a:t> </a:t>
-            </a:r>
-            <a:r>
-              <a:rPr lang="en-US" dirty="0" err="1" smtClean="0"/>
+              <a:rPr lang="en-US" dirty="0"/>
+              <a:t> </a:t>
+            </a:r>
+            <a:r>
+              <a:rPr lang="en-US" dirty="0" err="1"/>
               <a:t>khi</a:t>
             </a:r>
             <a:r>
-              <a:rPr lang="en-US" dirty="0" smtClean="0"/>
-              <a:t> </a:t>
-            </a:r>
-            <a:r>
-              <a:rPr lang="en-US" dirty="0" err="1" smtClean="0"/>
+              <a:rPr lang="en-US" dirty="0"/>
+              <a:t> </a:t>
+            </a:r>
+            <a:r>
+              <a:rPr lang="en-US" dirty="0" err="1"/>
               <a:t>sắp</a:t>
             </a:r>
             <a:r>
-              <a:rPr lang="en-US" dirty="0" smtClean="0"/>
-              <a:t> </a:t>
-            </a:r>
-            <a:r>
-              <a:rPr lang="en-US" dirty="0" err="1" smtClean="0"/>
+              <a:rPr lang="en-US" dirty="0"/>
+              <a:t> </a:t>
+            </a:r>
+            <a:r>
+              <a:rPr lang="en-US" dirty="0" err="1"/>
               <a:t>xếp</a:t>
             </a:r>
             <a:r>
-              <a:rPr lang="en-US" dirty="0" smtClean="0"/>
-              <a:t> </a:t>
-            </a:r>
-            <a:r>
-              <a:rPr lang="en-US" dirty="0" err="1" smtClean="0"/>
+              <a:rPr lang="en-US" dirty="0"/>
+              <a:t> </a:t>
+            </a:r>
+            <a:r>
+              <a:rPr lang="en-US" dirty="0" err="1"/>
               <a:t>ngoại</a:t>
             </a:r>
             <a:r>
-              <a:rPr lang="en-US" dirty="0" smtClean="0"/>
+              <a:rPr lang="en-US" dirty="0"/>
               <a:t>.</a:t>
             </a:r>
-            <a:endParaRPr lang="en-US" dirty="0"/>
           </a:p>
           <a:p>
             <a:endParaRPr lang="en-US" dirty="0"/>
@@ -4299,46 +4363,45 @@
           <a:lstStyle/>
           <a:p>
             <a:r>
-              <a:rPr lang="en-US" dirty="0" err="1" smtClean="0"/>
+              <a:rPr lang="en-US" dirty="0" err="1"/>
               <a:t>Lí</a:t>
             </a:r>
             <a:r>
-              <a:rPr lang="en-US" dirty="0" smtClean="0"/>
+              <a:rPr lang="en-US" dirty="0"/>
               <a:t> do </a:t>
             </a:r>
             <a:r>
-              <a:rPr lang="en-US" dirty="0" err="1" smtClean="0"/>
+              <a:rPr lang="en-US" dirty="0" err="1"/>
               <a:t>có</a:t>
             </a:r>
             <a:r>
-              <a:rPr lang="en-US" dirty="0" smtClean="0"/>
-              <a:t> </a:t>
-            </a:r>
-            <a:r>
-              <a:rPr lang="en-US" dirty="0" err="1" smtClean="0"/>
+              <a:rPr lang="en-US" dirty="0"/>
+              <a:t> </a:t>
+            </a:r>
+            <a:r>
+              <a:rPr lang="en-US" dirty="0" err="1"/>
               <a:t>sắp</a:t>
             </a:r>
             <a:r>
-              <a:rPr lang="en-US" dirty="0" smtClean="0"/>
-              <a:t> </a:t>
-            </a:r>
-            <a:r>
-              <a:rPr lang="en-US" dirty="0" err="1" smtClean="0"/>
+              <a:rPr lang="en-US" dirty="0"/>
+              <a:t> </a:t>
+            </a:r>
+            <a:r>
+              <a:rPr lang="en-US" dirty="0" err="1"/>
               <a:t>xếp</a:t>
             </a:r>
             <a:r>
-              <a:rPr lang="en-US" dirty="0" smtClean="0"/>
-              <a:t> </a:t>
-            </a:r>
-            <a:r>
-              <a:rPr lang="en-US" dirty="0" err="1" smtClean="0"/>
+              <a:rPr lang="en-US" dirty="0"/>
+              <a:t> </a:t>
+            </a:r>
+            <a:r>
+              <a:rPr lang="en-US" dirty="0" err="1"/>
               <a:t>ngoại</a:t>
             </a:r>
             <a:r>
-              <a:rPr lang="en-US" dirty="0" smtClean="0"/>
+              <a:rPr lang="en-US" dirty="0"/>
               <a:t>?</a:t>
             </a:r>
-            <a:endParaRPr lang="en-US" dirty="0"/>
           </a:p>
         </p:txBody>
       </p:sp>
@@ -4358,551 +4421,551 @@
           <a:lstStyle/>
           <a:p>
             <a:r>
-              <a:rPr lang="en-US" dirty="0" err="1" smtClean="0"/>
+              <a:rPr lang="en-US" dirty="0" err="1"/>
               <a:t>Với</a:t>
             </a:r>
             <a:r>
-              <a:rPr lang="en-US" dirty="0" smtClean="0"/>
-              <a:t> </a:t>
-            </a:r>
-            <a:r>
-              <a:rPr lang="en-US" dirty="0" err="1" smtClean="0"/>
+              <a:rPr lang="en-US" dirty="0"/>
+              <a:t> </a:t>
+            </a:r>
+            <a:r>
+              <a:rPr lang="en-US" dirty="0" err="1"/>
               <a:t>lượng</a:t>
             </a:r>
             <a:r>
-              <a:rPr lang="en-US" dirty="0" smtClean="0"/>
-              <a:t> </a:t>
-            </a:r>
-            <a:r>
-              <a:rPr lang="en-US" dirty="0" err="1" smtClean="0"/>
+              <a:rPr lang="en-US" dirty="0"/>
+              <a:t> </a:t>
+            </a:r>
+            <a:r>
+              <a:rPr lang="en-US" dirty="0" err="1"/>
               <a:t>dữ</a:t>
             </a:r>
             <a:r>
-              <a:rPr lang="en-US" dirty="0" smtClean="0"/>
-              <a:t> </a:t>
-            </a:r>
-            <a:r>
-              <a:rPr lang="en-US" dirty="0" err="1" smtClean="0"/>
+              <a:rPr lang="en-US" dirty="0"/>
+              <a:t> </a:t>
+            </a:r>
+            <a:r>
+              <a:rPr lang="en-US" dirty="0" err="1"/>
               <a:t>liệu</a:t>
             </a:r>
             <a:r>
-              <a:rPr lang="en-US" dirty="0" smtClean="0"/>
-              <a:t> </a:t>
-            </a:r>
-            <a:r>
-              <a:rPr lang="en-US" dirty="0" err="1" smtClean="0"/>
+              <a:rPr lang="en-US" dirty="0"/>
+              <a:t> </a:t>
+            </a:r>
+            <a:r>
+              <a:rPr lang="en-US" dirty="0" err="1"/>
               <a:t>khổng</a:t>
             </a:r>
             <a:r>
-              <a:rPr lang="en-US" dirty="0" smtClean="0"/>
-              <a:t> </a:t>
-            </a:r>
-            <a:r>
-              <a:rPr lang="en-US" dirty="0" err="1" smtClean="0"/>
+              <a:rPr lang="en-US" dirty="0"/>
+              <a:t> </a:t>
+            </a:r>
+            <a:r>
+              <a:rPr lang="en-US" dirty="0" err="1"/>
               <a:t>lồ</a:t>
             </a:r>
             <a:r>
-              <a:rPr lang="en-US" dirty="0" smtClean="0"/>
-              <a:t> </a:t>
-            </a:r>
-            <a:r>
-              <a:rPr lang="en-US" dirty="0" err="1" smtClean="0"/>
+              <a:rPr lang="en-US" dirty="0"/>
+              <a:t> </a:t>
+            </a:r>
+            <a:r>
+              <a:rPr lang="en-US" dirty="0" err="1"/>
               <a:t>vượt</a:t>
             </a:r>
             <a:r>
-              <a:rPr lang="en-US" dirty="0" smtClean="0"/>
+              <a:rPr lang="en-US" dirty="0"/>
               <a:t> qua </a:t>
             </a:r>
             <a:r>
-              <a:rPr lang="en-US" dirty="0" err="1" smtClean="0"/>
+              <a:rPr lang="en-US" dirty="0" err="1"/>
               <a:t>khả</a:t>
             </a:r>
             <a:r>
-              <a:rPr lang="en-US" dirty="0" smtClean="0"/>
-              <a:t> </a:t>
-            </a:r>
-            <a:r>
-              <a:rPr lang="en-US" dirty="0" err="1" smtClean="0"/>
+              <a:rPr lang="en-US" dirty="0"/>
+              <a:t> </a:t>
+            </a:r>
+            <a:r>
+              <a:rPr lang="en-US" dirty="0" err="1"/>
               <a:t>năng</a:t>
             </a:r>
             <a:r>
-              <a:rPr lang="en-US" dirty="0" smtClean="0"/>
-              <a:t> </a:t>
-            </a:r>
-            <a:r>
-              <a:rPr lang="en-US" dirty="0" err="1" smtClean="0"/>
+              <a:rPr lang="en-US" dirty="0"/>
+              <a:t> </a:t>
+            </a:r>
+            <a:r>
+              <a:rPr lang="en-US" dirty="0" err="1"/>
               <a:t>xử</a:t>
             </a:r>
             <a:r>
-              <a:rPr lang="en-US" dirty="0" smtClean="0"/>
-              <a:t> </a:t>
-            </a:r>
-            <a:r>
-              <a:rPr lang="en-US" dirty="0" err="1" smtClean="0"/>
+              <a:rPr lang="en-US" dirty="0"/>
+              <a:t> </a:t>
+            </a:r>
+            <a:r>
+              <a:rPr lang="en-US" dirty="0" err="1"/>
               <a:t>lý</a:t>
             </a:r>
             <a:r>
-              <a:rPr lang="en-US" dirty="0" smtClean="0"/>
-              <a:t> </a:t>
-            </a:r>
-            <a:r>
-              <a:rPr lang="en-US" dirty="0" err="1" smtClean="0"/>
+              <a:rPr lang="en-US" dirty="0"/>
+              <a:t> </a:t>
+            </a:r>
+            <a:r>
+              <a:rPr lang="en-US" dirty="0" err="1"/>
               <a:t>của</a:t>
             </a:r>
             <a:r>
-              <a:rPr lang="en-US" dirty="0" smtClean="0"/>
-              <a:t> </a:t>
-            </a:r>
-            <a:r>
-              <a:rPr lang="en-US" dirty="0" err="1" smtClean="0"/>
+              <a:rPr lang="en-US" dirty="0"/>
+              <a:t> </a:t>
+            </a:r>
+            <a:r>
+              <a:rPr lang="en-US" dirty="0" err="1"/>
               <a:t>bộ</a:t>
             </a:r>
             <a:r>
-              <a:rPr lang="en-US" dirty="0" smtClean="0"/>
-              <a:t> </a:t>
-            </a:r>
-            <a:r>
-              <a:rPr lang="en-US" dirty="0" err="1" smtClean="0"/>
+              <a:rPr lang="en-US" dirty="0"/>
+              <a:t> </a:t>
+            </a:r>
+            <a:r>
+              <a:rPr lang="en-US" dirty="0" err="1"/>
               <a:t>nhớ</a:t>
             </a:r>
             <a:r>
-              <a:rPr lang="en-US" dirty="0" smtClean="0"/>
-              <a:t> </a:t>
-            </a:r>
-            <a:r>
-              <a:rPr lang="en-US" dirty="0" err="1" smtClean="0"/>
+              <a:rPr lang="en-US" dirty="0"/>
+              <a:t> </a:t>
+            </a:r>
+            <a:r>
+              <a:rPr lang="en-US" dirty="0" err="1"/>
               <a:t>chính</a:t>
             </a:r>
             <a:r>
-              <a:rPr lang="en-US" dirty="0" smtClean="0"/>
-              <a:t> </a:t>
-            </a:r>
-            <a:r>
-              <a:rPr lang="en-US" dirty="0" err="1" smtClean="0"/>
+              <a:rPr lang="en-US" dirty="0"/>
+              <a:t> </a:t>
+            </a:r>
+            <a:r>
+              <a:rPr lang="en-US" dirty="0" err="1"/>
               <a:t>của</a:t>
             </a:r>
             <a:r>
-              <a:rPr lang="en-US" dirty="0" smtClean="0"/>
-              <a:t> </a:t>
-            </a:r>
-            <a:r>
-              <a:rPr lang="en-US" dirty="0" err="1" smtClean="0"/>
+              <a:rPr lang="en-US" dirty="0"/>
+              <a:t> </a:t>
+            </a:r>
+            <a:r>
+              <a:rPr lang="en-US" dirty="0" err="1"/>
               <a:t>thiết</a:t>
             </a:r>
             <a:r>
-              <a:rPr lang="en-US" dirty="0" smtClean="0"/>
-              <a:t> </a:t>
-            </a:r>
-            <a:r>
-              <a:rPr lang="en-US" dirty="0" err="1" smtClean="0"/>
+              <a:rPr lang="en-US" dirty="0"/>
+              <a:t> </a:t>
+            </a:r>
+            <a:r>
+              <a:rPr lang="en-US" dirty="0" err="1"/>
               <a:t>bị</a:t>
             </a:r>
             <a:r>
-              <a:rPr lang="en-US" dirty="0" smtClean="0"/>
+              <a:rPr lang="en-US" dirty="0"/>
               <a:t> (</a:t>
             </a:r>
             <a:r>
-              <a:rPr lang="en-US" dirty="0" err="1" smtClean="0"/>
+              <a:rPr lang="en-US" dirty="0" err="1"/>
               <a:t>thường</a:t>
             </a:r>
             <a:r>
-              <a:rPr lang="en-US" dirty="0" smtClean="0"/>
-              <a:t> </a:t>
-            </a:r>
-            <a:r>
-              <a:rPr lang="en-US" dirty="0" err="1" smtClean="0"/>
+              <a:rPr lang="en-US" dirty="0"/>
+              <a:t> </a:t>
+            </a:r>
+            <a:r>
+              <a:rPr lang="en-US" dirty="0" err="1"/>
               <a:t>là</a:t>
             </a:r>
             <a:r>
-              <a:rPr lang="en-US" dirty="0" smtClean="0"/>
+              <a:rPr lang="en-US" dirty="0"/>
               <a:t> RAM) </a:t>
             </a:r>
             <a:r>
-              <a:rPr lang="en-US" dirty="0" err="1" smtClean="0"/>
+              <a:rPr lang="en-US" dirty="0" err="1"/>
               <a:t>thì</a:t>
             </a:r>
             <a:r>
-              <a:rPr lang="en-US" dirty="0" smtClean="0"/>
-              <a:t> </a:t>
-            </a:r>
-            <a:r>
-              <a:rPr lang="en-US" dirty="0" err="1" smtClean="0"/>
+              <a:rPr lang="en-US" dirty="0"/>
+              <a:t> </a:t>
+            </a:r>
+            <a:r>
+              <a:rPr lang="en-US" dirty="0" err="1"/>
               <a:t>chúng</a:t>
             </a:r>
             <a:r>
-              <a:rPr lang="en-US" dirty="0" smtClean="0"/>
+              <a:rPr lang="en-US" dirty="0"/>
               <a:t> ta </a:t>
             </a:r>
             <a:r>
-              <a:rPr lang="en-US" dirty="0" err="1" smtClean="0"/>
+              <a:rPr lang="en-US" dirty="0" err="1"/>
               <a:t>cần</a:t>
             </a:r>
             <a:r>
-              <a:rPr lang="en-US" dirty="0" smtClean="0"/>
-              <a:t> </a:t>
-            </a:r>
-            <a:r>
-              <a:rPr lang="en-US" dirty="0" err="1" smtClean="0"/>
+              <a:rPr lang="en-US" dirty="0"/>
+              <a:t> </a:t>
+            </a:r>
+            <a:r>
+              <a:rPr lang="en-US" dirty="0" err="1"/>
               <a:t>một</a:t>
             </a:r>
             <a:r>
-              <a:rPr lang="en-US" dirty="0" smtClean="0"/>
-              <a:t> </a:t>
-            </a:r>
-            <a:r>
-              <a:rPr lang="en-US" dirty="0" err="1" smtClean="0"/>
+              <a:rPr lang="en-US" dirty="0"/>
+              <a:t> </a:t>
+            </a:r>
+            <a:r>
+              <a:rPr lang="en-US" dirty="0" err="1"/>
               <a:t>phương</a:t>
             </a:r>
             <a:r>
-              <a:rPr lang="en-US" dirty="0" smtClean="0"/>
-              <a:t> </a:t>
-            </a:r>
-            <a:r>
-              <a:rPr lang="en-US" dirty="0" err="1" smtClean="0"/>
+              <a:rPr lang="en-US" dirty="0"/>
+              <a:t> </a:t>
+            </a:r>
+            <a:r>
+              <a:rPr lang="en-US" dirty="0" err="1"/>
               <a:t>pháp</a:t>
             </a:r>
             <a:r>
-              <a:rPr lang="en-US" dirty="0" smtClean="0"/>
-              <a:t> </a:t>
-            </a:r>
-            <a:r>
-              <a:rPr lang="en-US" dirty="0" err="1" smtClean="0"/>
+              <a:rPr lang="en-US" dirty="0"/>
+              <a:t> </a:t>
+            </a:r>
+            <a:r>
+              <a:rPr lang="en-US" dirty="0" err="1"/>
               <a:t>xử</a:t>
             </a:r>
             <a:r>
-              <a:rPr lang="en-US" dirty="0" smtClean="0"/>
-              <a:t> </a:t>
-            </a:r>
-            <a:r>
-              <a:rPr lang="en-US" dirty="0" err="1" smtClean="0"/>
+              <a:rPr lang="en-US" dirty="0"/>
+              <a:t> </a:t>
+            </a:r>
+            <a:r>
+              <a:rPr lang="en-US" dirty="0" err="1"/>
               <a:t>lý</a:t>
             </a:r>
             <a:r>
-              <a:rPr lang="en-US" dirty="0" smtClean="0"/>
-              <a:t> </a:t>
-            </a:r>
-            <a:r>
-              <a:rPr lang="en-US" dirty="0" err="1" smtClean="0"/>
+              <a:rPr lang="en-US" dirty="0"/>
+              <a:t> </a:t>
+            </a:r>
+            <a:r>
+              <a:rPr lang="en-US" dirty="0" err="1"/>
               <a:t>mới</a:t>
             </a:r>
             <a:r>
-              <a:rPr lang="en-US" dirty="0" smtClean="0"/>
+              <a:rPr lang="en-US" dirty="0"/>
               <a:t>.</a:t>
             </a:r>
           </a:p>
           <a:p>
             <a:r>
-              <a:rPr lang="en-US" dirty="0" err="1" smtClean="0"/>
+              <a:rPr lang="en-US" dirty="0" err="1"/>
               <a:t>Tại</a:t>
             </a:r>
             <a:r>
-              <a:rPr lang="en-US" dirty="0" smtClean="0"/>
-              <a:t> </a:t>
-            </a:r>
-            <a:r>
-              <a:rPr lang="en-US" dirty="0" err="1" smtClean="0"/>
+              <a:rPr lang="en-US" dirty="0"/>
+              <a:t> </a:t>
+            </a:r>
+            <a:r>
+              <a:rPr lang="en-US" dirty="0" err="1"/>
               <a:t>sao</a:t>
             </a:r>
             <a:r>
-              <a:rPr lang="en-US" dirty="0" smtClean="0"/>
-              <a:t> </a:t>
-            </a:r>
-            <a:r>
-              <a:rPr lang="en-US" dirty="0" err="1" smtClean="0"/>
+              <a:rPr lang="en-US" dirty="0"/>
+              <a:t> </a:t>
+            </a:r>
+            <a:r>
+              <a:rPr lang="en-US" dirty="0" err="1"/>
               <a:t>gọi</a:t>
             </a:r>
             <a:r>
-              <a:rPr lang="en-US" dirty="0" smtClean="0"/>
-              <a:t> </a:t>
-            </a:r>
-            <a:r>
-              <a:rPr lang="en-US" dirty="0" err="1" smtClean="0"/>
+              <a:rPr lang="en-US" dirty="0"/>
+              <a:t> </a:t>
+            </a:r>
+            <a:r>
+              <a:rPr lang="en-US" dirty="0" err="1"/>
               <a:t>là</a:t>
             </a:r>
             <a:r>
-              <a:rPr lang="en-US" dirty="0" smtClean="0"/>
-              <a:t> </a:t>
-            </a:r>
-            <a:r>
-              <a:rPr lang="en-US" dirty="0" err="1" smtClean="0"/>
+              <a:rPr lang="en-US" dirty="0"/>
+              <a:t> </a:t>
+            </a:r>
+            <a:r>
+              <a:rPr lang="en-US" dirty="0" err="1"/>
               <a:t>Sắp</a:t>
             </a:r>
             <a:r>
-              <a:rPr lang="en-US" dirty="0" smtClean="0"/>
-              <a:t> </a:t>
-            </a:r>
-            <a:r>
-              <a:rPr lang="en-US" dirty="0" err="1" smtClean="0"/>
+              <a:rPr lang="en-US" dirty="0"/>
+              <a:t> </a:t>
+            </a:r>
+            <a:r>
+              <a:rPr lang="en-US" dirty="0" err="1"/>
               <a:t>xếp</a:t>
             </a:r>
             <a:r>
-              <a:rPr lang="en-US" dirty="0" smtClean="0"/>
-              <a:t> </a:t>
-            </a:r>
-            <a:r>
-              <a:rPr lang="en-US" dirty="0" err="1" smtClean="0"/>
+              <a:rPr lang="en-US" dirty="0"/>
+              <a:t> </a:t>
+            </a:r>
+            <a:r>
+              <a:rPr lang="en-US" dirty="0" err="1"/>
               <a:t>ngoại</a:t>
             </a:r>
             <a:r>
-              <a:rPr lang="en-US" dirty="0" smtClean="0"/>
+              <a:rPr lang="en-US" dirty="0"/>
               <a:t>? </a:t>
             </a:r>
           </a:p>
           <a:p>
             <a:r>
-              <a:rPr lang="en-US" dirty="0" err="1" smtClean="0"/>
+              <a:rPr lang="en-US" dirty="0" err="1"/>
               <a:t>Vì</a:t>
             </a:r>
             <a:r>
-              <a:rPr lang="en-US" dirty="0" smtClean="0"/>
-              <a:t> </a:t>
-            </a:r>
-            <a:r>
-              <a:rPr lang="en-US" dirty="0" err="1" smtClean="0"/>
+              <a:rPr lang="en-US" dirty="0"/>
+              <a:t> </a:t>
+            </a:r>
+            <a:r>
+              <a:rPr lang="en-US" dirty="0" err="1"/>
               <a:t>khi</a:t>
             </a:r>
             <a:r>
-              <a:rPr lang="en-US" dirty="0" smtClean="0"/>
-              <a:t> </a:t>
-            </a:r>
-            <a:r>
-              <a:rPr lang="en-US" dirty="0" err="1" smtClean="0"/>
+              <a:rPr lang="en-US" dirty="0"/>
+              <a:t> </a:t>
+            </a:r>
+            <a:r>
+              <a:rPr lang="en-US" dirty="0" err="1"/>
               <a:t>dữ</a:t>
             </a:r>
             <a:r>
-              <a:rPr lang="en-US" dirty="0" smtClean="0"/>
-              <a:t> </a:t>
-            </a:r>
-            <a:r>
-              <a:rPr lang="en-US" dirty="0" err="1" smtClean="0"/>
+              <a:rPr lang="en-US" dirty="0"/>
+              <a:t> </a:t>
+            </a:r>
+            <a:r>
+              <a:rPr lang="en-US" dirty="0" err="1"/>
               <a:t>liệu</a:t>
             </a:r>
             <a:r>
-              <a:rPr lang="en-US" dirty="0" smtClean="0"/>
-              <a:t> </a:t>
-            </a:r>
-            <a:r>
-              <a:rPr lang="en-US" dirty="0" err="1" smtClean="0"/>
+              <a:rPr lang="en-US" dirty="0"/>
+              <a:t> </a:t>
+            </a:r>
+            <a:r>
+              <a:rPr lang="en-US" dirty="0" err="1"/>
               <a:t>vượt</a:t>
             </a:r>
             <a:r>
-              <a:rPr lang="en-US" dirty="0" smtClean="0"/>
-              <a:t> </a:t>
-            </a:r>
-            <a:r>
-              <a:rPr lang="en-US" dirty="0" err="1" smtClean="0"/>
+              <a:rPr lang="en-US" dirty="0"/>
+              <a:t> </a:t>
+            </a:r>
+            <a:r>
+              <a:rPr lang="en-US" dirty="0" err="1"/>
               <a:t>quá</a:t>
             </a:r>
             <a:r>
-              <a:rPr lang="en-US" dirty="0" smtClean="0"/>
-              <a:t> </a:t>
-            </a:r>
-            <a:r>
-              <a:rPr lang="en-US" dirty="0" err="1" smtClean="0"/>
+              <a:rPr lang="en-US" dirty="0"/>
+              <a:t> </a:t>
+            </a:r>
+            <a:r>
+              <a:rPr lang="en-US" dirty="0" err="1"/>
               <a:t>khả</a:t>
             </a:r>
             <a:r>
-              <a:rPr lang="en-US" dirty="0" smtClean="0"/>
-              <a:t> </a:t>
-            </a:r>
-            <a:r>
-              <a:rPr lang="en-US" dirty="0" err="1" smtClean="0"/>
+              <a:rPr lang="en-US" dirty="0"/>
+              <a:t> </a:t>
+            </a:r>
+            <a:r>
+              <a:rPr lang="en-US" dirty="0" err="1"/>
               <a:t>năng</a:t>
             </a:r>
             <a:r>
-              <a:rPr lang="en-US" dirty="0" smtClean="0"/>
-              <a:t> </a:t>
-            </a:r>
-            <a:r>
-              <a:rPr lang="en-US" dirty="0" err="1" smtClean="0"/>
+              <a:rPr lang="en-US" dirty="0"/>
+              <a:t> </a:t>
+            </a:r>
+            <a:r>
+              <a:rPr lang="en-US" dirty="0" err="1"/>
               <a:t>của</a:t>
             </a:r>
             <a:r>
-              <a:rPr lang="en-US" dirty="0" smtClean="0"/>
-              <a:t> </a:t>
-            </a:r>
-            <a:r>
-              <a:rPr lang="en-US" dirty="0" err="1" smtClean="0"/>
+              <a:rPr lang="en-US" dirty="0"/>
+              <a:t> </a:t>
+            </a:r>
+            <a:r>
+              <a:rPr lang="en-US" dirty="0" err="1"/>
               <a:t>bộ</a:t>
             </a:r>
             <a:r>
-              <a:rPr lang="en-US" dirty="0" smtClean="0"/>
-              <a:t> </a:t>
-            </a:r>
-            <a:r>
-              <a:rPr lang="en-US" dirty="0" err="1" smtClean="0"/>
+              <a:rPr lang="en-US" dirty="0"/>
+              <a:t> </a:t>
+            </a:r>
+            <a:r>
+              <a:rPr lang="en-US" dirty="0" err="1"/>
               <a:t>nhớ</a:t>
             </a:r>
             <a:r>
-              <a:rPr lang="en-US" dirty="0" smtClean="0"/>
-              <a:t> </a:t>
-            </a:r>
-            <a:r>
-              <a:rPr lang="en-US" dirty="0" err="1" smtClean="0"/>
+              <a:rPr lang="en-US" dirty="0"/>
+              <a:t> </a:t>
+            </a:r>
+            <a:r>
+              <a:rPr lang="en-US" dirty="0" err="1"/>
               <a:t>trong</a:t>
             </a:r>
             <a:r>
-              <a:rPr lang="en-US" dirty="0" smtClean="0"/>
+              <a:rPr lang="en-US" dirty="0"/>
               <a:t>, </a:t>
             </a:r>
             <a:r>
-              <a:rPr lang="en-US" dirty="0" err="1" smtClean="0"/>
+              <a:rPr lang="en-US" dirty="0" err="1"/>
               <a:t>chúng</a:t>
             </a:r>
             <a:r>
-              <a:rPr lang="en-US" dirty="0" smtClean="0"/>
+              <a:rPr lang="en-US" dirty="0"/>
               <a:t> ta </a:t>
             </a:r>
             <a:r>
-              <a:rPr lang="en-US" dirty="0" err="1" smtClean="0"/>
+              <a:rPr lang="en-US" dirty="0" err="1"/>
               <a:t>sẽ</a:t>
             </a:r>
             <a:r>
-              <a:rPr lang="en-US" dirty="0" smtClean="0"/>
-              <a:t> </a:t>
-            </a:r>
-            <a:r>
-              <a:rPr lang="en-US" dirty="0" err="1" smtClean="0"/>
+              <a:rPr lang="en-US" dirty="0"/>
+              <a:t> </a:t>
+            </a:r>
+            <a:r>
+              <a:rPr lang="en-US" dirty="0" err="1"/>
               <a:t>nhờ</a:t>
             </a:r>
             <a:r>
-              <a:rPr lang="en-US" dirty="0" smtClean="0"/>
-              <a:t> </a:t>
-            </a:r>
-            <a:r>
-              <a:rPr lang="en-US" dirty="0" err="1" smtClean="0"/>
+              <a:rPr lang="en-US" dirty="0"/>
+              <a:t> </a:t>
+            </a:r>
+            <a:r>
+              <a:rPr lang="en-US" dirty="0" err="1"/>
               <a:t>sự</a:t>
             </a:r>
             <a:r>
-              <a:rPr lang="en-US" dirty="0" smtClean="0"/>
-              <a:t> </a:t>
-            </a:r>
-            <a:r>
-              <a:rPr lang="en-US" dirty="0" err="1" smtClean="0"/>
+              <a:rPr lang="en-US" dirty="0"/>
+              <a:t> </a:t>
+            </a:r>
+            <a:r>
+              <a:rPr lang="en-US" dirty="0" err="1"/>
               <a:t>hỗ</a:t>
             </a:r>
             <a:r>
-              <a:rPr lang="en-US" dirty="0" smtClean="0"/>
-              <a:t> </a:t>
-            </a:r>
-            <a:r>
-              <a:rPr lang="en-US" dirty="0" err="1" smtClean="0"/>
+              <a:rPr lang="en-US" dirty="0"/>
+              <a:t> </a:t>
+            </a:r>
+            <a:r>
+              <a:rPr lang="en-US" dirty="0" err="1"/>
               <a:t>trợ</a:t>
             </a:r>
             <a:r>
-              <a:rPr lang="en-US" dirty="0" smtClean="0"/>
-              <a:t> </a:t>
-            </a:r>
-            <a:r>
-              <a:rPr lang="en-US" dirty="0" err="1" smtClean="0"/>
+              <a:rPr lang="en-US" dirty="0"/>
+              <a:t> </a:t>
+            </a:r>
+            <a:r>
+              <a:rPr lang="en-US" dirty="0" err="1"/>
               <a:t>của</a:t>
             </a:r>
             <a:r>
-              <a:rPr lang="en-US" dirty="0" smtClean="0"/>
-              <a:t> </a:t>
-            </a:r>
-            <a:r>
-              <a:rPr lang="en-US" dirty="0" err="1" smtClean="0"/>
+              <a:rPr lang="en-US" dirty="0"/>
+              <a:t> </a:t>
+            </a:r>
+            <a:r>
+              <a:rPr lang="en-US" dirty="0" err="1"/>
               <a:t>bộ</a:t>
             </a:r>
             <a:r>
-              <a:rPr lang="en-US" dirty="0" smtClean="0"/>
-              <a:t> </a:t>
-            </a:r>
-            <a:r>
-              <a:rPr lang="en-US" dirty="0" err="1" smtClean="0"/>
+              <a:rPr lang="en-US" dirty="0"/>
+              <a:t> </a:t>
+            </a:r>
+            <a:r>
+              <a:rPr lang="en-US" dirty="0" err="1"/>
               <a:t>nhớ</a:t>
             </a:r>
             <a:r>
-              <a:rPr lang="en-US" dirty="0" smtClean="0"/>
-              <a:t> </a:t>
-            </a:r>
-            <a:r>
-              <a:rPr lang="en-US" dirty="0" err="1" smtClean="0"/>
+              <a:rPr lang="en-US" dirty="0"/>
+              <a:t> </a:t>
+            </a:r>
+            <a:r>
+              <a:rPr lang="en-US" dirty="0" err="1"/>
               <a:t>ngoài</a:t>
             </a:r>
             <a:r>
-              <a:rPr lang="en-US" dirty="0" smtClean="0"/>
-              <a:t> </a:t>
-            </a:r>
-            <a:r>
-              <a:rPr lang="en-US" dirty="0" err="1" smtClean="0"/>
+              <a:rPr lang="en-US" dirty="0"/>
+              <a:t> </a:t>
+            </a:r>
+            <a:r>
+              <a:rPr lang="en-US" dirty="0" err="1"/>
               <a:t>để</a:t>
             </a:r>
             <a:r>
-              <a:rPr lang="en-US" dirty="0" smtClean="0"/>
-              <a:t> </a:t>
-            </a:r>
-            <a:r>
-              <a:rPr lang="en-US" dirty="0" err="1" smtClean="0"/>
+              <a:rPr lang="en-US" dirty="0"/>
+              <a:t> </a:t>
+            </a:r>
+            <a:r>
+              <a:rPr lang="en-US" dirty="0" err="1"/>
               <a:t>xử</a:t>
             </a:r>
             <a:r>
-              <a:rPr lang="en-US" dirty="0" smtClean="0"/>
-              <a:t> </a:t>
-            </a:r>
-            <a:r>
-              <a:rPr lang="en-US" dirty="0" err="1" smtClean="0"/>
+              <a:rPr lang="en-US" dirty="0"/>
+              <a:t> </a:t>
+            </a:r>
+            <a:r>
+              <a:rPr lang="en-US" dirty="0" err="1"/>
               <a:t>lý</a:t>
             </a:r>
             <a:r>
-              <a:rPr lang="en-US" dirty="0" smtClean="0"/>
-              <a:t> </a:t>
-            </a:r>
-            <a:r>
-              <a:rPr lang="en-US" dirty="0" err="1" smtClean="0"/>
+              <a:rPr lang="en-US" dirty="0"/>
+              <a:t> </a:t>
+            </a:r>
+            <a:r>
+              <a:rPr lang="en-US" dirty="0" err="1"/>
               <a:t>dữ</a:t>
             </a:r>
             <a:r>
-              <a:rPr lang="en-US" dirty="0" smtClean="0"/>
-              <a:t> </a:t>
-            </a:r>
-            <a:r>
-              <a:rPr lang="en-US" dirty="0" err="1" smtClean="0"/>
+              <a:rPr lang="en-US" dirty="0"/>
+              <a:t> </a:t>
+            </a:r>
+            <a:r>
+              <a:rPr lang="en-US" dirty="0" err="1"/>
               <a:t>liệu</a:t>
             </a:r>
             <a:r>
-              <a:rPr lang="en-US" dirty="0" smtClean="0"/>
-              <a:t> </a:t>
-            </a:r>
-            <a:r>
-              <a:rPr lang="en-US" dirty="0" err="1" smtClean="0"/>
+              <a:rPr lang="en-US" dirty="0"/>
+              <a:t> </a:t>
+            </a:r>
+            <a:r>
+              <a:rPr lang="en-US" dirty="0" err="1"/>
               <a:t>và</a:t>
             </a:r>
             <a:r>
-              <a:rPr lang="en-US" dirty="0" smtClean="0"/>
-              <a:t> </a:t>
-            </a:r>
-            <a:r>
-              <a:rPr lang="en-US" dirty="0" err="1" smtClean="0"/>
+              <a:rPr lang="en-US" dirty="0"/>
+              <a:t> </a:t>
+            </a:r>
+            <a:r>
+              <a:rPr lang="en-US" dirty="0" err="1"/>
               <a:t>giải</a:t>
             </a:r>
             <a:r>
-              <a:rPr lang="en-US" dirty="0" smtClean="0"/>
-              <a:t> </a:t>
-            </a:r>
-            <a:r>
-              <a:rPr lang="en-US" dirty="0" err="1" smtClean="0"/>
+              <a:rPr lang="en-US" dirty="0"/>
+              <a:t> </a:t>
+            </a:r>
+            <a:r>
+              <a:rPr lang="en-US" dirty="0" err="1"/>
               <a:t>quyết</a:t>
             </a:r>
             <a:r>
-              <a:rPr lang="en-US" dirty="0" smtClean="0"/>
-              <a:t> </a:t>
-            </a:r>
-            <a:r>
-              <a:rPr lang="en-US" dirty="0" err="1" smtClean="0"/>
+              <a:rPr lang="en-US" dirty="0"/>
+              <a:t> </a:t>
+            </a:r>
+            <a:r>
+              <a:rPr lang="en-US" dirty="0" err="1"/>
               <a:t>bài</a:t>
             </a:r>
             <a:r>
-              <a:rPr lang="en-US" dirty="0" smtClean="0"/>
-              <a:t> </a:t>
-            </a:r>
-            <a:r>
-              <a:rPr lang="en-US" dirty="0" err="1" smtClean="0"/>
+              <a:rPr lang="en-US" dirty="0"/>
+              <a:t> </a:t>
+            </a:r>
+            <a:r>
+              <a:rPr lang="en-US" dirty="0" err="1"/>
               <a:t>toán</a:t>
             </a:r>
             <a:r>
-              <a:rPr lang="en-US" dirty="0" smtClean="0"/>
+              <a:rPr lang="en-US" dirty="0"/>
               <a:t>.</a:t>
             </a:r>
           </a:p>
@@ -4954,70 +5017,69 @@
           <a:lstStyle/>
           <a:p>
             <a:r>
-              <a:rPr lang="en-US" dirty="0" err="1" smtClean="0"/>
+              <a:rPr lang="en-US" dirty="0" err="1"/>
               <a:t>Mô</a:t>
             </a:r>
             <a:r>
-              <a:rPr lang="en-US" dirty="0" smtClean="0"/>
-              <a:t> </a:t>
-            </a:r>
-            <a:r>
-              <a:rPr lang="en-US" dirty="0" err="1" smtClean="0"/>
+              <a:rPr lang="en-US" dirty="0"/>
+              <a:t> </a:t>
+            </a:r>
+            <a:r>
+              <a:rPr lang="en-US" dirty="0" err="1"/>
               <a:t>tả</a:t>
             </a:r>
             <a:r>
-              <a:rPr lang="en-US" dirty="0" smtClean="0"/>
-              <a:t> </a:t>
-            </a:r>
-            <a:r>
-              <a:rPr lang="en-US" dirty="0" err="1" smtClean="0"/>
+              <a:rPr lang="en-US" dirty="0"/>
+              <a:t> </a:t>
+            </a:r>
+            <a:r>
+              <a:rPr lang="en-US" dirty="0" err="1"/>
               <a:t>thuật</a:t>
             </a:r>
             <a:r>
-              <a:rPr lang="en-US" dirty="0" smtClean="0"/>
-              <a:t> </a:t>
-            </a:r>
-            <a:r>
-              <a:rPr lang="en-US" dirty="0" err="1" smtClean="0"/>
+              <a:rPr lang="en-US" dirty="0"/>
+              <a:t> </a:t>
+            </a:r>
+            <a:r>
+              <a:rPr lang="en-US" dirty="0" err="1"/>
               <a:t>toán</a:t>
             </a:r>
             <a:r>
-              <a:rPr lang="en-US" dirty="0" smtClean="0"/>
-              <a:t> </a:t>
-            </a:r>
-            <a:r>
-              <a:rPr lang="en-US" dirty="0" err="1" smtClean="0"/>
+              <a:rPr lang="en-US" dirty="0"/>
+              <a:t> </a:t>
+            </a:r>
+            <a:r>
+              <a:rPr lang="en-US" dirty="0" err="1"/>
               <a:t>bằng</a:t>
             </a:r>
             <a:r>
-              <a:rPr lang="en-US" dirty="0" smtClean="0"/>
-              <a:t> </a:t>
-            </a:r>
-            <a:r>
-              <a:rPr lang="en-US" dirty="0" err="1" smtClean="0"/>
+              <a:rPr lang="en-US" dirty="0"/>
+              <a:t> </a:t>
+            </a:r>
+            <a:r>
+              <a:rPr lang="en-US" dirty="0" err="1"/>
               <a:t>phương</a:t>
             </a:r>
             <a:r>
-              <a:rPr lang="en-US" dirty="0" smtClean="0"/>
-              <a:t> </a:t>
-            </a:r>
-            <a:r>
-              <a:rPr lang="en-US" dirty="0" err="1" smtClean="0"/>
+              <a:rPr lang="en-US" dirty="0"/>
+              <a:t> </a:t>
+            </a:r>
+            <a:r>
+              <a:rPr lang="en-US" dirty="0" err="1"/>
               <a:t>pháp</a:t>
             </a:r>
             <a:r>
-              <a:rPr lang="en-US" dirty="0" smtClean="0"/>
-              <a:t> </a:t>
-            </a:r>
-            <a:r>
-              <a:rPr lang="en-US" dirty="0" err="1" smtClean="0"/>
+              <a:rPr lang="en-US" dirty="0"/>
+              <a:t> </a:t>
+            </a:r>
+            <a:r>
+              <a:rPr lang="en-US" dirty="0" err="1"/>
               <a:t>trộn</a:t>
             </a:r>
             <a:r>
-              <a:rPr lang="en-US" dirty="0" smtClean="0"/>
+              <a:rPr lang="en-US" dirty="0"/>
               <a:t> Run</a:t>
             </a:r>
-            <a:endParaRPr lang="en-US" dirty="0"/>
           </a:p>
         </p:txBody>
       </p:sp>
@@ -5048,7 +5110,7 @@
               <a:t>Để cài đặt thuật </a:t>
             </a:r>
             <a:r>
-              <a:rPr lang="en-US" dirty="0" err="1" smtClean="0">
+              <a:rPr lang="en-US" dirty="0" err="1">
                 <a:latin typeface="Calibri" pitchFamily="34" charset="0"/>
                 <a:ea typeface="Calibri" pitchFamily="34" charset="0"/>
                 <a:cs typeface="Calibri" pitchFamily="34" charset="0"/>
@@ -5056,20 +5118,12 @@
               <a:t>toán</a:t>
             </a:r>
             <a:r>
-              <a:rPr lang="vi-VN" dirty="0" smtClean="0">
-                <a:latin typeface="Calibri" pitchFamily="34" charset="0"/>
-                <a:ea typeface="Calibri" pitchFamily="34" charset="0"/>
-                <a:cs typeface="Calibri" pitchFamily="34" charset="0"/>
-              </a:rPr>
-              <a:t> </a:t>
-            </a:r>
-            <a:r>
               <a:rPr lang="vi-VN" dirty="0">
                 <a:latin typeface="Calibri" pitchFamily="34" charset="0"/>
                 <a:ea typeface="Calibri" pitchFamily="34" charset="0"/>
                 <a:cs typeface="Calibri" pitchFamily="34" charset="0"/>
               </a:rPr>
-              <a:t>này chúng ta phải thực hiện hai bước:</a:t>
+              <a:t> này chúng ta phải thực hiện hai bước:</a:t>
             </a:r>
             <a:br>
               <a:rPr lang="vi-VN" dirty="0">
@@ -5087,7 +5141,7 @@
               <a:t>• Tạo các </a:t>
             </a:r>
             <a:r>
-              <a:rPr lang="en-US" dirty="0" smtClean="0">
+              <a:rPr lang="en-US" dirty="0">
                 <a:latin typeface="Calibri" pitchFamily="34" charset="0"/>
                 <a:ea typeface="Calibri" pitchFamily="34" charset="0"/>
                 <a:cs typeface="Calibri" pitchFamily="34" charset="0"/>
@@ -5095,20 +5149,12 @@
               <a:t>runs</a:t>
             </a:r>
             <a:r>
-              <a:rPr lang="vi-VN" dirty="0" smtClean="0">
+              <a:rPr lang="vi-VN" dirty="0">
                 <a:latin typeface="Calibri" pitchFamily="34" charset="0"/>
                 <a:ea typeface="Calibri" pitchFamily="34" charset="0"/>
                 <a:cs typeface="Calibri" pitchFamily="34" charset="0"/>
               </a:rPr>
               <a:t>.</a:t>
-            </a:r>
-            <a:r>
-              <a:rPr lang="vi-VN" dirty="0">
-                <a:latin typeface="Calibri" pitchFamily="34" charset="0"/>
-                <a:ea typeface="Calibri" pitchFamily="34" charset="0"/>
-                <a:cs typeface="Calibri" pitchFamily="34" charset="0"/>
-              </a:rPr>
-              <a:t/>
             </a:r>
             <a:br>
               <a:rPr lang="vi-VN" dirty="0">
@@ -5126,7 +5172,7 @@
               <a:t>• </a:t>
             </a:r>
             <a:r>
-              <a:rPr lang="en-US" dirty="0" err="1" smtClean="0">
+              <a:rPr lang="en-US" dirty="0" err="1">
                 <a:latin typeface="Calibri" pitchFamily="34" charset="0"/>
                 <a:ea typeface="Calibri" pitchFamily="34" charset="0"/>
                 <a:cs typeface="Calibri" pitchFamily="34" charset="0"/>
@@ -5134,23 +5180,15 @@
               <a:t>Tr</a:t>
             </a:r>
             <a:r>
-              <a:rPr lang="vi-VN" dirty="0" smtClean="0">
-                <a:latin typeface="Calibri" pitchFamily="34" charset="0"/>
-                <a:ea typeface="Calibri" pitchFamily="34" charset="0"/>
-                <a:cs typeface="Calibri" pitchFamily="34" charset="0"/>
-              </a:rPr>
-              <a:t>ộn </a:t>
-            </a:r>
-            <a:r>
               <a:rPr lang="vi-VN" dirty="0">
                 <a:latin typeface="Calibri" pitchFamily="34" charset="0"/>
                 <a:ea typeface="Calibri" pitchFamily="34" charset="0"/>
                 <a:cs typeface="Calibri" pitchFamily="34" charset="0"/>
               </a:rPr>
-              <a:t>các </a:t>
-            </a:r>
-            <a:r>
-              <a:rPr lang="en-US" dirty="0" smtClean="0">
+              <a:t>ộn các </a:t>
+            </a:r>
+            <a:r>
+              <a:rPr lang="en-US" dirty="0">
                 <a:latin typeface="Calibri" pitchFamily="34" charset="0"/>
                 <a:ea typeface="Calibri" pitchFamily="34" charset="0"/>
                 <a:cs typeface="Calibri" pitchFamily="34" charset="0"/>
@@ -5158,30 +5196,14 @@
               <a:t>runs</a:t>
             </a:r>
             <a:r>
-              <a:rPr lang="vi-VN" dirty="0" smtClean="0">
-                <a:latin typeface="Calibri" pitchFamily="34" charset="0"/>
-                <a:ea typeface="Calibri" pitchFamily="34" charset="0"/>
-                <a:cs typeface="Calibri" pitchFamily="34" charset="0"/>
-              </a:rPr>
-              <a:t> </a:t>
-            </a:r>
-            <a:r>
               <a:rPr lang="vi-VN" dirty="0">
                 <a:latin typeface="Calibri" pitchFamily="34" charset="0"/>
                 <a:ea typeface="Calibri" pitchFamily="34" charset="0"/>
                 <a:cs typeface="Calibri" pitchFamily="34" charset="0"/>
               </a:rPr>
-              <a:t>lại với nhau</a:t>
-            </a:r>
-            <a:r>
-              <a:rPr lang="vi-VN" dirty="0" smtClean="0">
-                <a:latin typeface="Calibri" pitchFamily="34" charset="0"/>
-                <a:ea typeface="Calibri" pitchFamily="34" charset="0"/>
-                <a:cs typeface="Calibri" pitchFamily="34" charset="0"/>
-              </a:rPr>
-              <a:t>.</a:t>
-            </a:r>
-            <a:endParaRPr lang="en-US" dirty="0" smtClean="0">
+              <a:t> lại với nhau.</a:t>
+            </a:r>
+            <a:endParaRPr lang="en-US" dirty="0">
               <a:latin typeface="Calibri" pitchFamily="34" charset="0"/>
               <a:ea typeface="Calibri" pitchFamily="34" charset="0"/>
               <a:cs typeface="Calibri" pitchFamily="34" charset="0"/>
@@ -5235,23 +5257,23 @@
           <a:lstStyle/>
           <a:p>
             <a:r>
-              <a:rPr lang="en-US" dirty="0" err="1" smtClean="0"/>
+              <a:rPr lang="en-US" dirty="0" err="1"/>
               <a:t>Mô</a:t>
             </a:r>
             <a:r>
-              <a:rPr lang="en-US" dirty="0" smtClean="0"/>
-              <a:t> </a:t>
-            </a:r>
-            <a:r>
-              <a:rPr lang="en-US" dirty="0" err="1" smtClean="0"/>
+              <a:rPr lang="en-US" dirty="0"/>
+              <a:t> </a:t>
+            </a:r>
+            <a:r>
+              <a:rPr lang="en-US" dirty="0" err="1"/>
               <a:t>tả</a:t>
             </a:r>
             <a:r>
-              <a:rPr lang="en-US" dirty="0" smtClean="0"/>
-              <a:t> </a:t>
-            </a:r>
-            <a:r>
-              <a:rPr lang="en-US" dirty="0" err="1" smtClean="0"/>
+              <a:rPr lang="en-US" dirty="0"/>
+              <a:t> </a:t>
+            </a:r>
+            <a:r>
+              <a:rPr lang="en-US" dirty="0" err="1"/>
               <a:t>thuật</a:t>
             </a:r>
             <a:r>
@@ -5259,46 +5281,45 @@
               <a:t> </a:t>
             </a:r>
             <a:r>
-              <a:rPr lang="en-US" dirty="0" err="1" smtClean="0"/>
+              <a:rPr lang="en-US" dirty="0" err="1"/>
               <a:t>toán</a:t>
             </a:r>
             <a:r>
-              <a:rPr lang="en-US" dirty="0" smtClean="0"/>
-              <a:t> </a:t>
-            </a:r>
-            <a:r>
-              <a:rPr lang="en-US" dirty="0" err="1" smtClean="0"/>
+              <a:rPr lang="en-US" dirty="0"/>
+              <a:t> </a:t>
+            </a:r>
+            <a:r>
+              <a:rPr lang="en-US" dirty="0" err="1"/>
               <a:t>bằng</a:t>
             </a:r>
             <a:r>
-              <a:rPr lang="en-US" dirty="0" smtClean="0"/>
-              <a:t> </a:t>
-            </a:r>
-            <a:r>
-              <a:rPr lang="en-US" dirty="0" err="1" smtClean="0"/>
+              <a:rPr lang="en-US" dirty="0"/>
+              <a:t> </a:t>
+            </a:r>
+            <a:r>
+              <a:rPr lang="en-US" dirty="0" err="1"/>
               <a:t>phương</a:t>
             </a:r>
             <a:r>
-              <a:rPr lang="en-US" dirty="0" smtClean="0"/>
-              <a:t> </a:t>
-            </a:r>
-            <a:r>
-              <a:rPr lang="en-US" dirty="0" err="1" smtClean="0"/>
+              <a:rPr lang="en-US" dirty="0"/>
+              <a:t> </a:t>
+            </a:r>
+            <a:r>
+              <a:rPr lang="en-US" dirty="0" err="1"/>
               <a:t>pháp</a:t>
             </a:r>
             <a:r>
-              <a:rPr lang="en-US" dirty="0" smtClean="0"/>
-              <a:t> </a:t>
-            </a:r>
-            <a:r>
-              <a:rPr lang="en-US" dirty="0" err="1" smtClean="0"/>
+              <a:rPr lang="en-US" dirty="0"/>
+              <a:t> </a:t>
+            </a:r>
+            <a:r>
+              <a:rPr lang="en-US" dirty="0" err="1"/>
               <a:t>trộn</a:t>
             </a:r>
             <a:r>
-              <a:rPr lang="en-US" dirty="0" smtClean="0"/>
+              <a:rPr lang="en-US" dirty="0"/>
               <a:t> Run</a:t>
             </a:r>
-            <a:endParaRPr lang="en-US" dirty="0"/>
           </a:p>
         </p:txBody>
       </p:sp>
@@ -5321,370 +5342,366 @@
               <a:buNone/>
             </a:pPr>
             <a:r>
-              <a:rPr lang="en-US" dirty="0" err="1" smtClean="0"/>
+              <a:rPr lang="en-US" dirty="0" err="1"/>
               <a:t>Bài</a:t>
             </a:r>
             <a:r>
-              <a:rPr lang="en-US" dirty="0" smtClean="0"/>
-              <a:t> </a:t>
-            </a:r>
-            <a:r>
-              <a:rPr lang="en-US" dirty="0" err="1" smtClean="0"/>
+              <a:rPr lang="en-US" dirty="0"/>
+              <a:t> </a:t>
+            </a:r>
+            <a:r>
+              <a:rPr lang="en-US" dirty="0" err="1"/>
               <a:t>toán</a:t>
             </a:r>
             <a:r>
-              <a:rPr lang="en-US" dirty="0" smtClean="0"/>
+              <a:rPr lang="en-US" dirty="0"/>
               <a:t>: </a:t>
             </a:r>
             <a:r>
-              <a:rPr lang="en-US" dirty="0" err="1" smtClean="0"/>
+              <a:rPr lang="en-US" dirty="0" err="1"/>
               <a:t>Sắp</a:t>
             </a:r>
             <a:r>
-              <a:rPr lang="en-US" dirty="0" smtClean="0"/>
-              <a:t> </a:t>
-            </a:r>
-            <a:r>
-              <a:rPr lang="en-US" dirty="0" err="1" smtClean="0"/>
+              <a:rPr lang="en-US" dirty="0"/>
+              <a:t> </a:t>
+            </a:r>
+            <a:r>
+              <a:rPr lang="en-US" dirty="0" err="1"/>
               <a:t>xếp</a:t>
             </a:r>
             <a:r>
-              <a:rPr lang="en-US" dirty="0" smtClean="0"/>
+              <a:rPr lang="en-US" dirty="0"/>
               <a:t> 900 MB </a:t>
             </a:r>
             <a:r>
-              <a:rPr lang="en-US" dirty="0" err="1" smtClean="0"/>
+              <a:rPr lang="en-US" dirty="0" err="1"/>
               <a:t>dữ</a:t>
             </a:r>
             <a:r>
-              <a:rPr lang="en-US" dirty="0" smtClean="0"/>
-              <a:t> </a:t>
-            </a:r>
-            <a:r>
-              <a:rPr lang="en-US" dirty="0" err="1" smtClean="0"/>
+              <a:rPr lang="en-US" dirty="0"/>
+              <a:t> </a:t>
+            </a:r>
+            <a:r>
+              <a:rPr lang="en-US" dirty="0" err="1"/>
               <a:t>liệu</a:t>
             </a:r>
             <a:r>
-              <a:rPr lang="en-US" dirty="0" smtClean="0"/>
-              <a:t> </a:t>
-            </a:r>
-            <a:r>
-              <a:rPr lang="en-US" dirty="0" err="1" smtClean="0"/>
+              <a:rPr lang="en-US" dirty="0"/>
+              <a:t> </a:t>
+            </a:r>
+            <a:r>
+              <a:rPr lang="en-US" dirty="0" err="1"/>
               <a:t>với</a:t>
             </a:r>
             <a:r>
-              <a:rPr lang="en-US" dirty="0" smtClean="0"/>
-              <a:t> </a:t>
-            </a:r>
-            <a:r>
-              <a:rPr lang="en-US" dirty="0" err="1" smtClean="0"/>
+              <a:rPr lang="en-US" dirty="0"/>
+              <a:t> </a:t>
+            </a:r>
+            <a:r>
+              <a:rPr lang="en-US" dirty="0" err="1"/>
               <a:t>run_size</a:t>
             </a:r>
             <a:r>
-              <a:rPr lang="en-US" dirty="0" smtClean="0"/>
-              <a:t> </a:t>
-            </a:r>
-            <a:r>
-              <a:rPr lang="en-US" dirty="0" err="1" smtClean="0"/>
+              <a:rPr lang="en-US" dirty="0"/>
+              <a:t> </a:t>
+            </a:r>
+            <a:r>
+              <a:rPr lang="en-US" dirty="0" err="1"/>
               <a:t>của</a:t>
             </a:r>
             <a:r>
-              <a:rPr lang="en-US" dirty="0" smtClean="0"/>
+              <a:rPr lang="en-US" dirty="0"/>
               <a:t> RAM </a:t>
             </a:r>
             <a:r>
-              <a:rPr lang="en-US" dirty="0" err="1" smtClean="0"/>
+              <a:rPr lang="en-US" dirty="0" err="1"/>
               <a:t>là</a:t>
             </a:r>
             <a:r>
-              <a:rPr lang="en-US" dirty="0" smtClean="0"/>
+              <a:rPr lang="en-US" dirty="0"/>
               <a:t> 100MB</a:t>
             </a:r>
           </a:p>
           <a:p>
             <a:r>
-              <a:rPr lang="en-US" dirty="0" err="1" smtClean="0"/>
+              <a:rPr lang="en-US" dirty="0" err="1"/>
               <a:t>Bước</a:t>
             </a:r>
             <a:r>
-              <a:rPr lang="en-US" dirty="0" smtClean="0"/>
+              <a:rPr lang="en-US" dirty="0"/>
               <a:t> 1: </a:t>
             </a:r>
             <a:r>
-              <a:rPr lang="en-US" dirty="0" err="1" smtClean="0"/>
+              <a:rPr lang="en-US" dirty="0" err="1"/>
               <a:t>Đọc</a:t>
             </a:r>
             <a:r>
-              <a:rPr lang="en-US" dirty="0" smtClean="0"/>
+              <a:rPr lang="en-US" dirty="0"/>
               <a:t> 100MB </a:t>
             </a:r>
             <a:r>
-              <a:rPr lang="en-US" dirty="0" err="1" smtClean="0"/>
+              <a:rPr lang="en-US" dirty="0" err="1"/>
               <a:t>dữ</a:t>
             </a:r>
             <a:r>
-              <a:rPr lang="en-US" dirty="0" smtClean="0"/>
-              <a:t> </a:t>
-            </a:r>
-            <a:r>
-              <a:rPr lang="en-US" dirty="0" err="1" smtClean="0"/>
+              <a:rPr lang="en-US" dirty="0"/>
+              <a:t> </a:t>
+            </a:r>
+            <a:r>
+              <a:rPr lang="en-US" dirty="0" err="1"/>
               <a:t>liệu</a:t>
             </a:r>
             <a:r>
-              <a:rPr lang="en-US" dirty="0" smtClean="0"/>
-              <a:t> </a:t>
-            </a:r>
-            <a:r>
-              <a:rPr lang="en-US" dirty="0" err="1" smtClean="0"/>
+              <a:rPr lang="en-US" dirty="0"/>
+              <a:t> </a:t>
+            </a:r>
+            <a:r>
+              <a:rPr lang="en-US" dirty="0" err="1"/>
               <a:t>trong</a:t>
             </a:r>
             <a:r>
-              <a:rPr lang="en-US" dirty="0" smtClean="0"/>
-              <a:t> </a:t>
-            </a:r>
-            <a:r>
-              <a:rPr lang="en-US" dirty="0" err="1" smtClean="0"/>
+              <a:rPr lang="en-US" dirty="0"/>
+              <a:t> </a:t>
+            </a:r>
+            <a:r>
+              <a:rPr lang="en-US" dirty="0" err="1"/>
               <a:t>bộ</a:t>
             </a:r>
             <a:r>
-              <a:rPr lang="en-US" dirty="0" smtClean="0"/>
-              <a:t> </a:t>
-            </a:r>
-            <a:r>
-              <a:rPr lang="en-US" dirty="0" err="1" smtClean="0"/>
+              <a:rPr lang="en-US" dirty="0"/>
+              <a:t> </a:t>
+            </a:r>
+            <a:r>
+              <a:rPr lang="en-US" dirty="0" err="1"/>
               <a:t>nhớ</a:t>
             </a:r>
             <a:r>
-              <a:rPr lang="en-US" dirty="0" smtClean="0"/>
-              <a:t> </a:t>
-            </a:r>
-            <a:r>
-              <a:rPr lang="en-US" dirty="0" err="1" smtClean="0"/>
+              <a:rPr lang="en-US" dirty="0"/>
+              <a:t> </a:t>
+            </a:r>
+            <a:r>
+              <a:rPr lang="en-US" dirty="0" err="1"/>
               <a:t>chính</a:t>
             </a:r>
-            <a:endParaRPr lang="en-US" dirty="0" smtClean="0"/>
-          </a:p>
-          <a:p>
-            <a:r>
-              <a:rPr lang="en-US" dirty="0" err="1" smtClean="0"/>
+            <a:endParaRPr lang="en-US" dirty="0"/>
+          </a:p>
+          <a:p>
+            <a:r>
+              <a:rPr lang="en-US" dirty="0" err="1"/>
               <a:t>Bước</a:t>
             </a:r>
             <a:r>
-              <a:rPr lang="en-US" dirty="0" smtClean="0"/>
+              <a:rPr lang="en-US" dirty="0"/>
               <a:t> 2: </a:t>
             </a:r>
             <a:r>
               <a:rPr lang="en-US" dirty="0" err="1"/>
-              <a:t>S</a:t>
-            </a:r>
-            <a:r>
-              <a:rPr lang="en-US" dirty="0" err="1" smtClean="0"/>
-              <a:t>ắp</a:t>
-            </a:r>
-            <a:r>
-              <a:rPr lang="en-US" dirty="0" smtClean="0"/>
-              <a:t> </a:t>
-            </a:r>
-            <a:r>
-              <a:rPr lang="en-US" dirty="0" err="1" smtClean="0"/>
+              <a:t>Sắp</a:t>
+            </a:r>
+            <a:r>
+              <a:rPr lang="en-US" dirty="0"/>
+              <a:t> </a:t>
+            </a:r>
+            <a:r>
+              <a:rPr lang="en-US" dirty="0" err="1"/>
               <a:t>xếp</a:t>
             </a:r>
             <a:r>
-              <a:rPr lang="en-US" dirty="0" smtClean="0"/>
-              <a:t> </a:t>
-            </a:r>
-            <a:r>
-              <a:rPr lang="en-US" dirty="0" err="1" smtClean="0"/>
+              <a:rPr lang="en-US" dirty="0"/>
+              <a:t> </a:t>
+            </a:r>
+            <a:r>
+              <a:rPr lang="en-US" dirty="0" err="1"/>
               <a:t>theo</a:t>
             </a:r>
             <a:r>
-              <a:rPr lang="en-US" dirty="0" smtClean="0"/>
-              <a:t> </a:t>
-            </a:r>
-            <a:r>
-              <a:rPr lang="en-US" dirty="0" err="1" smtClean="0"/>
+              <a:rPr lang="en-US" dirty="0"/>
+              <a:t> </a:t>
+            </a:r>
+            <a:r>
+              <a:rPr lang="en-US" dirty="0" err="1"/>
               <a:t>các</a:t>
             </a:r>
             <a:r>
-              <a:rPr lang="en-US" dirty="0" smtClean="0"/>
-              <a:t> </a:t>
-            </a:r>
-            <a:r>
-              <a:rPr lang="en-US" dirty="0" err="1" smtClean="0"/>
+              <a:rPr lang="en-US" dirty="0"/>
+              <a:t> </a:t>
+            </a:r>
+            <a:r>
+              <a:rPr lang="en-US" dirty="0" err="1"/>
               <a:t>thông</a:t>
             </a:r>
             <a:r>
-              <a:rPr lang="en-US" dirty="0" smtClean="0"/>
-              <a:t> </a:t>
-            </a:r>
-            <a:r>
-              <a:rPr lang="en-US" dirty="0" err="1" smtClean="0"/>
+              <a:rPr lang="en-US" dirty="0"/>
+              <a:t> </a:t>
+            </a:r>
+            <a:r>
+              <a:rPr lang="en-US" dirty="0" err="1"/>
               <a:t>thường</a:t>
             </a:r>
             <a:r>
-              <a:rPr lang="en-US" dirty="0" smtClean="0"/>
+              <a:rPr lang="en-US" dirty="0"/>
               <a:t> (VD: </a:t>
             </a:r>
             <a:r>
-              <a:rPr lang="en-US" dirty="0" err="1" smtClean="0"/>
+              <a:rPr lang="en-US" dirty="0" err="1"/>
               <a:t>dùng</a:t>
             </a:r>
             <a:r>
-              <a:rPr lang="en-US" dirty="0" smtClean="0"/>
+              <a:rPr lang="en-US" dirty="0"/>
               <a:t> quick sort)</a:t>
             </a:r>
           </a:p>
           <a:p>
             <a:r>
-              <a:rPr lang="en-US" dirty="0" err="1" smtClean="0"/>
+              <a:rPr lang="en-US" dirty="0" err="1"/>
               <a:t>Bước</a:t>
             </a:r>
             <a:r>
-              <a:rPr lang="en-US" dirty="0" smtClean="0"/>
+              <a:rPr lang="en-US" dirty="0"/>
               <a:t> 3: </a:t>
             </a:r>
             <a:r>
-              <a:rPr lang="en-US" dirty="0" err="1" smtClean="0"/>
+              <a:rPr lang="en-US" dirty="0" err="1"/>
               <a:t>Ghi</a:t>
             </a:r>
             <a:r>
-              <a:rPr lang="en-US" dirty="0" smtClean="0"/>
-              <a:t> </a:t>
-            </a:r>
-            <a:r>
-              <a:rPr lang="en-US" dirty="0" err="1" smtClean="0"/>
+              <a:rPr lang="en-US" dirty="0"/>
+              <a:t> </a:t>
+            </a:r>
+            <a:r>
+              <a:rPr lang="en-US" dirty="0" err="1"/>
               <a:t>dữ</a:t>
             </a:r>
             <a:r>
-              <a:rPr lang="en-US" dirty="0" smtClean="0"/>
-              <a:t> </a:t>
-            </a:r>
-            <a:r>
-              <a:rPr lang="en-US" dirty="0" err="1" smtClean="0"/>
+              <a:rPr lang="en-US" dirty="0"/>
+              <a:t> </a:t>
+            </a:r>
+            <a:r>
+              <a:rPr lang="en-US" dirty="0" err="1"/>
               <a:t>liệu</a:t>
             </a:r>
             <a:r>
-              <a:rPr lang="en-US" dirty="0" smtClean="0"/>
-              <a:t> </a:t>
-            </a:r>
-            <a:r>
-              <a:rPr lang="en-US" dirty="0" err="1" smtClean="0"/>
+              <a:rPr lang="en-US" dirty="0"/>
+              <a:t> </a:t>
+            </a:r>
+            <a:r>
+              <a:rPr lang="en-US" dirty="0" err="1"/>
               <a:t>đã</a:t>
             </a:r>
             <a:r>
-              <a:rPr lang="en-US" dirty="0" smtClean="0"/>
-              <a:t> </a:t>
-            </a:r>
-            <a:r>
-              <a:rPr lang="en-US" dirty="0" err="1" smtClean="0"/>
+              <a:rPr lang="en-US" dirty="0"/>
+              <a:t> </a:t>
+            </a:r>
+            <a:r>
+              <a:rPr lang="en-US" dirty="0" err="1"/>
               <a:t>sắp</a:t>
             </a:r>
             <a:r>
-              <a:rPr lang="en-US" dirty="0" smtClean="0"/>
-              <a:t> </a:t>
-            </a:r>
-            <a:r>
-              <a:rPr lang="en-US" dirty="0" err="1" smtClean="0"/>
+              <a:rPr lang="en-US" dirty="0"/>
+              <a:t> </a:t>
+            </a:r>
+            <a:r>
+              <a:rPr lang="en-US" dirty="0" err="1"/>
               <a:t>xếp</a:t>
             </a:r>
             <a:r>
-              <a:rPr lang="en-US" dirty="0" smtClean="0"/>
-              <a:t> </a:t>
-            </a:r>
-            <a:r>
-              <a:rPr lang="en-US" dirty="0" err="1" smtClean="0"/>
+              <a:rPr lang="en-US" dirty="0"/>
+              <a:t> </a:t>
+            </a:r>
+            <a:r>
+              <a:rPr lang="en-US" dirty="0" err="1"/>
               <a:t>vào</a:t>
             </a:r>
             <a:r>
-              <a:rPr lang="en-US" dirty="0" smtClean="0"/>
-              <a:t> </a:t>
-            </a:r>
-            <a:r>
-              <a:rPr lang="en-US" dirty="0" err="1" smtClean="0"/>
+              <a:rPr lang="en-US" dirty="0"/>
+              <a:t> </a:t>
+            </a:r>
+            <a:r>
+              <a:rPr lang="en-US" dirty="0" err="1"/>
               <a:t>bộ</a:t>
             </a:r>
             <a:r>
-              <a:rPr lang="en-US" dirty="0" smtClean="0"/>
-              <a:t> </a:t>
-            </a:r>
-            <a:r>
-              <a:rPr lang="en-US" dirty="0" err="1" smtClean="0"/>
+              <a:rPr lang="en-US" dirty="0"/>
+              <a:t> </a:t>
+            </a:r>
+            <a:r>
+              <a:rPr lang="en-US" dirty="0" err="1"/>
               <a:t>nhớ</a:t>
             </a:r>
             <a:r>
-              <a:rPr lang="en-US" dirty="0" smtClean="0"/>
-              <a:t> </a:t>
-            </a:r>
-            <a:r>
-              <a:rPr lang="en-US" dirty="0" err="1" smtClean="0"/>
+              <a:rPr lang="en-US" dirty="0"/>
+              <a:t> </a:t>
+            </a:r>
+            <a:r>
+              <a:rPr lang="en-US" dirty="0" err="1"/>
               <a:t>ngoài</a:t>
             </a:r>
             <a:r>
-              <a:rPr lang="en-US" dirty="0" smtClean="0"/>
+              <a:rPr lang="en-US" dirty="0"/>
               <a:t> (</a:t>
             </a:r>
             <a:r>
-              <a:rPr lang="en-US" dirty="0" err="1" smtClean="0"/>
+              <a:rPr lang="en-US" dirty="0" err="1"/>
               <a:t>gọi</a:t>
             </a:r>
             <a:r>
-              <a:rPr lang="en-US" dirty="0" smtClean="0"/>
-              <a:t> </a:t>
-            </a:r>
-            <a:r>
-              <a:rPr lang="en-US" dirty="0" err="1" smtClean="0"/>
+              <a:rPr lang="en-US" dirty="0"/>
+              <a:t> </a:t>
+            </a:r>
+            <a:r>
+              <a:rPr lang="en-US" dirty="0" err="1"/>
               <a:t>những</a:t>
             </a:r>
             <a:r>
-              <a:rPr lang="en-US" dirty="0" smtClean="0"/>
-              <a:t> </a:t>
-            </a:r>
-            <a:r>
-              <a:rPr lang="en-US" dirty="0" err="1" smtClean="0"/>
+              <a:rPr lang="en-US" dirty="0"/>
+              <a:t> </a:t>
+            </a:r>
+            <a:r>
+              <a:rPr lang="en-US" dirty="0" err="1"/>
               <a:t>phần</a:t>
             </a:r>
             <a:r>
-              <a:rPr lang="en-US" dirty="0" smtClean="0"/>
-              <a:t> </a:t>
-            </a:r>
-            <a:r>
-              <a:rPr lang="en-US" dirty="0" err="1" smtClean="0"/>
+              <a:rPr lang="en-US" dirty="0"/>
+              <a:t> </a:t>
+            </a:r>
+            <a:r>
+              <a:rPr lang="en-US" dirty="0" err="1"/>
               <a:t>dữ</a:t>
             </a:r>
             <a:r>
-              <a:rPr lang="en-US" dirty="0" smtClean="0"/>
-              <a:t> </a:t>
-            </a:r>
-            <a:r>
-              <a:rPr lang="en-US" dirty="0" err="1" smtClean="0"/>
+              <a:rPr lang="en-US" dirty="0"/>
+              <a:t> </a:t>
+            </a:r>
+            <a:r>
+              <a:rPr lang="en-US" dirty="0" err="1"/>
               <a:t>liệu</a:t>
             </a:r>
             <a:r>
-              <a:rPr lang="en-US" dirty="0" smtClean="0"/>
-              <a:t> </a:t>
-            </a:r>
-            <a:r>
-              <a:rPr lang="en-US" dirty="0" err="1" smtClean="0"/>
+              <a:rPr lang="en-US" dirty="0"/>
+              <a:t> </a:t>
+            </a:r>
+            <a:r>
+              <a:rPr lang="en-US" dirty="0" err="1"/>
               <a:t>nhỏ</a:t>
             </a:r>
             <a:r>
-              <a:rPr lang="en-US" dirty="0" smtClean="0"/>
-              <a:t> </a:t>
-            </a:r>
-            <a:r>
-              <a:rPr lang="en-US" dirty="0" err="1" smtClean="0"/>
+              <a:rPr lang="en-US" dirty="0"/>
+              <a:t> </a:t>
+            </a:r>
+            <a:r>
+              <a:rPr lang="en-US" dirty="0" err="1"/>
               <a:t>đó</a:t>
             </a:r>
             <a:r>
-              <a:rPr lang="en-US" dirty="0" smtClean="0"/>
-              <a:t> </a:t>
-            </a:r>
-            <a:r>
-              <a:rPr lang="en-US" dirty="0" err="1" smtClean="0"/>
+              <a:rPr lang="en-US" dirty="0"/>
+              <a:t> </a:t>
+            </a:r>
+            <a:r>
+              <a:rPr lang="en-US" dirty="0" err="1"/>
               <a:t>là</a:t>
             </a:r>
             <a:r>
-              <a:rPr lang="en-US" dirty="0" smtClean="0"/>
+              <a:rPr lang="en-US" dirty="0"/>
               <a:t> runs)</a:t>
             </a:r>
           </a:p>
@@ -5693,83 +5710,83 @@
               <a:buNone/>
             </a:pPr>
             <a:r>
-              <a:rPr lang="en-US" dirty="0" err="1" smtClean="0"/>
+              <a:rPr lang="en-US" dirty="0" err="1"/>
               <a:t>Lặp</a:t>
             </a:r>
             <a:r>
-              <a:rPr lang="en-US" dirty="0" smtClean="0"/>
-              <a:t> </a:t>
-            </a:r>
-            <a:r>
-              <a:rPr lang="en-US" dirty="0" err="1" smtClean="0"/>
+              <a:rPr lang="en-US" dirty="0"/>
+              <a:t> </a:t>
+            </a:r>
+            <a:r>
+              <a:rPr lang="en-US" dirty="0" err="1"/>
               <a:t>lại</a:t>
             </a:r>
             <a:r>
-              <a:rPr lang="en-US" dirty="0" smtClean="0"/>
-              <a:t> </a:t>
-            </a:r>
-            <a:r>
-              <a:rPr lang="en-US" dirty="0" err="1" smtClean="0"/>
+              <a:rPr lang="en-US" dirty="0"/>
+              <a:t> </a:t>
+            </a:r>
+            <a:r>
+              <a:rPr lang="en-US" dirty="0" err="1"/>
               <a:t>cho</a:t>
             </a:r>
             <a:r>
-              <a:rPr lang="en-US" dirty="0" smtClean="0"/>
-              <a:t> </a:t>
-            </a:r>
-            <a:r>
-              <a:rPr lang="en-US" dirty="0" err="1" smtClean="0"/>
+              <a:rPr lang="en-US" dirty="0"/>
+              <a:t> </a:t>
+            </a:r>
+            <a:r>
+              <a:rPr lang="en-US" dirty="0" err="1"/>
               <a:t>đến</a:t>
             </a:r>
             <a:r>
-              <a:rPr lang="en-US" dirty="0" smtClean="0"/>
-              <a:t> </a:t>
-            </a:r>
-            <a:r>
-              <a:rPr lang="en-US" dirty="0" err="1" smtClean="0"/>
+              <a:rPr lang="en-US" dirty="0"/>
+              <a:t> </a:t>
+            </a:r>
+            <a:r>
+              <a:rPr lang="en-US" dirty="0" err="1"/>
               <a:t>khi</a:t>
             </a:r>
             <a:r>
-              <a:rPr lang="en-US" dirty="0" smtClean="0"/>
-              <a:t> </a:t>
-            </a:r>
-            <a:r>
-              <a:rPr lang="en-US" dirty="0" err="1" smtClean="0"/>
+              <a:rPr lang="en-US" dirty="0"/>
+              <a:t> </a:t>
+            </a:r>
+            <a:r>
+              <a:rPr lang="en-US" dirty="0" err="1"/>
               <a:t>hết</a:t>
             </a:r>
             <a:r>
-              <a:rPr lang="en-US" dirty="0" smtClean="0"/>
+              <a:rPr lang="en-US" dirty="0"/>
               <a:t> 900MB </a:t>
             </a:r>
             <a:r>
-              <a:rPr lang="en-US" dirty="0" err="1" smtClean="0"/>
+              <a:rPr lang="en-US" dirty="0" err="1"/>
               <a:t>dữ</a:t>
             </a:r>
             <a:r>
-              <a:rPr lang="en-US" dirty="0" smtClean="0"/>
-              <a:t> </a:t>
-            </a:r>
-            <a:r>
-              <a:rPr lang="en-US" dirty="0" err="1" smtClean="0"/>
+              <a:rPr lang="en-US" dirty="0"/>
+              <a:t> </a:t>
+            </a:r>
+            <a:r>
+              <a:rPr lang="en-US" dirty="0" err="1"/>
               <a:t>liệu</a:t>
             </a:r>
             <a:r>
-              <a:rPr lang="en-US" dirty="0" smtClean="0"/>
+              <a:rPr lang="en-US" dirty="0"/>
               <a:t>, ta </a:t>
             </a:r>
             <a:r>
-              <a:rPr lang="en-US" dirty="0" err="1" smtClean="0"/>
+              <a:rPr lang="en-US" dirty="0" err="1"/>
               <a:t>có</a:t>
             </a:r>
             <a:r>
-              <a:rPr lang="en-US" dirty="0" smtClean="0"/>
-              <a:t> </a:t>
-            </a:r>
-            <a:r>
-              <a:rPr lang="en-US" dirty="0" err="1" smtClean="0"/>
+              <a:rPr lang="en-US" dirty="0"/>
+              <a:t> </a:t>
+            </a:r>
+            <a:r>
+              <a:rPr lang="en-US" dirty="0" err="1"/>
               <a:t>được</a:t>
             </a:r>
             <a:r>
-              <a:rPr lang="en-US" dirty="0" smtClean="0"/>
+              <a:rPr lang="en-US" dirty="0"/>
               <a:t> 9 chunks.</a:t>
             </a:r>
           </a:p>
@@ -5821,70 +5838,69 @@
           <a:lstStyle/>
           <a:p>
             <a:r>
-              <a:rPr lang="en-US" dirty="0" err="1" smtClean="0"/>
+              <a:rPr lang="en-US" dirty="0" err="1"/>
               <a:t>Mô</a:t>
             </a:r>
             <a:r>
-              <a:rPr lang="en-US" dirty="0" smtClean="0"/>
-              <a:t> </a:t>
-            </a:r>
-            <a:r>
-              <a:rPr lang="en-US" dirty="0" err="1" smtClean="0"/>
+              <a:rPr lang="en-US" dirty="0"/>
+              <a:t> </a:t>
+            </a:r>
+            <a:r>
+              <a:rPr lang="en-US" dirty="0" err="1"/>
               <a:t>tả</a:t>
             </a:r>
             <a:r>
-              <a:rPr lang="en-US" dirty="0" smtClean="0"/>
-              <a:t> </a:t>
-            </a:r>
-            <a:r>
-              <a:rPr lang="en-US" dirty="0" err="1" smtClean="0"/>
+              <a:rPr lang="en-US" dirty="0"/>
+              <a:t> </a:t>
+            </a:r>
+            <a:r>
+              <a:rPr lang="en-US" dirty="0" err="1"/>
               <a:t>thuật</a:t>
             </a:r>
             <a:r>
-              <a:rPr lang="en-US" dirty="0" smtClean="0"/>
-              <a:t> </a:t>
-            </a:r>
-            <a:r>
-              <a:rPr lang="en-US" dirty="0" err="1" smtClean="0"/>
+              <a:rPr lang="en-US" dirty="0"/>
+              <a:t> </a:t>
+            </a:r>
+            <a:r>
+              <a:rPr lang="en-US" dirty="0" err="1"/>
               <a:t>toán</a:t>
             </a:r>
             <a:r>
-              <a:rPr lang="en-US" dirty="0" smtClean="0"/>
-              <a:t> </a:t>
-            </a:r>
-            <a:r>
-              <a:rPr lang="en-US" dirty="0" err="1" smtClean="0"/>
+              <a:rPr lang="en-US" dirty="0"/>
+              <a:t> </a:t>
+            </a:r>
+            <a:r>
+              <a:rPr lang="en-US" dirty="0" err="1"/>
               <a:t>bằng</a:t>
             </a:r>
             <a:r>
-              <a:rPr lang="en-US" dirty="0" smtClean="0"/>
-              <a:t> </a:t>
-            </a:r>
-            <a:r>
-              <a:rPr lang="en-US" dirty="0" err="1" smtClean="0"/>
+              <a:rPr lang="en-US" dirty="0"/>
+              <a:t> </a:t>
+            </a:r>
+            <a:r>
+              <a:rPr lang="en-US" dirty="0" err="1"/>
               <a:t>phương</a:t>
             </a:r>
             <a:r>
-              <a:rPr lang="en-US" dirty="0" smtClean="0"/>
-              <a:t> </a:t>
-            </a:r>
-            <a:r>
-              <a:rPr lang="en-US" dirty="0" err="1" smtClean="0"/>
+              <a:rPr lang="en-US" dirty="0"/>
+              <a:t> </a:t>
+            </a:r>
+            <a:r>
+              <a:rPr lang="en-US" dirty="0" err="1"/>
               <a:t>pháp</a:t>
             </a:r>
             <a:r>
-              <a:rPr lang="en-US" dirty="0" smtClean="0"/>
-              <a:t> </a:t>
-            </a:r>
-            <a:r>
-              <a:rPr lang="en-US" dirty="0" err="1" smtClean="0"/>
+              <a:rPr lang="en-US" dirty="0"/>
+              <a:t> </a:t>
+            </a:r>
+            <a:r>
+              <a:rPr lang="en-US" dirty="0" err="1"/>
               <a:t>trộn</a:t>
             </a:r>
             <a:r>
-              <a:rPr lang="en-US" dirty="0" smtClean="0"/>
+              <a:rPr lang="en-US" dirty="0"/>
               <a:t> Run</a:t>
             </a:r>
-            <a:endParaRPr lang="en-US" dirty="0"/>
           </a:p>
         </p:txBody>
       </p:sp>
@@ -5904,7 +5920,7 @@
           <a:lstStyle/>
           <a:p>
             <a:r>
-              <a:rPr lang="en-US" dirty="0" err="1" smtClean="0">
+              <a:rPr lang="en-US" dirty="0" err="1">
                 <a:latin typeface="Calibri" pitchFamily="34" charset="0"/>
                 <a:ea typeface="Calibri" pitchFamily="34" charset="0"/>
                 <a:cs typeface="Calibri" pitchFamily="34" charset="0"/>
@@ -5912,7 +5928,7 @@
               <a:t>Bước</a:t>
             </a:r>
             <a:r>
-              <a:rPr lang="en-US" dirty="0" smtClean="0">
+              <a:rPr lang="en-US" dirty="0">
                 <a:latin typeface="Calibri" pitchFamily="34" charset="0"/>
                 <a:ea typeface="Calibri" pitchFamily="34" charset="0"/>
                 <a:cs typeface="Calibri" pitchFamily="34" charset="0"/>
@@ -5920,7 +5936,7 @@
               <a:t> 4: </a:t>
             </a:r>
             <a:r>
-              <a:rPr lang="en-US" dirty="0" err="1" smtClean="0">
+              <a:rPr lang="en-US" dirty="0" err="1">
                 <a:latin typeface="Calibri" pitchFamily="34" charset="0"/>
                 <a:ea typeface="Calibri" pitchFamily="34" charset="0"/>
                 <a:cs typeface="Calibri" pitchFamily="34" charset="0"/>
@@ -5928,7 +5944,7 @@
               <a:t>Sau</a:t>
             </a:r>
             <a:r>
-              <a:rPr lang="en-US" dirty="0" smtClean="0">
+              <a:rPr lang="en-US" dirty="0">
                 <a:latin typeface="Calibri" pitchFamily="34" charset="0"/>
                 <a:ea typeface="Calibri" pitchFamily="34" charset="0"/>
                 <a:cs typeface="Calibri" pitchFamily="34" charset="0"/>
@@ -5936,7 +5952,7 @@
               <a:t> </a:t>
             </a:r>
             <a:r>
-              <a:rPr lang="en-US" dirty="0" err="1" smtClean="0">
+              <a:rPr lang="en-US" dirty="0" err="1">
                 <a:latin typeface="Calibri" pitchFamily="34" charset="0"/>
                 <a:ea typeface="Calibri" pitchFamily="34" charset="0"/>
                 <a:cs typeface="Calibri" pitchFamily="34" charset="0"/>
@@ -5944,7 +5960,7 @@
               <a:t>khi</a:t>
             </a:r>
             <a:r>
-              <a:rPr lang="en-US" dirty="0" smtClean="0">
+              <a:rPr lang="en-US" dirty="0">
                 <a:latin typeface="Calibri" pitchFamily="34" charset="0"/>
                 <a:ea typeface="Calibri" pitchFamily="34" charset="0"/>
                 <a:cs typeface="Calibri" pitchFamily="34" charset="0"/>
@@ -5952,7 +5968,7 @@
               <a:t> </a:t>
             </a:r>
             <a:r>
-              <a:rPr lang="en-US" dirty="0" err="1" smtClean="0">
+              <a:rPr lang="en-US" dirty="0" err="1">
                 <a:latin typeface="Calibri" pitchFamily="34" charset="0"/>
                 <a:ea typeface="Calibri" pitchFamily="34" charset="0"/>
                 <a:cs typeface="Calibri" pitchFamily="34" charset="0"/>
@@ -5960,7 +5976,7 @@
               <a:t>có</a:t>
             </a:r>
             <a:r>
-              <a:rPr lang="en-US" dirty="0" smtClean="0">
+              <a:rPr lang="en-US" dirty="0">
                 <a:latin typeface="Calibri" pitchFamily="34" charset="0"/>
                 <a:ea typeface="Calibri" pitchFamily="34" charset="0"/>
                 <a:cs typeface="Calibri" pitchFamily="34" charset="0"/>
@@ -5968,7 +5984,7 @@
               <a:t> </a:t>
             </a:r>
             <a:r>
-              <a:rPr lang="en-US" dirty="0" err="1" smtClean="0">
+              <a:rPr lang="en-US" dirty="0" err="1">
                 <a:latin typeface="Calibri" pitchFamily="34" charset="0"/>
                 <a:ea typeface="Calibri" pitchFamily="34" charset="0"/>
                 <a:cs typeface="Calibri" pitchFamily="34" charset="0"/>
@@ -5976,7 +5992,7 @@
               <a:t>các</a:t>
             </a:r>
             <a:r>
-              <a:rPr lang="en-US" dirty="0" smtClean="0">
+              <a:rPr lang="en-US" dirty="0">
                 <a:latin typeface="Calibri" pitchFamily="34" charset="0"/>
                 <a:ea typeface="Calibri" pitchFamily="34" charset="0"/>
                 <a:cs typeface="Calibri" pitchFamily="34" charset="0"/>
@@ -5984,7 +6000,7 @@
               <a:t> runs, </a:t>
             </a:r>
             <a:r>
-              <a:rPr lang="en-US" dirty="0" err="1" smtClean="0">
+              <a:rPr lang="en-US" dirty="0" err="1">
                 <a:latin typeface="Calibri" pitchFamily="34" charset="0"/>
                 <a:ea typeface="Calibri" pitchFamily="34" charset="0"/>
                 <a:cs typeface="Calibri" pitchFamily="34" charset="0"/>
@@ -5992,7 +6008,7 @@
               <a:t>chúng</a:t>
             </a:r>
             <a:r>
-              <a:rPr lang="en-US" dirty="0" smtClean="0">
+              <a:rPr lang="en-US" dirty="0">
                 <a:latin typeface="Calibri" pitchFamily="34" charset="0"/>
                 <a:ea typeface="Calibri" pitchFamily="34" charset="0"/>
                 <a:cs typeface="Calibri" pitchFamily="34" charset="0"/>
@@ -6000,7 +6016,7 @@
               <a:t> ta </a:t>
             </a:r>
             <a:r>
-              <a:rPr lang="en-US" dirty="0" err="1" smtClean="0">
+              <a:rPr lang="en-US" dirty="0" err="1">
                 <a:latin typeface="Calibri" pitchFamily="34" charset="0"/>
                 <a:ea typeface="Calibri" pitchFamily="34" charset="0"/>
                 <a:cs typeface="Calibri" pitchFamily="34" charset="0"/>
@@ -6008,7 +6024,7 @@
               <a:t>dùng</a:t>
             </a:r>
             <a:r>
-              <a:rPr lang="en-US" dirty="0" smtClean="0">
+              <a:rPr lang="en-US" dirty="0">
                 <a:latin typeface="Calibri" pitchFamily="34" charset="0"/>
                 <a:ea typeface="Calibri" pitchFamily="34" charset="0"/>
                 <a:cs typeface="Calibri" pitchFamily="34" charset="0"/>
@@ -6016,7 +6032,7 @@
               <a:t> Merge Sort </a:t>
             </a:r>
             <a:r>
-              <a:rPr lang="en-US" dirty="0" err="1" smtClean="0">
+              <a:rPr lang="en-US" dirty="0" err="1">
                 <a:latin typeface="Calibri" pitchFamily="34" charset="0"/>
                 <a:ea typeface="Calibri" pitchFamily="34" charset="0"/>
                 <a:cs typeface="Calibri" pitchFamily="34" charset="0"/>
@@ -6024,7 +6040,7 @@
               <a:t>để</a:t>
             </a:r>
             <a:r>
-              <a:rPr lang="en-US" dirty="0" smtClean="0">
+              <a:rPr lang="en-US" dirty="0">
                 <a:latin typeface="Calibri" pitchFamily="34" charset="0"/>
                 <a:ea typeface="Calibri" pitchFamily="34" charset="0"/>
                 <a:cs typeface="Calibri" pitchFamily="34" charset="0"/>
@@ -6032,7 +6048,7 @@
               <a:t> </a:t>
             </a:r>
             <a:r>
-              <a:rPr lang="en-US" dirty="0" err="1" smtClean="0">
+              <a:rPr lang="en-US" dirty="0" err="1">
                 <a:latin typeface="Calibri" pitchFamily="34" charset="0"/>
                 <a:ea typeface="Calibri" pitchFamily="34" charset="0"/>
                 <a:cs typeface="Calibri" pitchFamily="34" charset="0"/>
@@ -6040,7 +6056,7 @@
               <a:t>trộn</a:t>
             </a:r>
             <a:r>
-              <a:rPr lang="en-US" dirty="0" smtClean="0">
+              <a:rPr lang="en-US" dirty="0">
                 <a:latin typeface="Calibri" pitchFamily="34" charset="0"/>
                 <a:ea typeface="Calibri" pitchFamily="34" charset="0"/>
                 <a:cs typeface="Calibri" pitchFamily="34" charset="0"/>
@@ -6048,7 +6064,7 @@
               <a:t> </a:t>
             </a:r>
             <a:r>
-              <a:rPr lang="en-US" dirty="0" err="1" smtClean="0">
+              <a:rPr lang="en-US" dirty="0" err="1">
                 <a:latin typeface="Calibri" pitchFamily="34" charset="0"/>
                 <a:ea typeface="Calibri" pitchFamily="34" charset="0"/>
                 <a:cs typeface="Calibri" pitchFamily="34" charset="0"/>
@@ -6056,7 +6072,7 @@
               <a:t>các</a:t>
             </a:r>
             <a:r>
-              <a:rPr lang="en-US" dirty="0" smtClean="0">
+              <a:rPr lang="en-US" dirty="0">
                 <a:latin typeface="Calibri" pitchFamily="34" charset="0"/>
                 <a:ea typeface="Calibri" pitchFamily="34" charset="0"/>
                 <a:cs typeface="Calibri" pitchFamily="34" charset="0"/>
@@ -6064,7 +6080,7 @@
               <a:t> runs </a:t>
             </a:r>
             <a:r>
-              <a:rPr lang="en-US" dirty="0" err="1" smtClean="0">
+              <a:rPr lang="en-US" dirty="0" err="1">
                 <a:latin typeface="Calibri" pitchFamily="34" charset="0"/>
                 <a:ea typeface="Calibri" pitchFamily="34" charset="0"/>
                 <a:cs typeface="Calibri" pitchFamily="34" charset="0"/>
@@ -6072,7 +6088,7 @@
               <a:t>lại</a:t>
             </a:r>
             <a:r>
-              <a:rPr lang="en-US" dirty="0" smtClean="0">
+              <a:rPr lang="en-US" dirty="0">
                 <a:latin typeface="Calibri" pitchFamily="34" charset="0"/>
                 <a:ea typeface="Calibri" pitchFamily="34" charset="0"/>
                 <a:cs typeface="Calibri" pitchFamily="34" charset="0"/>
@@ -6088,7 +6104,7 @@
               <a:t>Mỗi lần trộn chúng ta sẽ đưa vào </a:t>
             </a:r>
             <a:r>
-              <a:rPr lang="en-US" dirty="0" err="1" smtClean="0">
+              <a:rPr lang="en-US" dirty="0" err="1">
                 <a:latin typeface="Calibri" pitchFamily="34" charset="0"/>
                 <a:ea typeface="Calibri" pitchFamily="34" charset="0"/>
                 <a:cs typeface="Calibri" pitchFamily="34" charset="0"/>
@@ -6096,7 +6112,7 @@
               <a:t>hai</a:t>
             </a:r>
             <a:r>
-              <a:rPr lang="vi-VN" dirty="0" smtClean="0">
+              <a:rPr lang="vi-VN" dirty="0">
                 <a:latin typeface="Calibri" pitchFamily="34" charset="0"/>
                 <a:ea typeface="Calibri" pitchFamily="34" charset="0"/>
                 <a:cs typeface="Calibri" pitchFamily="34" charset="0"/>
@@ -6104,7 +6120,7 @@
               <a:t> </a:t>
             </a:r>
             <a:r>
-              <a:rPr lang="en-US" dirty="0" smtClean="0">
+              <a:rPr lang="en-US" dirty="0">
                 <a:latin typeface="Calibri" pitchFamily="34" charset="0"/>
                 <a:ea typeface="Calibri" pitchFamily="34" charset="0"/>
                 <a:cs typeface="Calibri" pitchFamily="34" charset="0"/>
@@ -6112,22 +6128,14 @@
               <a:t>r</a:t>
             </a:r>
             <a:r>
-              <a:rPr lang="vi-VN" dirty="0" smtClean="0">
-                <a:latin typeface="Calibri" pitchFamily="34" charset="0"/>
-                <a:ea typeface="Calibri" pitchFamily="34" charset="0"/>
-                <a:cs typeface="Calibri" pitchFamily="34" charset="0"/>
-              </a:rPr>
-              <a:t>uns </a:t>
-            </a:r>
-            <a:r>
               <a:rPr lang="vi-VN" dirty="0">
                 <a:latin typeface="Calibri" pitchFamily="34" charset="0"/>
                 <a:ea typeface="Calibri" pitchFamily="34" charset="0"/>
                 <a:cs typeface="Calibri" pitchFamily="34" charset="0"/>
               </a:rPr>
-              <a:t>sau khi trộn sẽ ghi ra bộ nhớ phụ. </a:t>
-            </a:r>
-            <a:endParaRPr lang="en-US" dirty="0" smtClean="0">
+              <a:t>uns sau khi trộn sẽ ghi ra bộ nhớ phụ. </a:t>
+            </a:r>
+            <a:endParaRPr lang="en-US" dirty="0">
               <a:latin typeface="Calibri" pitchFamily="34" charset="0"/>
               <a:ea typeface="Calibri" pitchFamily="34" charset="0"/>
               <a:cs typeface="Calibri" pitchFamily="34" charset="0"/>
@@ -6137,24 +6145,16 @@
             <a:pPr marL="0" indent="0">
               <a:buNone/>
             </a:pPr>
-            <a:r>
-              <a:rPr lang="vi-VN" dirty="0" smtClean="0">
-                <a:latin typeface="Calibri" pitchFamily="34" charset="0"/>
-                <a:ea typeface="Calibri" pitchFamily="34" charset="0"/>
-                <a:cs typeface="Calibri" pitchFamily="34" charset="0"/>
-              </a:rPr>
-              <a:t>Quá </a:t>
-            </a:r>
             <a:r>
               <a:rPr lang="vi-VN" dirty="0">
                 <a:latin typeface="Calibri" pitchFamily="34" charset="0"/>
                 <a:ea typeface="Calibri" pitchFamily="34" charset="0"/>
                 <a:cs typeface="Calibri" pitchFamily="34" charset="0"/>
               </a:rPr>
-              <a:t>trình này lập lại cho đến khi trong bộ nhớ phụ chỉ còn một </a:t>
-            </a:r>
-            <a:r>
-              <a:rPr lang="en-US" dirty="0" smtClean="0">
+              <a:t>Quá trình này lập lại cho đến khi trong bộ nhớ phụ chỉ còn một </a:t>
+            </a:r>
+            <a:r>
+              <a:rPr lang="en-US" dirty="0">
                 <a:latin typeface="Calibri" pitchFamily="34" charset="0"/>
                 <a:ea typeface="Calibri" pitchFamily="34" charset="0"/>
                 <a:cs typeface="Calibri" pitchFamily="34" charset="0"/>
@@ -6162,23 +6162,15 @@
               <a:t>runs</a:t>
             </a:r>
             <a:r>
-              <a:rPr lang="vi-VN" dirty="0" smtClean="0">
-                <a:latin typeface="Calibri" pitchFamily="34" charset="0"/>
-                <a:ea typeface="Calibri" pitchFamily="34" charset="0"/>
-                <a:cs typeface="Calibri" pitchFamily="34" charset="0"/>
-              </a:rPr>
-              <a:t> </a:t>
-            </a:r>
-            <a:r>
               <a:rPr lang="vi-VN" dirty="0">
                 <a:latin typeface="Calibri" pitchFamily="34" charset="0"/>
                 <a:ea typeface="Calibri" pitchFamily="34" charset="0"/>
                 <a:cs typeface="Calibri" pitchFamily="34" charset="0"/>
               </a:rPr>
-              <a:t>duy nhất. </a:t>
-            </a:r>
-            <a:r>
-              <a:rPr lang="en-US" dirty="0" err="1" smtClean="0">
+              <a:t> duy nhất. </a:t>
+            </a:r>
+            <a:r>
+              <a:rPr lang="en-US" dirty="0" err="1">
                 <a:latin typeface="Calibri" pitchFamily="34" charset="0"/>
                 <a:ea typeface="Calibri" pitchFamily="34" charset="0"/>
                 <a:cs typeface="Calibri" pitchFamily="34" charset="0"/>
@@ -6186,7 +6178,7 @@
               <a:t>Kết</a:t>
             </a:r>
             <a:r>
-              <a:rPr lang="en-US" dirty="0" smtClean="0">
+              <a:rPr lang="en-US" dirty="0">
                 <a:latin typeface="Calibri" pitchFamily="34" charset="0"/>
                 <a:ea typeface="Calibri" pitchFamily="34" charset="0"/>
                 <a:cs typeface="Calibri" pitchFamily="34" charset="0"/>
@@ -6194,7 +6186,7 @@
               <a:t> </a:t>
             </a:r>
             <a:r>
-              <a:rPr lang="en-US" dirty="0" err="1" smtClean="0">
+              <a:rPr lang="en-US" dirty="0" err="1">
                 <a:latin typeface="Calibri" pitchFamily="34" charset="0"/>
                 <a:ea typeface="Calibri" pitchFamily="34" charset="0"/>
                 <a:cs typeface="Calibri" pitchFamily="34" charset="0"/>
@@ -6202,7 +6194,7 @@
               <a:t>quả</a:t>
             </a:r>
             <a:r>
-              <a:rPr lang="en-US" dirty="0" smtClean="0">
+              <a:rPr lang="en-US" dirty="0">
                 <a:latin typeface="Calibri" pitchFamily="34" charset="0"/>
                 <a:ea typeface="Calibri" pitchFamily="34" charset="0"/>
                 <a:cs typeface="Calibri" pitchFamily="34" charset="0"/>
@@ -6210,7 +6202,7 @@
               <a:t> ta </a:t>
             </a:r>
             <a:r>
-              <a:rPr lang="en-US" dirty="0" err="1" smtClean="0">
+              <a:rPr lang="en-US" dirty="0" err="1">
                 <a:latin typeface="Calibri" pitchFamily="34" charset="0"/>
                 <a:ea typeface="Calibri" pitchFamily="34" charset="0"/>
                 <a:cs typeface="Calibri" pitchFamily="34" charset="0"/>
@@ -6218,7 +6210,7 @@
               <a:t>sẽ</a:t>
             </a:r>
             <a:r>
-              <a:rPr lang="en-US" dirty="0" smtClean="0">
+              <a:rPr lang="en-US" dirty="0">
                 <a:latin typeface="Calibri" pitchFamily="34" charset="0"/>
                 <a:ea typeface="Calibri" pitchFamily="34" charset="0"/>
                 <a:cs typeface="Calibri" pitchFamily="34" charset="0"/>
@@ -6226,7 +6218,7 @@
               <a:t> </a:t>
             </a:r>
             <a:r>
-              <a:rPr lang="en-US" dirty="0" err="1" smtClean="0">
+              <a:rPr lang="en-US" dirty="0" err="1">
                 <a:latin typeface="Calibri" pitchFamily="34" charset="0"/>
                 <a:ea typeface="Calibri" pitchFamily="34" charset="0"/>
                 <a:cs typeface="Calibri" pitchFamily="34" charset="0"/>
@@ -6234,7 +6226,7 @@
               <a:t>được</a:t>
             </a:r>
             <a:r>
-              <a:rPr lang="en-US" dirty="0" smtClean="0">
+              <a:rPr lang="en-US" dirty="0">
                 <a:latin typeface="Calibri" pitchFamily="34" charset="0"/>
                 <a:ea typeface="Calibri" pitchFamily="34" charset="0"/>
                 <a:cs typeface="Calibri" pitchFamily="34" charset="0"/>
@@ -6242,7 +6234,7 @@
               <a:t> </a:t>
             </a:r>
             <a:r>
-              <a:rPr lang="en-US" dirty="0" err="1" smtClean="0">
+              <a:rPr lang="en-US" dirty="0" err="1">
                 <a:latin typeface="Calibri" pitchFamily="34" charset="0"/>
                 <a:ea typeface="Calibri" pitchFamily="34" charset="0"/>
                 <a:cs typeface="Calibri" pitchFamily="34" charset="0"/>
@@ -6250,7 +6242,7 @@
               <a:t>một</a:t>
             </a:r>
             <a:r>
-              <a:rPr lang="en-US" dirty="0" smtClean="0">
+              <a:rPr lang="en-US" dirty="0">
                 <a:latin typeface="Calibri" pitchFamily="34" charset="0"/>
                 <a:ea typeface="Calibri" pitchFamily="34" charset="0"/>
                 <a:cs typeface="Calibri" pitchFamily="34" charset="0"/>
@@ -6258,7 +6250,7 @@
               <a:t> </a:t>
             </a:r>
             <a:r>
-              <a:rPr lang="en-US" dirty="0" err="1" smtClean="0">
+              <a:rPr lang="en-US" dirty="0" err="1">
                 <a:latin typeface="Calibri" pitchFamily="34" charset="0"/>
                 <a:ea typeface="Calibri" pitchFamily="34" charset="0"/>
                 <a:cs typeface="Calibri" pitchFamily="34" charset="0"/>
@@ -6266,7 +6258,7 @@
               <a:t>dữ</a:t>
             </a:r>
             <a:r>
-              <a:rPr lang="en-US" dirty="0" smtClean="0">
+              <a:rPr lang="en-US" dirty="0">
                 <a:latin typeface="Calibri" pitchFamily="34" charset="0"/>
                 <a:ea typeface="Calibri" pitchFamily="34" charset="0"/>
                 <a:cs typeface="Calibri" pitchFamily="34" charset="0"/>
@@ -6274,7 +6266,7 @@
               <a:t> </a:t>
             </a:r>
             <a:r>
-              <a:rPr lang="en-US" dirty="0" err="1" smtClean="0">
+              <a:rPr lang="en-US" dirty="0" err="1">
                 <a:latin typeface="Calibri" pitchFamily="34" charset="0"/>
                 <a:ea typeface="Calibri" pitchFamily="34" charset="0"/>
                 <a:cs typeface="Calibri" pitchFamily="34" charset="0"/>
@@ -6282,7 +6274,7 @@
               <a:t>liệu</a:t>
             </a:r>
             <a:r>
-              <a:rPr lang="en-US" dirty="0" smtClean="0">
+              <a:rPr lang="en-US" dirty="0">
                 <a:latin typeface="Calibri" pitchFamily="34" charset="0"/>
                 <a:ea typeface="Calibri" pitchFamily="34" charset="0"/>
                 <a:cs typeface="Calibri" pitchFamily="34" charset="0"/>
@@ -6290,7 +6282,7 @@
               <a:t> </a:t>
             </a:r>
             <a:r>
-              <a:rPr lang="en-US" dirty="0" err="1" smtClean="0">
+              <a:rPr lang="en-US" dirty="0" err="1">
                 <a:latin typeface="Calibri" pitchFamily="34" charset="0"/>
                 <a:ea typeface="Calibri" pitchFamily="34" charset="0"/>
                 <a:cs typeface="Calibri" pitchFamily="34" charset="0"/>
@@ -6298,7 +6290,7 @@
               <a:t>đã</a:t>
             </a:r>
             <a:r>
-              <a:rPr lang="en-US" dirty="0" smtClean="0">
+              <a:rPr lang="en-US" dirty="0">
                 <a:latin typeface="Calibri" pitchFamily="34" charset="0"/>
                 <a:ea typeface="Calibri" pitchFamily="34" charset="0"/>
                 <a:cs typeface="Calibri" pitchFamily="34" charset="0"/>
@@ -6306,7 +6298,7 @@
               <a:t> </a:t>
             </a:r>
             <a:r>
-              <a:rPr lang="en-US" dirty="0" err="1" smtClean="0">
+              <a:rPr lang="en-US" dirty="0" err="1">
                 <a:latin typeface="Calibri" pitchFamily="34" charset="0"/>
                 <a:ea typeface="Calibri" pitchFamily="34" charset="0"/>
                 <a:cs typeface="Calibri" pitchFamily="34" charset="0"/>
@@ -6314,7 +6306,7 @@
               <a:t>được</a:t>
             </a:r>
             <a:r>
-              <a:rPr lang="en-US" dirty="0" smtClean="0">
+              <a:rPr lang="en-US" dirty="0">
                 <a:latin typeface="Calibri" pitchFamily="34" charset="0"/>
                 <a:ea typeface="Calibri" pitchFamily="34" charset="0"/>
                 <a:cs typeface="Calibri" pitchFamily="34" charset="0"/>
@@ -6322,7 +6314,7 @@
               <a:t> </a:t>
             </a:r>
             <a:r>
-              <a:rPr lang="en-US" dirty="0" err="1" smtClean="0">
+              <a:rPr lang="en-US" dirty="0" err="1">
                 <a:latin typeface="Calibri" pitchFamily="34" charset="0"/>
                 <a:ea typeface="Calibri" pitchFamily="34" charset="0"/>
                 <a:cs typeface="Calibri" pitchFamily="34" charset="0"/>
@@ -6330,7 +6322,7 @@
               <a:t>sắp</a:t>
             </a:r>
             <a:r>
-              <a:rPr lang="en-US" dirty="0" smtClean="0">
+              <a:rPr lang="en-US" dirty="0">
                 <a:latin typeface="Calibri" pitchFamily="34" charset="0"/>
                 <a:ea typeface="Calibri" pitchFamily="34" charset="0"/>
                 <a:cs typeface="Calibri" pitchFamily="34" charset="0"/>
@@ -6338,7 +6330,7 @@
               <a:t> </a:t>
             </a:r>
             <a:r>
-              <a:rPr lang="en-US" dirty="0" err="1" smtClean="0">
+              <a:rPr lang="en-US" dirty="0" err="1">
                 <a:latin typeface="Calibri" pitchFamily="34" charset="0"/>
                 <a:ea typeface="Calibri" pitchFamily="34" charset="0"/>
                 <a:cs typeface="Calibri" pitchFamily="34" charset="0"/>
@@ -6402,39 +6394,39 @@
           <a:lstStyle/>
           <a:p>
             <a:r>
-              <a:rPr lang="en-US" dirty="0" err="1" smtClean="0"/>
+              <a:rPr lang="en-US" dirty="0" err="1"/>
               <a:t>Một</a:t>
             </a:r>
             <a:r>
-              <a:rPr lang="en-US" dirty="0" smtClean="0"/>
-              <a:t> </a:t>
-            </a:r>
-            <a:r>
-              <a:rPr lang="en-US" dirty="0" err="1" smtClean="0"/>
+              <a:rPr lang="en-US" dirty="0"/>
+              <a:t> </a:t>
+            </a:r>
+            <a:r>
+              <a:rPr lang="en-US" dirty="0" err="1"/>
               <a:t>số</a:t>
             </a:r>
             <a:r>
-              <a:rPr lang="en-US" dirty="0" smtClean="0"/>
-              <a:t> </a:t>
-            </a:r>
-            <a:r>
-              <a:rPr lang="en-US" dirty="0" err="1" smtClean="0"/>
+              <a:rPr lang="en-US" dirty="0"/>
+              <a:t> </a:t>
+            </a:r>
+            <a:r>
+              <a:rPr lang="en-US" dirty="0" err="1"/>
               <a:t>phương</a:t>
             </a:r>
             <a:r>
-              <a:rPr lang="en-US" dirty="0" smtClean="0"/>
-              <a:t> </a:t>
-            </a:r>
-            <a:r>
-              <a:rPr lang="en-US" dirty="0" err="1" smtClean="0"/>
+              <a:rPr lang="en-US" dirty="0"/>
+              <a:t> </a:t>
+            </a:r>
+            <a:r>
+              <a:rPr lang="en-US" dirty="0" err="1"/>
               <a:t>pháp</a:t>
             </a:r>
             <a:r>
-              <a:rPr lang="en-US" dirty="0" smtClean="0"/>
-              <a:t> </a:t>
-            </a:r>
-            <a:r>
-              <a:rPr lang="en-US" dirty="0" err="1" smtClean="0"/>
+              <a:rPr lang="en-US" dirty="0"/>
+              <a:t> </a:t>
+            </a:r>
+            <a:r>
+              <a:rPr lang="en-US" dirty="0" err="1"/>
               <a:t>khác</a:t>
             </a:r>
             <a:endParaRPr lang="en-US" dirty="0"/>
@@ -6457,133 +6449,133 @@
           <a:lstStyle/>
           <a:p>
             <a:r>
-              <a:rPr lang="en-US" dirty="0" err="1" smtClean="0"/>
+              <a:rPr lang="en-US" dirty="0" err="1"/>
               <a:t>Phương</a:t>
             </a:r>
             <a:r>
-              <a:rPr lang="en-US" dirty="0" smtClean="0"/>
-              <a:t> </a:t>
-            </a:r>
-            <a:r>
-              <a:rPr lang="en-US" dirty="0" err="1" smtClean="0"/>
+              <a:rPr lang="en-US" dirty="0"/>
+              <a:t> </a:t>
+            </a:r>
+            <a:r>
+              <a:rPr lang="en-US" dirty="0" err="1"/>
               <a:t>pháp</a:t>
             </a:r>
             <a:r>
-              <a:rPr lang="en-US" dirty="0" smtClean="0"/>
-              <a:t> </a:t>
-            </a:r>
-            <a:r>
-              <a:rPr lang="en-US" dirty="0" err="1" smtClean="0"/>
+              <a:rPr lang="en-US" dirty="0"/>
+              <a:t> </a:t>
+            </a:r>
+            <a:r>
+              <a:rPr lang="en-US" dirty="0" err="1"/>
               <a:t>trộn</a:t>
             </a:r>
             <a:r>
-              <a:rPr lang="en-US" dirty="0" smtClean="0"/>
-              <a:t> </a:t>
-            </a:r>
-            <a:r>
-              <a:rPr lang="en-US" dirty="0" err="1" smtClean="0"/>
+              <a:rPr lang="en-US" dirty="0"/>
+              <a:t> </a:t>
+            </a:r>
+            <a:r>
+              <a:rPr lang="en-US" dirty="0" err="1"/>
               <a:t>tự</a:t>
             </a:r>
             <a:r>
-              <a:rPr lang="en-US" dirty="0" smtClean="0"/>
-              <a:t> </a:t>
-            </a:r>
-            <a:r>
-              <a:rPr lang="en-US" dirty="0" err="1" smtClean="0"/>
+              <a:rPr lang="en-US" dirty="0"/>
+              <a:t> </a:t>
+            </a:r>
+            <a:r>
+              <a:rPr lang="en-US" dirty="0" err="1"/>
               <a:t>nhiên</a:t>
             </a:r>
-            <a:endParaRPr lang="en-US" dirty="0" smtClean="0"/>
-          </a:p>
-          <a:p>
-            <a:r>
-              <a:rPr lang="en-US" dirty="0" err="1" smtClean="0"/>
+            <a:endParaRPr lang="en-US" dirty="0"/>
+          </a:p>
+          <a:p>
+            <a:r>
+              <a:rPr lang="en-US" dirty="0" err="1"/>
               <a:t>Phương</a:t>
             </a:r>
             <a:r>
-              <a:rPr lang="en-US" dirty="0" smtClean="0"/>
-              <a:t> </a:t>
-            </a:r>
-            <a:r>
-              <a:rPr lang="en-US" dirty="0" err="1" smtClean="0"/>
+              <a:rPr lang="en-US" dirty="0"/>
+              <a:t> </a:t>
+            </a:r>
+            <a:r>
+              <a:rPr lang="en-US" dirty="0" err="1"/>
               <a:t>pháp</a:t>
             </a:r>
             <a:r>
-              <a:rPr lang="en-US" dirty="0" smtClean="0"/>
-              <a:t> </a:t>
-            </a:r>
-            <a:r>
-              <a:rPr lang="en-US" dirty="0" err="1" smtClean="0"/>
+              <a:rPr lang="en-US" dirty="0"/>
+              <a:t> </a:t>
+            </a:r>
+            <a:r>
+              <a:rPr lang="en-US" dirty="0" err="1"/>
               <a:t>trộn</a:t>
             </a:r>
             <a:r>
-              <a:rPr lang="en-US" dirty="0" smtClean="0"/>
-              <a:t> </a:t>
-            </a:r>
-            <a:r>
-              <a:rPr lang="en-US" dirty="0" err="1" smtClean="0"/>
+              <a:rPr lang="en-US" dirty="0"/>
+              <a:t> </a:t>
+            </a:r>
+            <a:r>
+              <a:rPr lang="en-US" dirty="0" err="1"/>
               <a:t>đa</a:t>
             </a:r>
             <a:r>
-              <a:rPr lang="en-US" dirty="0" smtClean="0"/>
-              <a:t> </a:t>
-            </a:r>
-            <a:r>
-              <a:rPr lang="en-US" dirty="0" err="1" smtClean="0"/>
+              <a:rPr lang="en-US" dirty="0"/>
+              <a:t> </a:t>
+            </a:r>
+            <a:r>
+              <a:rPr lang="en-US" dirty="0" err="1"/>
               <a:t>lối</a:t>
             </a:r>
             <a:r>
-              <a:rPr lang="en-US" dirty="0" smtClean="0"/>
-              <a:t> </a:t>
-            </a:r>
-            <a:r>
-              <a:rPr lang="en-US" dirty="0" err="1" smtClean="0"/>
+              <a:rPr lang="en-US" dirty="0"/>
+              <a:t> </a:t>
+            </a:r>
+            <a:r>
+              <a:rPr lang="en-US" dirty="0" err="1"/>
               <a:t>cân</a:t>
             </a:r>
             <a:r>
-              <a:rPr lang="en-US" dirty="0" smtClean="0"/>
-              <a:t> </a:t>
-            </a:r>
-            <a:r>
-              <a:rPr lang="en-US" dirty="0" err="1" smtClean="0"/>
+              <a:rPr lang="en-US" dirty="0"/>
+              <a:t> </a:t>
+            </a:r>
+            <a:r>
+              <a:rPr lang="en-US" dirty="0" err="1"/>
               <a:t>bằng</a:t>
             </a:r>
-            <a:endParaRPr lang="en-US" dirty="0" smtClean="0"/>
-          </a:p>
-          <a:p>
-            <a:r>
-              <a:rPr lang="en-US" dirty="0" err="1" smtClean="0"/>
+            <a:endParaRPr lang="en-US" dirty="0"/>
+          </a:p>
+          <a:p>
+            <a:r>
+              <a:rPr lang="en-US" dirty="0" err="1"/>
               <a:t>Phương</a:t>
             </a:r>
             <a:r>
-              <a:rPr lang="en-US" dirty="0" smtClean="0"/>
-              <a:t> </a:t>
-            </a:r>
-            <a:r>
-              <a:rPr lang="en-US" dirty="0" err="1" smtClean="0"/>
+              <a:rPr lang="en-US" dirty="0"/>
+              <a:t> </a:t>
+            </a:r>
+            <a:r>
+              <a:rPr lang="en-US" dirty="0" err="1"/>
               <a:t>pháp</a:t>
             </a:r>
             <a:r>
-              <a:rPr lang="en-US" dirty="0" smtClean="0"/>
-              <a:t> </a:t>
-            </a:r>
-            <a:r>
-              <a:rPr lang="en-US" dirty="0" err="1" smtClean="0"/>
+              <a:rPr lang="en-US" dirty="0"/>
+              <a:t> </a:t>
+            </a:r>
+            <a:r>
+              <a:rPr lang="en-US" dirty="0" err="1"/>
               <a:t>trộn</a:t>
             </a:r>
             <a:r>
-              <a:rPr lang="en-US" dirty="0" smtClean="0"/>
-              <a:t> </a:t>
-            </a:r>
-            <a:r>
-              <a:rPr lang="en-US" dirty="0" err="1" smtClean="0"/>
+              <a:rPr lang="en-US" dirty="0"/>
+              <a:t> </a:t>
+            </a:r>
+            <a:r>
+              <a:rPr lang="en-US" dirty="0" err="1"/>
               <a:t>đa</a:t>
             </a:r>
             <a:r>
-              <a:rPr lang="en-US" dirty="0" smtClean="0"/>
-              <a:t> </a:t>
-            </a:r>
-            <a:r>
-              <a:rPr lang="en-US" dirty="0" err="1" smtClean="0"/>
+              <a:rPr lang="en-US" dirty="0"/>
+              <a:t> </a:t>
+            </a:r>
+            <a:r>
+              <a:rPr lang="en-US" dirty="0" err="1"/>
               <a:t>pha</a:t>
             </a:r>
             <a:endParaRPr lang="en-US" dirty="0"/>
@@ -6636,23 +6628,23 @@
           <a:lstStyle/>
           <a:p>
             <a:r>
-              <a:rPr lang="en-US" dirty="0" err="1" smtClean="0"/>
+              <a:rPr lang="en-US" dirty="0" err="1"/>
               <a:t>Độ</a:t>
             </a:r>
             <a:r>
-              <a:rPr lang="en-US" dirty="0" smtClean="0"/>
-              <a:t> </a:t>
-            </a:r>
-            <a:r>
-              <a:rPr lang="en-US" dirty="0" err="1" smtClean="0"/>
+              <a:rPr lang="en-US" dirty="0"/>
+              <a:t> </a:t>
+            </a:r>
+            <a:r>
+              <a:rPr lang="en-US" dirty="0" err="1"/>
               <a:t>phức</a:t>
             </a:r>
             <a:r>
-              <a:rPr lang="en-US" dirty="0" smtClean="0"/>
-              <a:t> </a:t>
-            </a:r>
-            <a:r>
-              <a:rPr lang="en-US" dirty="0" err="1" smtClean="0"/>
+              <a:rPr lang="en-US" dirty="0"/>
+              <a:t> </a:t>
+            </a:r>
+            <a:r>
+              <a:rPr lang="en-US" dirty="0" err="1"/>
               <a:t>tạp</a:t>
             </a:r>
             <a:endParaRPr lang="en-US" dirty="0"/>
@@ -6767,11 +6759,11 @@
           <a:lstStyle/>
           <a:p>
             <a:r>
-              <a:rPr lang="en-US" dirty="0" smtClean="0"/>
+              <a:rPr lang="en-US" dirty="0"/>
               <a:t>So </a:t>
             </a:r>
             <a:r>
-              <a:rPr lang="en-US" dirty="0" err="1" smtClean="0"/>
+              <a:rPr lang="en-US" dirty="0" err="1"/>
               <a:t>sánh</a:t>
             </a:r>
             <a:endParaRPr lang="en-US" dirty="0"/>
@@ -6794,61 +6786,61 @@
           <a:lstStyle/>
           <a:p>
             <a:r>
-              <a:rPr lang="en-US" dirty="0" err="1" smtClean="0"/>
+              <a:rPr lang="en-US" dirty="0" err="1"/>
               <a:t>Độ</a:t>
             </a:r>
             <a:r>
-              <a:rPr lang="en-US" dirty="0" smtClean="0"/>
-              <a:t> </a:t>
-            </a:r>
-            <a:r>
-              <a:rPr lang="en-US" dirty="0" err="1" smtClean="0"/>
+              <a:rPr lang="en-US" dirty="0"/>
+              <a:t> </a:t>
+            </a:r>
+            <a:r>
+              <a:rPr lang="en-US" dirty="0" err="1"/>
               <a:t>phức</a:t>
             </a:r>
             <a:r>
-              <a:rPr lang="en-US" dirty="0" smtClean="0"/>
-              <a:t> </a:t>
-            </a:r>
-            <a:r>
-              <a:rPr lang="en-US" dirty="0" err="1" smtClean="0"/>
+              <a:rPr lang="en-US" dirty="0"/>
+              <a:t> </a:t>
+            </a:r>
+            <a:r>
+              <a:rPr lang="en-US" dirty="0" err="1"/>
               <a:t>tạp</a:t>
             </a:r>
             <a:r>
-              <a:rPr lang="en-US" dirty="0" smtClean="0"/>
-              <a:t> </a:t>
-            </a:r>
-            <a:r>
-              <a:rPr lang="en-US" dirty="0" err="1" smtClean="0"/>
+              <a:rPr lang="en-US" dirty="0"/>
+              <a:t> </a:t>
+            </a:r>
+            <a:r>
+              <a:rPr lang="en-US" dirty="0" err="1"/>
               <a:t>về</a:t>
             </a:r>
             <a:r>
-              <a:rPr lang="en-US" dirty="0" smtClean="0"/>
-              <a:t> </a:t>
-            </a:r>
-            <a:r>
-              <a:rPr lang="en-US" dirty="0" err="1" smtClean="0"/>
+              <a:rPr lang="en-US" dirty="0"/>
+              <a:t> </a:t>
+            </a:r>
+            <a:r>
+              <a:rPr lang="en-US" dirty="0" err="1"/>
               <a:t>thời</a:t>
             </a:r>
             <a:r>
-              <a:rPr lang="en-US" dirty="0" smtClean="0"/>
-              <a:t> </a:t>
-            </a:r>
-            <a:r>
-              <a:rPr lang="en-US" dirty="0" err="1" smtClean="0"/>
+              <a:rPr lang="en-US" dirty="0"/>
+              <a:t> </a:t>
+            </a:r>
+            <a:r>
+              <a:rPr lang="en-US" dirty="0" err="1"/>
               <a:t>gian</a:t>
             </a:r>
             <a:r>
-              <a:rPr lang="en-US" dirty="0" smtClean="0"/>
-              <a:t> </a:t>
-            </a:r>
-            <a:r>
-              <a:rPr lang="en-US" dirty="0" err="1" smtClean="0"/>
+              <a:rPr lang="en-US" dirty="0"/>
+              <a:t> </a:t>
+            </a:r>
+            <a:r>
+              <a:rPr lang="en-US" dirty="0" err="1"/>
               <a:t>nhanh</a:t>
             </a:r>
-            <a:endParaRPr lang="en-US" dirty="0" smtClean="0"/>
-          </a:p>
-          <a:p>
-            <a:endParaRPr lang="en-US" smtClean="0"/>
+            <a:endParaRPr lang="en-US" dirty="0"/>
+          </a:p>
+          <a:p>
+            <a:endParaRPr lang="en-US"/>
           </a:p>
           <a:p>
             <a:endParaRPr lang="en-US" dirty="0"/>
@@ -7157,7 +7149,7 @@
   <a:extraClrSchemeLst/>
   <a:extLst>
     <a:ext uri="{05A4C25C-085E-4340-85A3-A5531E510DB2}">
-      <thm15:themeFamily xmlns="" xmlns:thm15="http://schemas.microsoft.com/office/thememl/2012/main" name="Office Theme" id="{62F939B6-93AF-4DB8-9C6B-D6C7DFDC589F}" vid="{4A3C46E8-61CC-4603-A589-7422A47A8E4A}"/>
+      <thm15:themeFamily xmlns:thm15="http://schemas.microsoft.com/office/thememl/2012/main" name="Office Theme" id="{62F939B6-93AF-4DB8-9C6B-D6C7DFDC589F}" vid="{4A3C46E8-61CC-4603-A589-7422A47A8E4A}"/>
     </a:ext>
   </a:extLst>
 </a:theme>

</xml_diff>